<commit_message>
Created Video Display Block Diagram.
</commit_message>
<xml_diff>
--- a/Documentation/osc-block-design.pptx
+++ b/Documentation/osc-block-design.pptx
@@ -5,10 +5,11 @@
     <p:sldMasterId id="2147483648" r:id="rId1"/>
   </p:sldMasterIdLst>
   <p:notesMasterIdLst>
-    <p:notesMasterId r:id="rId3"/>
+    <p:notesMasterId r:id="rId4"/>
   </p:notesMasterIdLst>
   <p:sldIdLst>
     <p:sldId id="256" r:id="rId2"/>
+    <p:sldId id="257" r:id="rId3"/>
   </p:sldIdLst>
   <p:sldSz cx="9144000" cy="6858000" type="screen4x3"/>
   <p:notesSz cx="6858000" cy="9144000"/>
@@ -192,7 +193,7 @@
           <a:p>
             <a:fld id="{FFB0E71B-32EB-48BB-ACFC-DB0AFE2E6F1D}" type="datetimeFigureOut">
               <a:rPr lang="en-US" smtClean="0"/>
-              <a:t>1/25/2014</a:t>
+              <a:t>2/16/2014</a:t>
             </a:fld>
             <a:endParaRPr lang="en-US"/>
           </a:p>
@@ -641,7 +642,7 @@
           <a:p>
             <a:fld id="{08A35B09-16DA-4D86-8913-C92676B2D7D8}" type="datetimeFigureOut">
               <a:rPr lang="en-US" smtClean="0"/>
-              <a:t>1/25/2014</a:t>
+              <a:t>2/16/2014</a:t>
             </a:fld>
             <a:endParaRPr lang="en-US"/>
           </a:p>
@@ -811,7 +812,7 @@
           <a:p>
             <a:fld id="{08A35B09-16DA-4D86-8913-C92676B2D7D8}" type="datetimeFigureOut">
               <a:rPr lang="en-US" smtClean="0"/>
-              <a:t>1/25/2014</a:t>
+              <a:t>2/16/2014</a:t>
             </a:fld>
             <a:endParaRPr lang="en-US"/>
           </a:p>
@@ -991,7 +992,7 @@
           <a:p>
             <a:fld id="{08A35B09-16DA-4D86-8913-C92676B2D7D8}" type="datetimeFigureOut">
               <a:rPr lang="en-US" smtClean="0"/>
-              <a:t>1/25/2014</a:t>
+              <a:t>2/16/2014</a:t>
             </a:fld>
             <a:endParaRPr lang="en-US"/>
           </a:p>
@@ -1161,7 +1162,7 @@
           <a:p>
             <a:fld id="{08A35B09-16DA-4D86-8913-C92676B2D7D8}" type="datetimeFigureOut">
               <a:rPr lang="en-US" smtClean="0"/>
-              <a:t>1/25/2014</a:t>
+              <a:t>2/16/2014</a:t>
             </a:fld>
             <a:endParaRPr lang="en-US"/>
           </a:p>
@@ -1407,7 +1408,7 @@
           <a:p>
             <a:fld id="{08A35B09-16DA-4D86-8913-C92676B2D7D8}" type="datetimeFigureOut">
               <a:rPr lang="en-US" smtClean="0"/>
-              <a:t>1/25/2014</a:t>
+              <a:t>2/16/2014</a:t>
             </a:fld>
             <a:endParaRPr lang="en-US"/>
           </a:p>
@@ -1695,7 +1696,7 @@
           <a:p>
             <a:fld id="{08A35B09-16DA-4D86-8913-C92676B2D7D8}" type="datetimeFigureOut">
               <a:rPr lang="en-US" smtClean="0"/>
-              <a:t>1/25/2014</a:t>
+              <a:t>2/16/2014</a:t>
             </a:fld>
             <a:endParaRPr lang="en-US"/>
           </a:p>
@@ -2117,7 +2118,7 @@
           <a:p>
             <a:fld id="{08A35B09-16DA-4D86-8913-C92676B2D7D8}" type="datetimeFigureOut">
               <a:rPr lang="en-US" smtClean="0"/>
-              <a:t>1/25/2014</a:t>
+              <a:t>2/16/2014</a:t>
             </a:fld>
             <a:endParaRPr lang="en-US"/>
           </a:p>
@@ -2235,7 +2236,7 @@
           <a:p>
             <a:fld id="{08A35B09-16DA-4D86-8913-C92676B2D7D8}" type="datetimeFigureOut">
               <a:rPr lang="en-US" smtClean="0"/>
-              <a:t>1/25/2014</a:t>
+              <a:t>2/16/2014</a:t>
             </a:fld>
             <a:endParaRPr lang="en-US"/>
           </a:p>
@@ -2330,7 +2331,7 @@
           <a:p>
             <a:fld id="{08A35B09-16DA-4D86-8913-C92676B2D7D8}" type="datetimeFigureOut">
               <a:rPr lang="en-US" smtClean="0"/>
-              <a:t>1/25/2014</a:t>
+              <a:t>2/16/2014</a:t>
             </a:fld>
             <a:endParaRPr lang="en-US"/>
           </a:p>
@@ -2607,7 +2608,7 @@
           <a:p>
             <a:fld id="{08A35B09-16DA-4D86-8913-C92676B2D7D8}" type="datetimeFigureOut">
               <a:rPr lang="en-US" smtClean="0"/>
-              <a:t>1/25/2014</a:t>
+              <a:t>2/16/2014</a:t>
             </a:fld>
             <a:endParaRPr lang="en-US"/>
           </a:p>
@@ -2860,7 +2861,7 @@
           <a:p>
             <a:fld id="{08A35B09-16DA-4D86-8913-C92676B2D7D8}" type="datetimeFigureOut">
               <a:rPr lang="en-US" smtClean="0"/>
-              <a:t>1/25/2014</a:t>
+              <a:t>2/16/2014</a:t>
             </a:fld>
             <a:endParaRPr lang="en-US"/>
           </a:p>
@@ -3073,7 +3074,7 @@
           <a:p>
             <a:fld id="{08A35B09-16DA-4D86-8913-C92676B2D7D8}" type="datetimeFigureOut">
               <a:rPr lang="en-US" smtClean="0"/>
-              <a:t>1/25/2014</a:t>
+              <a:t>2/16/2014</a:t>
             </a:fld>
             <a:endParaRPr lang="en-US"/>
           </a:p>
@@ -4347,7 +4348,7 @@
             <a:pPr algn="ctr"/>
             <a:r>
               <a:rPr lang="en-US" sz="1200" dirty="0" smtClean="0"/>
-              <a:t>DRAM</a:t>
+              <a:t>SRAM</a:t>
             </a:r>
             <a:endParaRPr lang="en-US" sz="1200" dirty="0"/>
           </a:p>
@@ -7909,12 +7910,8 @@
           <a:p>
             <a:pPr algn="ctr"/>
             <a:r>
-              <a:rPr lang="en-US" sz="1200" dirty="0"/>
-              <a:t>S</a:t>
-            </a:r>
-            <a:r>
               <a:rPr lang="en-US" sz="1200" dirty="0" smtClean="0"/>
-              <a:t>RAM</a:t>
+              <a:t>VRAM</a:t>
             </a:r>
             <a:endParaRPr lang="en-US" sz="1200" dirty="0"/>
           </a:p>
@@ -16371,6 +16368,4165 @@
     <p:extLst>
       <p:ext uri="{BB962C8B-B14F-4D97-AF65-F5344CB8AC3E}">
         <p14:creationId xmlns:p14="http://schemas.microsoft.com/office/powerpoint/2010/main" val="2913898006"/>
+      </p:ext>
+    </p:extLst>
+  </p:cSld>
+  <p:clrMapOvr>
+    <a:masterClrMapping/>
+  </p:clrMapOvr>
+</p:sld>
+</file>
+
+<file path=ppt/slides/slide2.xml><?xml version="1.0" encoding="utf-8"?>
+<p:sld xmlns:a="http://schemas.openxmlformats.org/drawingml/2006/main" xmlns:r="http://schemas.openxmlformats.org/officeDocument/2006/relationships" xmlns:p="http://schemas.openxmlformats.org/presentationml/2006/main">
+  <p:cSld>
+    <p:spTree>
+      <p:nvGrpSpPr>
+        <p:cNvPr id="1" name=""/>
+        <p:cNvGrpSpPr/>
+        <p:nvPr/>
+      </p:nvGrpSpPr>
+      <p:grpSpPr>
+        <a:xfrm>
+          <a:off x="0" y="0"/>
+          <a:ext cx="0" cy="0"/>
+          <a:chOff x="0" y="0"/>
+          <a:chExt cx="0" cy="0"/>
+        </a:xfrm>
+      </p:grpSpPr>
+      <p:sp>
+        <p:nvSpPr>
+          <p:cNvPr id="4" name="Flowchart: Process 3"/>
+          <p:cNvSpPr/>
+          <p:nvPr/>
+        </p:nvSpPr>
+        <p:spPr>
+          <a:xfrm>
+            <a:off x="561607" y="3274627"/>
+            <a:ext cx="3469729" cy="253864"/>
+          </a:xfrm>
+          <a:prstGeom prst="flowChartProcess">
+            <a:avLst/>
+          </a:prstGeom>
+        </p:spPr>
+        <p:style>
+          <a:lnRef idx="1">
+            <a:schemeClr val="accent6"/>
+          </a:lnRef>
+          <a:fillRef idx="2">
+            <a:schemeClr val="accent6"/>
+          </a:fillRef>
+          <a:effectRef idx="1">
+            <a:schemeClr val="accent6"/>
+          </a:effectRef>
+          <a:fontRef idx="minor">
+            <a:schemeClr val="dk1"/>
+          </a:fontRef>
+        </p:style>
+        <p:txBody>
+          <a:bodyPr rtlCol="0" anchor="ctr"/>
+          <a:lstStyle/>
+          <a:p>
+            <a:pPr algn="ctr"/>
+            <a:r>
+              <a:rPr lang="en-US" sz="1200" dirty="0" smtClean="0"/>
+              <a:t>Buffer</a:t>
+            </a:r>
+            <a:endParaRPr lang="en-US" sz="1200" dirty="0"/>
+          </a:p>
+        </p:txBody>
+      </p:sp>
+      <p:sp>
+        <p:nvSpPr>
+          <p:cNvPr id="5" name="Flowchart: Process 4"/>
+          <p:cNvSpPr/>
+          <p:nvPr/>
+        </p:nvSpPr>
+        <p:spPr>
+          <a:xfrm>
+            <a:off x="453122" y="3657600"/>
+            <a:ext cx="3657600" cy="2743200"/>
+          </a:xfrm>
+          <a:prstGeom prst="flowChartProcess">
+            <a:avLst/>
+          </a:prstGeom>
+        </p:spPr>
+        <p:style>
+          <a:lnRef idx="1">
+            <a:schemeClr val="accent5"/>
+          </a:lnRef>
+          <a:fillRef idx="2">
+            <a:schemeClr val="accent5"/>
+          </a:fillRef>
+          <a:effectRef idx="1">
+            <a:schemeClr val="accent5"/>
+          </a:effectRef>
+          <a:fontRef idx="minor">
+            <a:schemeClr val="dk1"/>
+          </a:fontRef>
+        </p:style>
+        <p:txBody>
+          <a:bodyPr rtlCol="0" anchor="ctr"/>
+          <a:lstStyle/>
+          <a:p>
+            <a:pPr algn="ctr"/>
+            <a:r>
+              <a:rPr lang="en-US" sz="1200" dirty="0" smtClean="0"/>
+              <a:t>FPGA</a:t>
+            </a:r>
+            <a:endParaRPr lang="en-US" sz="1200" dirty="0"/>
+          </a:p>
+        </p:txBody>
+      </p:sp>
+      <p:sp>
+        <p:nvSpPr>
+          <p:cNvPr id="6" name="Flowchart: Process 5"/>
+          <p:cNvSpPr/>
+          <p:nvPr/>
+        </p:nvSpPr>
+        <p:spPr>
+          <a:xfrm>
+            <a:off x="1018808" y="3793656"/>
+            <a:ext cx="1089506" cy="903635"/>
+          </a:xfrm>
+          <a:prstGeom prst="flowChartProcess">
+            <a:avLst/>
+          </a:prstGeom>
+        </p:spPr>
+        <p:style>
+          <a:lnRef idx="1">
+            <a:schemeClr val="accent1"/>
+          </a:lnRef>
+          <a:fillRef idx="2">
+            <a:schemeClr val="accent1"/>
+          </a:fillRef>
+          <a:effectRef idx="1">
+            <a:schemeClr val="accent1"/>
+          </a:effectRef>
+          <a:fontRef idx="minor">
+            <a:schemeClr val="dk1"/>
+          </a:fontRef>
+        </p:style>
+        <p:txBody>
+          <a:bodyPr rtlCol="0" anchor="ctr"/>
+          <a:lstStyle/>
+          <a:p>
+            <a:pPr algn="ctr"/>
+            <a:r>
+              <a:rPr lang="en-US" sz="1200" dirty="0" smtClean="0"/>
+              <a:t>VRAM Controller</a:t>
+            </a:r>
+            <a:endParaRPr lang="en-US" sz="1200" dirty="0"/>
+          </a:p>
+        </p:txBody>
+      </p:sp>
+      <p:cxnSp>
+        <p:nvCxnSpPr>
+          <p:cNvPr id="8" name="Straight Connector 7"/>
+          <p:cNvCxnSpPr/>
+          <p:nvPr/>
+        </p:nvCxnSpPr>
+        <p:spPr>
+          <a:xfrm flipV="1">
+            <a:off x="1727692" y="2258891"/>
+            <a:ext cx="0" cy="1534766"/>
+          </a:xfrm>
+          <a:prstGeom prst="line">
+            <a:avLst/>
+          </a:prstGeom>
+          <a:ln w="12700">
+            <a:solidFill>
+              <a:srgbClr val="FFFF00"/>
+            </a:solidFill>
+            <a:headEnd type="none" w="sm" len="sm"/>
+            <a:tailEnd type="none" w="sm" len="sm"/>
+          </a:ln>
+        </p:spPr>
+        <p:style>
+          <a:lnRef idx="2">
+            <a:schemeClr val="accent4"/>
+          </a:lnRef>
+          <a:fillRef idx="0">
+            <a:schemeClr val="accent4"/>
+          </a:fillRef>
+          <a:effectRef idx="1">
+            <a:schemeClr val="accent4"/>
+          </a:effectRef>
+          <a:fontRef idx="minor">
+            <a:schemeClr val="tx1"/>
+          </a:fontRef>
+        </p:style>
+      </p:cxnSp>
+      <p:cxnSp>
+        <p:nvCxnSpPr>
+          <p:cNvPr id="9" name="Straight Connector 8"/>
+          <p:cNvCxnSpPr/>
+          <p:nvPr/>
+        </p:nvCxnSpPr>
+        <p:spPr>
+          <a:xfrm flipV="1">
+            <a:off x="1498714" y="4697291"/>
+            <a:ext cx="0" cy="879031"/>
+          </a:xfrm>
+          <a:prstGeom prst="line">
+            <a:avLst/>
+          </a:prstGeom>
+          <a:ln w="12700">
+            <a:solidFill>
+              <a:srgbClr val="CC99FF"/>
+            </a:solidFill>
+            <a:headEnd type="none" w="sm" len="sm"/>
+            <a:tailEnd type="none" w="sm" len="sm"/>
+          </a:ln>
+        </p:spPr>
+        <p:style>
+          <a:lnRef idx="2">
+            <a:schemeClr val="accent4"/>
+          </a:lnRef>
+          <a:fillRef idx="0">
+            <a:schemeClr val="accent4"/>
+          </a:fillRef>
+          <a:effectRef idx="1">
+            <a:schemeClr val="accent4"/>
+          </a:effectRef>
+          <a:fontRef idx="minor">
+            <a:schemeClr val="tx1"/>
+          </a:fontRef>
+        </p:style>
+      </p:cxnSp>
+      <p:cxnSp>
+        <p:nvCxnSpPr>
+          <p:cNvPr id="10" name="Straight Connector 9"/>
+          <p:cNvCxnSpPr>
+            <a:stCxn id="7" idx="1"/>
+            <a:endCxn id="12" idx="3"/>
+          </p:cNvCxnSpPr>
+          <p:nvPr/>
+        </p:nvCxnSpPr>
+        <p:spPr>
+          <a:xfrm flipH="1" flipV="1">
+            <a:off x="2281922" y="2001491"/>
+            <a:ext cx="699991" cy="4194"/>
+          </a:xfrm>
+          <a:prstGeom prst="line">
+            <a:avLst/>
+          </a:prstGeom>
+          <a:ln w="12700">
+            <a:solidFill>
+              <a:srgbClr val="00FF00"/>
+            </a:solidFill>
+            <a:headEnd type="none" w="sm" len="sm"/>
+            <a:tailEnd type="none" w="sm" len="sm"/>
+          </a:ln>
+        </p:spPr>
+        <p:style>
+          <a:lnRef idx="2">
+            <a:schemeClr val="accent4"/>
+          </a:lnRef>
+          <a:fillRef idx="0">
+            <a:schemeClr val="accent4"/>
+          </a:fillRef>
+          <a:effectRef idx="1">
+            <a:schemeClr val="accent4"/>
+          </a:effectRef>
+          <a:fontRef idx="minor">
+            <a:schemeClr val="tx1"/>
+          </a:fontRef>
+        </p:style>
+      </p:cxnSp>
+      <p:cxnSp>
+        <p:nvCxnSpPr>
+          <p:cNvPr id="11" name="Straight Connector 10"/>
+          <p:cNvCxnSpPr/>
+          <p:nvPr/>
+        </p:nvCxnSpPr>
+        <p:spPr>
+          <a:xfrm flipH="1">
+            <a:off x="2163264" y="2639891"/>
+            <a:ext cx="1663836" cy="0"/>
+          </a:xfrm>
+          <a:prstGeom prst="line">
+            <a:avLst/>
+          </a:prstGeom>
+          <a:ln w="12700">
+            <a:solidFill>
+              <a:srgbClr val="FF0000"/>
+            </a:solidFill>
+            <a:headEnd type="none" w="sm" len="sm"/>
+            <a:tailEnd type="none" w="sm" len="sm"/>
+          </a:ln>
+        </p:spPr>
+        <p:style>
+          <a:lnRef idx="2">
+            <a:schemeClr val="accent4"/>
+          </a:lnRef>
+          <a:fillRef idx="0">
+            <a:schemeClr val="accent4"/>
+          </a:fillRef>
+          <a:effectRef idx="1">
+            <a:schemeClr val="accent4"/>
+          </a:effectRef>
+          <a:fontRef idx="minor">
+            <a:schemeClr val="tx1"/>
+          </a:fontRef>
+        </p:style>
+      </p:cxnSp>
+      <p:sp>
+        <p:nvSpPr>
+          <p:cNvPr id="12" name="Flowchart: Process 11"/>
+          <p:cNvSpPr/>
+          <p:nvPr/>
+        </p:nvSpPr>
+        <p:spPr>
+          <a:xfrm>
+            <a:off x="561607" y="1572735"/>
+            <a:ext cx="1720315" cy="857511"/>
+          </a:xfrm>
+          <a:prstGeom prst="flowChartProcess">
+            <a:avLst/>
+          </a:prstGeom>
+        </p:spPr>
+        <p:style>
+          <a:lnRef idx="1">
+            <a:schemeClr val="accent6"/>
+          </a:lnRef>
+          <a:fillRef idx="2">
+            <a:schemeClr val="accent6"/>
+          </a:fillRef>
+          <a:effectRef idx="1">
+            <a:schemeClr val="accent6"/>
+          </a:effectRef>
+          <a:fontRef idx="minor">
+            <a:schemeClr val="dk1"/>
+          </a:fontRef>
+        </p:style>
+        <p:txBody>
+          <a:bodyPr rtlCol="0" anchor="ctr"/>
+          <a:lstStyle/>
+          <a:p>
+            <a:pPr algn="ctr"/>
+            <a:r>
+              <a:rPr lang="en-US" sz="1200" dirty="0" smtClean="0"/>
+              <a:t>VRAM</a:t>
+            </a:r>
+            <a:endParaRPr lang="en-US" sz="1200" dirty="0"/>
+          </a:p>
+        </p:txBody>
+      </p:sp>
+      <p:grpSp>
+        <p:nvGrpSpPr>
+          <p:cNvPr id="18" name="Group 17"/>
+          <p:cNvGrpSpPr/>
+          <p:nvPr/>
+        </p:nvGrpSpPr>
+        <p:grpSpPr>
+          <a:xfrm>
+            <a:off x="1701312" y="2427818"/>
+            <a:ext cx="52759" cy="101370"/>
+            <a:chOff x="985428" y="2723692"/>
+            <a:chExt cx="52759" cy="101370"/>
+          </a:xfrm>
+        </p:grpSpPr>
+        <p:sp>
+          <p:nvSpPr>
+            <p:cNvPr id="19" name="Isosceles Triangle 18"/>
+            <p:cNvSpPr/>
+            <p:nvPr/>
+          </p:nvSpPr>
+          <p:spPr>
+            <a:xfrm>
+              <a:off x="985428" y="2723692"/>
+              <a:ext cx="52759" cy="45719"/>
+            </a:xfrm>
+            <a:prstGeom prst="triangle">
+              <a:avLst/>
+            </a:prstGeom>
+            <a:ln>
+              <a:noFill/>
+            </a:ln>
+          </p:spPr>
+          <p:style>
+            <a:lnRef idx="2">
+              <a:schemeClr val="dk1">
+                <a:shade val="50000"/>
+              </a:schemeClr>
+            </a:lnRef>
+            <a:fillRef idx="1">
+              <a:schemeClr val="dk1"/>
+            </a:fillRef>
+            <a:effectRef idx="0">
+              <a:schemeClr val="dk1"/>
+            </a:effectRef>
+            <a:fontRef idx="minor">
+              <a:schemeClr val="lt1"/>
+            </a:fontRef>
+          </p:style>
+          <p:txBody>
+            <a:bodyPr rtlCol="0" anchor="ctr"/>
+            <a:lstStyle/>
+            <a:p>
+              <a:pPr algn="ctr"/>
+              <a:endParaRPr lang="en-US"/>
+            </a:p>
+          </p:txBody>
+        </p:sp>
+        <p:sp>
+          <p:nvSpPr>
+            <p:cNvPr id="20" name="Isosceles Triangle 19"/>
+            <p:cNvSpPr/>
+            <p:nvPr/>
+          </p:nvSpPr>
+          <p:spPr>
+            <a:xfrm flipV="1">
+              <a:off x="985428" y="2779343"/>
+              <a:ext cx="52759" cy="45719"/>
+            </a:xfrm>
+            <a:prstGeom prst="triangle">
+              <a:avLst/>
+            </a:prstGeom>
+            <a:ln>
+              <a:noFill/>
+            </a:ln>
+          </p:spPr>
+          <p:style>
+            <a:lnRef idx="2">
+              <a:schemeClr val="dk1">
+                <a:shade val="50000"/>
+              </a:schemeClr>
+            </a:lnRef>
+            <a:fillRef idx="1">
+              <a:schemeClr val="dk1"/>
+            </a:fillRef>
+            <a:effectRef idx="0">
+              <a:schemeClr val="dk1"/>
+            </a:effectRef>
+            <a:fontRef idx="minor">
+              <a:schemeClr val="lt1"/>
+            </a:fontRef>
+          </p:style>
+          <p:txBody>
+            <a:bodyPr rtlCol="0" anchor="ctr"/>
+            <a:lstStyle/>
+            <a:p>
+              <a:pPr algn="ctr"/>
+              <a:endParaRPr lang="en-US"/>
+            </a:p>
+          </p:txBody>
+        </p:sp>
+      </p:grpSp>
+      <p:grpSp>
+        <p:nvGrpSpPr>
+          <p:cNvPr id="21" name="Group 20"/>
+          <p:cNvGrpSpPr/>
+          <p:nvPr/>
+        </p:nvGrpSpPr>
+        <p:grpSpPr>
+          <a:xfrm>
+            <a:off x="1701312" y="3350874"/>
+            <a:ext cx="52759" cy="101370"/>
+            <a:chOff x="985428" y="2723692"/>
+            <a:chExt cx="52759" cy="101370"/>
+          </a:xfrm>
+        </p:grpSpPr>
+        <p:sp>
+          <p:nvSpPr>
+            <p:cNvPr id="22" name="Isosceles Triangle 21"/>
+            <p:cNvSpPr/>
+            <p:nvPr/>
+          </p:nvSpPr>
+          <p:spPr>
+            <a:xfrm>
+              <a:off x="985428" y="2723692"/>
+              <a:ext cx="52759" cy="45719"/>
+            </a:xfrm>
+            <a:prstGeom prst="triangle">
+              <a:avLst/>
+            </a:prstGeom>
+            <a:ln>
+              <a:noFill/>
+            </a:ln>
+          </p:spPr>
+          <p:style>
+            <a:lnRef idx="2">
+              <a:schemeClr val="dk1">
+                <a:shade val="50000"/>
+              </a:schemeClr>
+            </a:lnRef>
+            <a:fillRef idx="1">
+              <a:schemeClr val="dk1"/>
+            </a:fillRef>
+            <a:effectRef idx="0">
+              <a:schemeClr val="dk1"/>
+            </a:effectRef>
+            <a:fontRef idx="minor">
+              <a:schemeClr val="lt1"/>
+            </a:fontRef>
+          </p:style>
+          <p:txBody>
+            <a:bodyPr rtlCol="0" anchor="ctr"/>
+            <a:lstStyle/>
+            <a:p>
+              <a:pPr algn="ctr"/>
+              <a:endParaRPr lang="en-US"/>
+            </a:p>
+          </p:txBody>
+        </p:sp>
+        <p:sp>
+          <p:nvSpPr>
+            <p:cNvPr id="23" name="Isosceles Triangle 22"/>
+            <p:cNvSpPr/>
+            <p:nvPr/>
+          </p:nvSpPr>
+          <p:spPr>
+            <a:xfrm flipV="1">
+              <a:off x="985428" y="2779343"/>
+              <a:ext cx="52759" cy="45719"/>
+            </a:xfrm>
+            <a:prstGeom prst="triangle">
+              <a:avLst/>
+            </a:prstGeom>
+            <a:ln>
+              <a:noFill/>
+            </a:ln>
+          </p:spPr>
+          <p:style>
+            <a:lnRef idx="2">
+              <a:schemeClr val="dk1">
+                <a:shade val="50000"/>
+              </a:schemeClr>
+            </a:lnRef>
+            <a:fillRef idx="1">
+              <a:schemeClr val="dk1"/>
+            </a:fillRef>
+            <a:effectRef idx="0">
+              <a:schemeClr val="dk1"/>
+            </a:effectRef>
+            <a:fontRef idx="minor">
+              <a:schemeClr val="lt1"/>
+            </a:fontRef>
+          </p:style>
+          <p:txBody>
+            <a:bodyPr rtlCol="0" anchor="ctr"/>
+            <a:lstStyle/>
+            <a:p>
+              <a:pPr algn="ctr"/>
+              <a:endParaRPr lang="en-US"/>
+            </a:p>
+          </p:txBody>
+        </p:sp>
+      </p:grpSp>
+      <p:grpSp>
+        <p:nvGrpSpPr>
+          <p:cNvPr id="24" name="Group 23"/>
+          <p:cNvGrpSpPr/>
+          <p:nvPr/>
+        </p:nvGrpSpPr>
+        <p:grpSpPr>
+          <a:xfrm>
+            <a:off x="1701311" y="3686284"/>
+            <a:ext cx="52759" cy="101370"/>
+            <a:chOff x="985428" y="2723692"/>
+            <a:chExt cx="52759" cy="101370"/>
+          </a:xfrm>
+        </p:grpSpPr>
+        <p:sp>
+          <p:nvSpPr>
+            <p:cNvPr id="25" name="Isosceles Triangle 24"/>
+            <p:cNvSpPr/>
+            <p:nvPr/>
+          </p:nvSpPr>
+          <p:spPr>
+            <a:xfrm>
+              <a:off x="985428" y="2723692"/>
+              <a:ext cx="52759" cy="45719"/>
+            </a:xfrm>
+            <a:prstGeom prst="triangle">
+              <a:avLst/>
+            </a:prstGeom>
+            <a:ln>
+              <a:noFill/>
+            </a:ln>
+          </p:spPr>
+          <p:style>
+            <a:lnRef idx="2">
+              <a:schemeClr val="dk1">
+                <a:shade val="50000"/>
+              </a:schemeClr>
+            </a:lnRef>
+            <a:fillRef idx="1">
+              <a:schemeClr val="dk1"/>
+            </a:fillRef>
+            <a:effectRef idx="0">
+              <a:schemeClr val="dk1"/>
+            </a:effectRef>
+            <a:fontRef idx="minor">
+              <a:schemeClr val="lt1"/>
+            </a:fontRef>
+          </p:style>
+          <p:txBody>
+            <a:bodyPr rtlCol="0" anchor="ctr"/>
+            <a:lstStyle/>
+            <a:p>
+              <a:pPr algn="ctr"/>
+              <a:endParaRPr lang="en-US"/>
+            </a:p>
+          </p:txBody>
+        </p:sp>
+        <p:sp>
+          <p:nvSpPr>
+            <p:cNvPr id="26" name="Isosceles Triangle 25"/>
+            <p:cNvSpPr/>
+            <p:nvPr/>
+          </p:nvSpPr>
+          <p:spPr>
+            <a:xfrm flipV="1">
+              <a:off x="985428" y="2779343"/>
+              <a:ext cx="52759" cy="45719"/>
+            </a:xfrm>
+            <a:prstGeom prst="triangle">
+              <a:avLst/>
+            </a:prstGeom>
+            <a:ln>
+              <a:noFill/>
+            </a:ln>
+          </p:spPr>
+          <p:style>
+            <a:lnRef idx="2">
+              <a:schemeClr val="dk1">
+                <a:shade val="50000"/>
+              </a:schemeClr>
+            </a:lnRef>
+            <a:fillRef idx="1">
+              <a:schemeClr val="dk1"/>
+            </a:fillRef>
+            <a:effectRef idx="0">
+              <a:schemeClr val="dk1"/>
+            </a:effectRef>
+            <a:fontRef idx="minor">
+              <a:schemeClr val="lt1"/>
+            </a:fontRef>
+          </p:style>
+          <p:txBody>
+            <a:bodyPr rtlCol="0" anchor="ctr"/>
+            <a:lstStyle/>
+            <a:p>
+              <a:pPr algn="ctr"/>
+              <a:endParaRPr lang="en-US"/>
+            </a:p>
+          </p:txBody>
+        </p:sp>
+      </p:grpSp>
+      <p:sp>
+        <p:nvSpPr>
+          <p:cNvPr id="31" name="TextBox 30"/>
+          <p:cNvSpPr txBox="1"/>
+          <p:nvPr/>
+        </p:nvSpPr>
+        <p:spPr>
+          <a:xfrm rot="16200000">
+            <a:off x="1175231" y="2757506"/>
+            <a:ext cx="950872" cy="246221"/>
+          </a:xfrm>
+          <a:prstGeom prst="rect">
+            <a:avLst/>
+          </a:prstGeom>
+          <a:noFill/>
+        </p:spPr>
+        <p:txBody>
+          <a:bodyPr wrap="square" rtlCol="0">
+            <a:spAutoFit/>
+          </a:bodyPr>
+          <a:lstStyle/>
+          <a:p>
+            <a:r>
+              <a:rPr lang="en-US" sz="1000" dirty="0" smtClean="0">
+                <a:solidFill>
+                  <a:srgbClr val="FFFF00"/>
+                </a:solidFill>
+                <a:effectLst>
+                  <a:outerShdw blurRad="38100" dist="38100" dir="2700000" algn="tl">
+                    <a:srgbClr val="000000">
+                      <a:alpha val="43137"/>
+                    </a:srgbClr>
+                  </a:outerShdw>
+                </a:effectLst>
+              </a:rPr>
+              <a:t>A0-A8</a:t>
+            </a:r>
+            <a:endParaRPr lang="en-US" sz="1000" dirty="0">
+              <a:solidFill>
+                <a:srgbClr val="FFFF00"/>
+              </a:solidFill>
+              <a:effectLst>
+                <a:outerShdw blurRad="38100" dist="38100" dir="2700000" algn="tl">
+                  <a:srgbClr val="000000">
+                    <a:alpha val="43137"/>
+                  </a:srgbClr>
+                </a:outerShdw>
+              </a:effectLst>
+            </a:endParaRPr>
+          </a:p>
+        </p:txBody>
+      </p:sp>
+      <p:cxnSp>
+        <p:nvCxnSpPr>
+          <p:cNvPr id="32" name="Straight Connector 31"/>
+          <p:cNvCxnSpPr/>
+          <p:nvPr/>
+        </p:nvCxnSpPr>
+        <p:spPr>
+          <a:xfrm>
+            <a:off x="3838612" y="2071386"/>
+            <a:ext cx="817454" cy="0"/>
+          </a:xfrm>
+          <a:prstGeom prst="line">
+            <a:avLst/>
+          </a:prstGeom>
+          <a:ln w="12700">
+            <a:solidFill>
+              <a:srgbClr val="FF9900"/>
+            </a:solidFill>
+            <a:headEnd type="none" w="sm" len="sm"/>
+            <a:tailEnd type="none" w="sm" len="sm"/>
+          </a:ln>
+        </p:spPr>
+        <p:style>
+          <a:lnRef idx="2">
+            <a:schemeClr val="accent4"/>
+          </a:lnRef>
+          <a:fillRef idx="0">
+            <a:schemeClr val="accent4"/>
+          </a:fillRef>
+          <a:effectRef idx="1">
+            <a:schemeClr val="accent4"/>
+          </a:effectRef>
+          <a:fontRef idx="minor">
+            <a:schemeClr val="tx1"/>
+          </a:fontRef>
+        </p:style>
+      </p:cxnSp>
+      <p:grpSp>
+        <p:nvGrpSpPr>
+          <p:cNvPr id="33" name="Group 32"/>
+          <p:cNvGrpSpPr/>
+          <p:nvPr/>
+        </p:nvGrpSpPr>
+        <p:grpSpPr>
+          <a:xfrm rot="5400000">
+            <a:off x="4056119" y="2029426"/>
+            <a:ext cx="52759" cy="101370"/>
+            <a:chOff x="985428" y="2723692"/>
+            <a:chExt cx="52759" cy="101370"/>
+          </a:xfrm>
+        </p:grpSpPr>
+        <p:sp>
+          <p:nvSpPr>
+            <p:cNvPr id="34" name="Isosceles Triangle 33"/>
+            <p:cNvSpPr/>
+            <p:nvPr/>
+          </p:nvSpPr>
+          <p:spPr>
+            <a:xfrm>
+              <a:off x="985428" y="2723692"/>
+              <a:ext cx="52759" cy="45719"/>
+            </a:xfrm>
+            <a:prstGeom prst="triangle">
+              <a:avLst/>
+            </a:prstGeom>
+            <a:ln>
+              <a:noFill/>
+            </a:ln>
+          </p:spPr>
+          <p:style>
+            <a:lnRef idx="2">
+              <a:schemeClr val="dk1">
+                <a:shade val="50000"/>
+              </a:schemeClr>
+            </a:lnRef>
+            <a:fillRef idx="1">
+              <a:schemeClr val="dk1"/>
+            </a:fillRef>
+            <a:effectRef idx="0">
+              <a:schemeClr val="dk1"/>
+            </a:effectRef>
+            <a:fontRef idx="minor">
+              <a:schemeClr val="lt1"/>
+            </a:fontRef>
+          </p:style>
+          <p:txBody>
+            <a:bodyPr rtlCol="0" anchor="ctr"/>
+            <a:lstStyle/>
+            <a:p>
+              <a:pPr algn="ctr"/>
+              <a:endParaRPr lang="en-US"/>
+            </a:p>
+          </p:txBody>
+        </p:sp>
+        <p:sp>
+          <p:nvSpPr>
+            <p:cNvPr id="35" name="Isosceles Triangle 34"/>
+            <p:cNvSpPr/>
+            <p:nvPr/>
+          </p:nvSpPr>
+          <p:spPr>
+            <a:xfrm flipV="1">
+              <a:off x="985428" y="2779343"/>
+              <a:ext cx="52759" cy="45719"/>
+            </a:xfrm>
+            <a:prstGeom prst="triangle">
+              <a:avLst/>
+            </a:prstGeom>
+            <a:ln>
+              <a:noFill/>
+            </a:ln>
+          </p:spPr>
+          <p:style>
+            <a:lnRef idx="2">
+              <a:schemeClr val="dk1">
+                <a:shade val="50000"/>
+              </a:schemeClr>
+            </a:lnRef>
+            <a:fillRef idx="1">
+              <a:schemeClr val="dk1"/>
+            </a:fillRef>
+            <a:effectRef idx="0">
+              <a:schemeClr val="dk1"/>
+            </a:effectRef>
+            <a:fontRef idx="minor">
+              <a:schemeClr val="lt1"/>
+            </a:fontRef>
+          </p:style>
+          <p:txBody>
+            <a:bodyPr rtlCol="0" anchor="ctr"/>
+            <a:lstStyle/>
+            <a:p>
+              <a:pPr algn="ctr"/>
+              <a:endParaRPr lang="en-US"/>
+            </a:p>
+          </p:txBody>
+        </p:sp>
+      </p:grpSp>
+      <p:sp>
+        <p:nvSpPr>
+          <p:cNvPr id="36" name="Flowchart: Process 35"/>
+          <p:cNvSpPr/>
+          <p:nvPr/>
+        </p:nvSpPr>
+        <p:spPr>
+          <a:xfrm>
+            <a:off x="4159635" y="1648520"/>
+            <a:ext cx="686563" cy="326002"/>
+          </a:xfrm>
+          <a:prstGeom prst="flowChartProcess">
+            <a:avLst/>
+          </a:prstGeom>
+        </p:spPr>
+        <p:style>
+          <a:lnRef idx="1">
+            <a:schemeClr val="accent6"/>
+          </a:lnRef>
+          <a:fillRef idx="2">
+            <a:schemeClr val="accent6"/>
+          </a:fillRef>
+          <a:effectRef idx="1">
+            <a:schemeClr val="accent6"/>
+          </a:effectRef>
+          <a:fontRef idx="minor">
+            <a:schemeClr val="dk1"/>
+          </a:fontRef>
+        </p:style>
+        <p:txBody>
+          <a:bodyPr rtlCol="0" anchor="ctr"/>
+          <a:lstStyle/>
+          <a:p>
+            <a:pPr algn="ctr"/>
+            <a:r>
+              <a:rPr lang="en-US" sz="1200" dirty="0" smtClean="0"/>
+              <a:t>Boost Inverter</a:t>
+            </a:r>
+            <a:endParaRPr lang="en-US" sz="1200" dirty="0"/>
+          </a:p>
+        </p:txBody>
+      </p:sp>
+      <p:cxnSp>
+        <p:nvCxnSpPr>
+          <p:cNvPr id="37" name="Straight Connector 36"/>
+          <p:cNvCxnSpPr>
+            <a:endCxn id="36" idx="1"/>
+          </p:cNvCxnSpPr>
+          <p:nvPr/>
+        </p:nvCxnSpPr>
+        <p:spPr>
+          <a:xfrm>
+            <a:off x="4031813" y="1811521"/>
+            <a:ext cx="127822" cy="0"/>
+          </a:xfrm>
+          <a:prstGeom prst="line">
+            <a:avLst/>
+          </a:prstGeom>
+          <a:ln w="12700">
+            <a:solidFill>
+              <a:srgbClr val="996633"/>
+            </a:solidFill>
+            <a:headEnd type="none" w="sm" len="sm"/>
+            <a:tailEnd type="none" w="sm" len="sm"/>
+          </a:ln>
+        </p:spPr>
+        <p:style>
+          <a:lnRef idx="2">
+            <a:schemeClr val="accent4"/>
+          </a:lnRef>
+          <a:fillRef idx="0">
+            <a:schemeClr val="accent4"/>
+          </a:fillRef>
+          <a:effectRef idx="1">
+            <a:schemeClr val="accent4"/>
+          </a:effectRef>
+          <a:fontRef idx="minor">
+            <a:schemeClr val="tx1"/>
+          </a:fontRef>
+        </p:style>
+      </p:cxnSp>
+      <p:sp>
+        <p:nvSpPr>
+          <p:cNvPr id="38" name="Isosceles Triangle 37"/>
+          <p:cNvSpPr/>
+          <p:nvPr/>
+        </p:nvSpPr>
+        <p:spPr>
+          <a:xfrm rot="5400000" flipV="1">
+            <a:off x="4042693" y="1785676"/>
+            <a:ext cx="52759" cy="45719"/>
+          </a:xfrm>
+          <a:prstGeom prst="triangle">
+            <a:avLst/>
+          </a:prstGeom>
+          <a:ln>
+            <a:noFill/>
+          </a:ln>
+        </p:spPr>
+        <p:style>
+          <a:lnRef idx="2">
+            <a:schemeClr val="dk1">
+              <a:shade val="50000"/>
+            </a:schemeClr>
+          </a:lnRef>
+          <a:fillRef idx="1">
+            <a:schemeClr val="dk1"/>
+          </a:fillRef>
+          <a:effectRef idx="0">
+            <a:schemeClr val="dk1"/>
+          </a:effectRef>
+          <a:fontRef idx="minor">
+            <a:schemeClr val="lt1"/>
+          </a:fontRef>
+        </p:style>
+        <p:txBody>
+          <a:bodyPr rtlCol="0" anchor="ctr"/>
+          <a:lstStyle/>
+          <a:p>
+            <a:pPr algn="ctr"/>
+            <a:endParaRPr lang="en-US"/>
+          </a:p>
+        </p:txBody>
+      </p:sp>
+      <p:sp>
+        <p:nvSpPr>
+          <p:cNvPr id="39" name="Flowchart: Process 38"/>
+          <p:cNvSpPr/>
+          <p:nvPr/>
+        </p:nvSpPr>
+        <p:spPr>
+          <a:xfrm>
+            <a:off x="2870314" y="3787096"/>
+            <a:ext cx="1066800" cy="903635"/>
+          </a:xfrm>
+          <a:prstGeom prst="flowChartProcess">
+            <a:avLst/>
+          </a:prstGeom>
+        </p:spPr>
+        <p:style>
+          <a:lnRef idx="1">
+            <a:schemeClr val="accent1"/>
+          </a:lnRef>
+          <a:fillRef idx="2">
+            <a:schemeClr val="accent1"/>
+          </a:fillRef>
+          <a:effectRef idx="1">
+            <a:schemeClr val="accent1"/>
+          </a:effectRef>
+          <a:fontRef idx="minor">
+            <a:schemeClr val="dk1"/>
+          </a:fontRef>
+        </p:style>
+        <p:txBody>
+          <a:bodyPr rtlCol="0" anchor="ctr"/>
+          <a:lstStyle/>
+          <a:p>
+            <a:pPr algn="ctr"/>
+            <a:r>
+              <a:rPr lang="en-US" sz="1200" dirty="0" smtClean="0"/>
+              <a:t>Display </a:t>
+            </a:r>
+            <a:r>
+              <a:rPr lang="en-US" sz="1200" dirty="0" smtClean="0"/>
+              <a:t>Controller</a:t>
+            </a:r>
+            <a:endParaRPr lang="en-US" sz="1200" dirty="0"/>
+          </a:p>
+        </p:txBody>
+      </p:sp>
+      <p:sp>
+        <p:nvSpPr>
+          <p:cNvPr id="7" name="Flowchart: Process 6"/>
+          <p:cNvSpPr/>
+          <p:nvPr/>
+        </p:nvSpPr>
+        <p:spPr>
+          <a:xfrm>
+            <a:off x="2981913" y="1572735"/>
+            <a:ext cx="1049423" cy="865900"/>
+          </a:xfrm>
+          <a:prstGeom prst="flowChartProcess">
+            <a:avLst/>
+          </a:prstGeom>
+        </p:spPr>
+        <p:style>
+          <a:lnRef idx="1">
+            <a:schemeClr val="accent2"/>
+          </a:lnRef>
+          <a:fillRef idx="2">
+            <a:schemeClr val="accent2"/>
+          </a:fillRef>
+          <a:effectRef idx="1">
+            <a:schemeClr val="accent2"/>
+          </a:effectRef>
+          <a:fontRef idx="minor">
+            <a:schemeClr val="dk1"/>
+          </a:fontRef>
+        </p:style>
+        <p:txBody>
+          <a:bodyPr rtlCol="0" anchor="ctr"/>
+          <a:lstStyle/>
+          <a:p>
+            <a:pPr algn="ctr"/>
+            <a:r>
+              <a:rPr lang="en-US" sz="1200" dirty="0" smtClean="0"/>
+              <a:t>Display / Touchscreen</a:t>
+            </a:r>
+          </a:p>
+        </p:txBody>
+      </p:sp>
+      <p:sp>
+        <p:nvSpPr>
+          <p:cNvPr id="40" name="TextBox 39"/>
+          <p:cNvSpPr txBox="1"/>
+          <p:nvPr/>
+        </p:nvSpPr>
+        <p:spPr>
+          <a:xfrm>
+            <a:off x="4600612" y="1954091"/>
+            <a:ext cx="381000" cy="246221"/>
+          </a:xfrm>
+          <a:prstGeom prst="rect">
+            <a:avLst/>
+          </a:prstGeom>
+          <a:noFill/>
+        </p:spPr>
+        <p:txBody>
+          <a:bodyPr wrap="square" rtlCol="0">
+            <a:spAutoFit/>
+          </a:bodyPr>
+          <a:lstStyle/>
+          <a:p>
+            <a:r>
+              <a:rPr lang="en-US" sz="1000" dirty="0" smtClean="0"/>
+              <a:t>i2c</a:t>
+            </a:r>
+            <a:endParaRPr lang="en-US" sz="1000" dirty="0"/>
+          </a:p>
+        </p:txBody>
+      </p:sp>
+      <p:sp>
+        <p:nvSpPr>
+          <p:cNvPr id="45" name="Flowchart: Process 44"/>
+          <p:cNvSpPr/>
+          <p:nvPr/>
+        </p:nvSpPr>
+        <p:spPr>
+          <a:xfrm>
+            <a:off x="561607" y="5573591"/>
+            <a:ext cx="1587509" cy="723900"/>
+          </a:xfrm>
+          <a:prstGeom prst="flowChartProcess">
+            <a:avLst/>
+          </a:prstGeom>
+        </p:spPr>
+        <p:style>
+          <a:lnRef idx="1">
+            <a:schemeClr val="accent1"/>
+          </a:lnRef>
+          <a:fillRef idx="2">
+            <a:schemeClr val="accent1"/>
+          </a:fillRef>
+          <a:effectRef idx="1">
+            <a:schemeClr val="accent1"/>
+          </a:effectRef>
+          <a:fontRef idx="minor">
+            <a:schemeClr val="dk1"/>
+          </a:fontRef>
+        </p:style>
+        <p:txBody>
+          <a:bodyPr rtlCol="0" anchor="ctr"/>
+          <a:lstStyle/>
+          <a:p>
+            <a:pPr algn="ctr"/>
+            <a:r>
+              <a:rPr lang="en-US" sz="1200" dirty="0" smtClean="0"/>
+              <a:t>CPU</a:t>
+            </a:r>
+            <a:endParaRPr lang="en-US" sz="1200" dirty="0"/>
+          </a:p>
+        </p:txBody>
+      </p:sp>
+      <p:sp>
+        <p:nvSpPr>
+          <p:cNvPr id="49" name="TextBox 48"/>
+          <p:cNvSpPr txBox="1"/>
+          <p:nvPr/>
+        </p:nvSpPr>
+        <p:spPr>
+          <a:xfrm rot="16200000">
+            <a:off x="250225" y="2745380"/>
+            <a:ext cx="914400" cy="246221"/>
+          </a:xfrm>
+          <a:prstGeom prst="rect">
+            <a:avLst/>
+          </a:prstGeom>
+          <a:noFill/>
+        </p:spPr>
+        <p:txBody>
+          <a:bodyPr wrap="square" rtlCol="0">
+            <a:spAutoFit/>
+          </a:bodyPr>
+          <a:lstStyle/>
+          <a:p>
+            <a:r>
+              <a:rPr lang="en-US" sz="1000" dirty="0" smtClean="0">
+                <a:solidFill>
+                  <a:srgbClr val="00FF00"/>
+                </a:solidFill>
+                <a:effectLst>
+                  <a:outerShdw blurRad="38100" dist="38100" dir="2700000" algn="tl">
+                    <a:srgbClr val="000000">
+                      <a:alpha val="43137"/>
+                    </a:srgbClr>
+                  </a:outerShdw>
+                </a:effectLst>
+              </a:rPr>
+              <a:t>DQ0-DQ15</a:t>
+            </a:r>
+            <a:endParaRPr lang="en-US" sz="1000" dirty="0">
+              <a:solidFill>
+                <a:srgbClr val="00FF00"/>
+              </a:solidFill>
+              <a:effectLst>
+                <a:outerShdw blurRad="38100" dist="38100" dir="2700000" algn="tl">
+                  <a:srgbClr val="000000">
+                    <a:alpha val="43137"/>
+                  </a:srgbClr>
+                </a:outerShdw>
+              </a:effectLst>
+            </a:endParaRPr>
+          </a:p>
+        </p:txBody>
+      </p:sp>
+      <p:sp>
+        <p:nvSpPr>
+          <p:cNvPr id="53" name="Isosceles Triangle 52"/>
+          <p:cNvSpPr/>
+          <p:nvPr/>
+        </p:nvSpPr>
+        <p:spPr>
+          <a:xfrm rot="5400000">
+            <a:off x="2592475" y="1980346"/>
+            <a:ext cx="52759" cy="45719"/>
+          </a:xfrm>
+          <a:prstGeom prst="triangle">
+            <a:avLst/>
+          </a:prstGeom>
+          <a:ln>
+            <a:noFill/>
+          </a:ln>
+        </p:spPr>
+        <p:style>
+          <a:lnRef idx="2">
+            <a:schemeClr val="dk1">
+              <a:shade val="50000"/>
+            </a:schemeClr>
+          </a:lnRef>
+          <a:fillRef idx="1">
+            <a:schemeClr val="dk1"/>
+          </a:fillRef>
+          <a:effectRef idx="0">
+            <a:schemeClr val="dk1"/>
+          </a:effectRef>
+          <a:fontRef idx="minor">
+            <a:schemeClr val="lt1"/>
+          </a:fontRef>
+        </p:style>
+        <p:txBody>
+          <a:bodyPr rtlCol="0" anchor="ctr"/>
+          <a:lstStyle/>
+          <a:p>
+            <a:pPr algn="ctr"/>
+            <a:endParaRPr lang="en-US"/>
+          </a:p>
+        </p:txBody>
+      </p:sp>
+      <p:cxnSp>
+        <p:nvCxnSpPr>
+          <p:cNvPr id="56" name="Straight Connector 55"/>
+          <p:cNvCxnSpPr/>
+          <p:nvPr/>
+        </p:nvCxnSpPr>
+        <p:spPr>
+          <a:xfrm flipV="1">
+            <a:off x="1270114" y="4697291"/>
+            <a:ext cx="0" cy="876300"/>
+          </a:xfrm>
+          <a:prstGeom prst="line">
+            <a:avLst/>
+          </a:prstGeom>
+          <a:ln w="12700">
+            <a:solidFill>
+              <a:srgbClr val="FF0000"/>
+            </a:solidFill>
+            <a:headEnd type="none" w="sm" len="sm"/>
+            <a:tailEnd type="none" w="sm" len="sm"/>
+          </a:ln>
+        </p:spPr>
+        <p:style>
+          <a:lnRef idx="2">
+            <a:schemeClr val="accent4"/>
+          </a:lnRef>
+          <a:fillRef idx="0">
+            <a:schemeClr val="accent4"/>
+          </a:fillRef>
+          <a:effectRef idx="1">
+            <a:schemeClr val="accent4"/>
+          </a:effectRef>
+          <a:fontRef idx="minor">
+            <a:schemeClr val="tx1"/>
+          </a:fontRef>
+        </p:style>
+      </p:cxnSp>
+      <p:sp>
+        <p:nvSpPr>
+          <p:cNvPr id="57" name="TextBox 56"/>
+          <p:cNvSpPr txBox="1"/>
+          <p:nvPr/>
+        </p:nvSpPr>
+        <p:spPr>
+          <a:xfrm rot="16200000">
+            <a:off x="991809" y="5051796"/>
+            <a:ext cx="802831" cy="246221"/>
+          </a:xfrm>
+          <a:prstGeom prst="rect">
+            <a:avLst/>
+          </a:prstGeom>
+          <a:noFill/>
+        </p:spPr>
+        <p:txBody>
+          <a:bodyPr wrap="square" rtlCol="0">
+            <a:spAutoFit/>
+          </a:bodyPr>
+          <a:lstStyle/>
+          <a:p>
+            <a:r>
+              <a:rPr lang="en-US" sz="1000" dirty="0" smtClean="0">
+                <a:solidFill>
+                  <a:srgbClr val="CC99FF"/>
+                </a:solidFill>
+                <a:effectLst>
+                  <a:outerShdw blurRad="38100" dist="38100" dir="2700000" algn="tl">
+                    <a:srgbClr val="000000">
+                      <a:alpha val="43137"/>
+                    </a:srgbClr>
+                  </a:outerShdw>
+                </a:effectLst>
+              </a:rPr>
+              <a:t>#CS</a:t>
+            </a:r>
+            <a:endParaRPr lang="en-US" sz="1000" dirty="0">
+              <a:solidFill>
+                <a:srgbClr val="CC99FF"/>
+              </a:solidFill>
+              <a:effectLst>
+                <a:outerShdw blurRad="38100" dist="38100" dir="2700000" algn="tl">
+                  <a:srgbClr val="000000">
+                    <a:alpha val="43137"/>
+                  </a:srgbClr>
+                </a:outerShdw>
+              </a:effectLst>
+            </a:endParaRPr>
+          </a:p>
+        </p:txBody>
+      </p:sp>
+      <p:sp>
+        <p:nvSpPr>
+          <p:cNvPr id="62" name="TextBox 61"/>
+          <p:cNvSpPr txBox="1"/>
+          <p:nvPr/>
+        </p:nvSpPr>
+        <p:spPr>
+          <a:xfrm rot="16200000">
+            <a:off x="763209" y="5051796"/>
+            <a:ext cx="802831" cy="246221"/>
+          </a:xfrm>
+          <a:prstGeom prst="rect">
+            <a:avLst/>
+          </a:prstGeom>
+          <a:noFill/>
+        </p:spPr>
+        <p:txBody>
+          <a:bodyPr wrap="square" rtlCol="0">
+            <a:spAutoFit/>
+          </a:bodyPr>
+          <a:lstStyle/>
+          <a:p>
+            <a:r>
+              <a:rPr lang="en-US" sz="1000" dirty="0" smtClean="0">
+                <a:solidFill>
+                  <a:srgbClr val="FF0000"/>
+                </a:solidFill>
+                <a:effectLst>
+                  <a:outerShdw blurRad="38100" dist="38100" dir="2700000" algn="tl">
+                    <a:srgbClr val="000000">
+                      <a:alpha val="43137"/>
+                    </a:srgbClr>
+                  </a:outerShdw>
+                </a:effectLst>
+              </a:rPr>
+              <a:t>R/W</a:t>
+            </a:r>
+            <a:endParaRPr lang="en-US" sz="1000" dirty="0">
+              <a:solidFill>
+                <a:srgbClr val="FF0000"/>
+              </a:solidFill>
+              <a:effectLst>
+                <a:outerShdw blurRad="38100" dist="38100" dir="2700000" algn="tl">
+                  <a:srgbClr val="000000">
+                    <a:alpha val="43137"/>
+                  </a:srgbClr>
+                </a:outerShdw>
+              </a:effectLst>
+            </a:endParaRPr>
+          </a:p>
+        </p:txBody>
+      </p:sp>
+      <p:sp>
+        <p:nvSpPr>
+          <p:cNvPr id="67" name="Isosceles Triangle 66"/>
+          <p:cNvSpPr/>
+          <p:nvPr/>
+        </p:nvSpPr>
+        <p:spPr>
+          <a:xfrm>
+            <a:off x="1468257" y="5108772"/>
+            <a:ext cx="52759" cy="45719"/>
+          </a:xfrm>
+          <a:prstGeom prst="triangle">
+            <a:avLst/>
+          </a:prstGeom>
+          <a:ln>
+            <a:noFill/>
+          </a:ln>
+        </p:spPr>
+        <p:style>
+          <a:lnRef idx="2">
+            <a:schemeClr val="dk1">
+              <a:shade val="50000"/>
+            </a:schemeClr>
+          </a:lnRef>
+          <a:fillRef idx="1">
+            <a:schemeClr val="dk1"/>
+          </a:fillRef>
+          <a:effectRef idx="0">
+            <a:schemeClr val="dk1"/>
+          </a:effectRef>
+          <a:fontRef idx="minor">
+            <a:schemeClr val="lt1"/>
+          </a:fontRef>
+        </p:style>
+        <p:txBody>
+          <a:bodyPr rtlCol="0" anchor="ctr"/>
+          <a:lstStyle/>
+          <a:p>
+            <a:pPr algn="ctr"/>
+            <a:endParaRPr lang="en-US"/>
+          </a:p>
+        </p:txBody>
+      </p:sp>
+      <p:sp>
+        <p:nvSpPr>
+          <p:cNvPr id="14" name="Isosceles Triangle 13"/>
+          <p:cNvSpPr/>
+          <p:nvPr/>
+        </p:nvSpPr>
+        <p:spPr>
+          <a:xfrm>
+            <a:off x="1239053" y="5108772"/>
+            <a:ext cx="52759" cy="45719"/>
+          </a:xfrm>
+          <a:prstGeom prst="triangle">
+            <a:avLst/>
+          </a:prstGeom>
+          <a:ln>
+            <a:noFill/>
+          </a:ln>
+        </p:spPr>
+        <p:style>
+          <a:lnRef idx="2">
+            <a:schemeClr val="dk1">
+              <a:shade val="50000"/>
+            </a:schemeClr>
+          </a:lnRef>
+          <a:fillRef idx="1">
+            <a:schemeClr val="dk1"/>
+          </a:fillRef>
+          <a:effectRef idx="0">
+            <a:schemeClr val="dk1"/>
+          </a:effectRef>
+          <a:fontRef idx="minor">
+            <a:schemeClr val="lt1"/>
+          </a:fontRef>
+        </p:style>
+        <p:txBody>
+          <a:bodyPr rtlCol="0" anchor="ctr"/>
+          <a:lstStyle/>
+          <a:p>
+            <a:pPr algn="ctr"/>
+            <a:endParaRPr lang="en-US"/>
+          </a:p>
+        </p:txBody>
+      </p:sp>
+      <p:cxnSp>
+        <p:nvCxnSpPr>
+          <p:cNvPr id="68" name="Straight Connector 67"/>
+          <p:cNvCxnSpPr/>
+          <p:nvPr/>
+        </p:nvCxnSpPr>
+        <p:spPr>
+          <a:xfrm flipV="1">
+            <a:off x="1727314" y="4697291"/>
+            <a:ext cx="0" cy="879031"/>
+          </a:xfrm>
+          <a:prstGeom prst="line">
+            <a:avLst/>
+          </a:prstGeom>
+          <a:ln w="12700">
+            <a:solidFill>
+              <a:srgbClr val="FFFF00"/>
+            </a:solidFill>
+            <a:headEnd type="none" w="sm" len="sm"/>
+            <a:tailEnd type="none" w="sm" len="sm"/>
+          </a:ln>
+        </p:spPr>
+        <p:style>
+          <a:lnRef idx="2">
+            <a:schemeClr val="accent4"/>
+          </a:lnRef>
+          <a:fillRef idx="0">
+            <a:schemeClr val="accent4"/>
+          </a:fillRef>
+          <a:effectRef idx="1">
+            <a:schemeClr val="accent4"/>
+          </a:effectRef>
+          <a:fontRef idx="minor">
+            <a:schemeClr val="tx1"/>
+          </a:fontRef>
+        </p:style>
+      </p:cxnSp>
+      <p:sp>
+        <p:nvSpPr>
+          <p:cNvPr id="72" name="Isosceles Triangle 71"/>
+          <p:cNvSpPr/>
+          <p:nvPr/>
+        </p:nvSpPr>
+        <p:spPr>
+          <a:xfrm>
+            <a:off x="1696857" y="5108772"/>
+            <a:ext cx="52759" cy="45719"/>
+          </a:xfrm>
+          <a:prstGeom prst="triangle">
+            <a:avLst/>
+          </a:prstGeom>
+          <a:ln>
+            <a:noFill/>
+          </a:ln>
+        </p:spPr>
+        <p:style>
+          <a:lnRef idx="2">
+            <a:schemeClr val="dk1">
+              <a:shade val="50000"/>
+            </a:schemeClr>
+          </a:lnRef>
+          <a:fillRef idx="1">
+            <a:schemeClr val="dk1"/>
+          </a:fillRef>
+          <a:effectRef idx="0">
+            <a:schemeClr val="dk1"/>
+          </a:effectRef>
+          <a:fontRef idx="minor">
+            <a:schemeClr val="lt1"/>
+          </a:fontRef>
+        </p:style>
+        <p:txBody>
+          <a:bodyPr rtlCol="0" anchor="ctr"/>
+          <a:lstStyle/>
+          <a:p>
+            <a:pPr algn="ctr"/>
+            <a:endParaRPr lang="en-US"/>
+          </a:p>
+        </p:txBody>
+      </p:sp>
+      <p:sp>
+        <p:nvSpPr>
+          <p:cNvPr id="73" name="TextBox 72"/>
+          <p:cNvSpPr txBox="1"/>
+          <p:nvPr/>
+        </p:nvSpPr>
+        <p:spPr>
+          <a:xfrm rot="16200000">
+            <a:off x="1146389" y="4973417"/>
+            <a:ext cx="950872" cy="246221"/>
+          </a:xfrm>
+          <a:prstGeom prst="rect">
+            <a:avLst/>
+          </a:prstGeom>
+          <a:noFill/>
+        </p:spPr>
+        <p:txBody>
+          <a:bodyPr wrap="square" rtlCol="0">
+            <a:spAutoFit/>
+          </a:bodyPr>
+          <a:lstStyle/>
+          <a:p>
+            <a:r>
+              <a:rPr lang="en-US" sz="1000" dirty="0" err="1" smtClean="0">
+                <a:solidFill>
+                  <a:srgbClr val="FFFF00"/>
+                </a:solidFill>
+                <a:effectLst>
+                  <a:outerShdw blurRad="38100" dist="38100" dir="2700000" algn="tl">
+                    <a:srgbClr val="000000">
+                      <a:alpha val="43137"/>
+                    </a:srgbClr>
+                  </a:outerShdw>
+                </a:effectLst>
+              </a:rPr>
+              <a:t>Addr</a:t>
+            </a:r>
+            <a:r>
+              <a:rPr lang="en-US" sz="1000" dirty="0" smtClean="0">
+                <a:solidFill>
+                  <a:srgbClr val="FFFF00"/>
+                </a:solidFill>
+                <a:effectLst>
+                  <a:outerShdw blurRad="38100" dist="38100" dir="2700000" algn="tl">
+                    <a:srgbClr val="000000">
+                      <a:alpha val="43137"/>
+                    </a:srgbClr>
+                  </a:outerShdw>
+                </a:effectLst>
+              </a:rPr>
+              <a:t> (18b)</a:t>
+            </a:r>
+            <a:endParaRPr lang="en-US" sz="1000" dirty="0">
+              <a:solidFill>
+                <a:srgbClr val="FFFF00"/>
+              </a:solidFill>
+              <a:effectLst>
+                <a:outerShdw blurRad="38100" dist="38100" dir="2700000" algn="tl">
+                  <a:srgbClr val="000000">
+                    <a:alpha val="43137"/>
+                  </a:srgbClr>
+                </a:outerShdw>
+              </a:effectLst>
+            </a:endParaRPr>
+          </a:p>
+        </p:txBody>
+      </p:sp>
+      <p:cxnSp>
+        <p:nvCxnSpPr>
+          <p:cNvPr id="74" name="Straight Connector 73"/>
+          <p:cNvCxnSpPr/>
+          <p:nvPr/>
+        </p:nvCxnSpPr>
+        <p:spPr>
+          <a:xfrm flipV="1">
+            <a:off x="1498714" y="2441028"/>
+            <a:ext cx="0" cy="1352629"/>
+          </a:xfrm>
+          <a:prstGeom prst="line">
+            <a:avLst/>
+          </a:prstGeom>
+          <a:ln w="12700">
+            <a:solidFill>
+              <a:srgbClr val="CC99FF"/>
+            </a:solidFill>
+            <a:headEnd type="none" w="sm" len="sm"/>
+            <a:tailEnd type="none" w="sm" len="sm"/>
+          </a:ln>
+        </p:spPr>
+        <p:style>
+          <a:lnRef idx="2">
+            <a:schemeClr val="accent4"/>
+          </a:lnRef>
+          <a:fillRef idx="0">
+            <a:schemeClr val="accent4"/>
+          </a:fillRef>
+          <a:effectRef idx="1">
+            <a:schemeClr val="accent4"/>
+          </a:effectRef>
+          <a:fontRef idx="minor">
+            <a:schemeClr val="tx1"/>
+          </a:fontRef>
+        </p:style>
+      </p:cxnSp>
+      <p:cxnSp>
+        <p:nvCxnSpPr>
+          <p:cNvPr id="75" name="Straight Connector 74"/>
+          <p:cNvCxnSpPr/>
+          <p:nvPr/>
+        </p:nvCxnSpPr>
+        <p:spPr>
+          <a:xfrm flipV="1">
+            <a:off x="1270114" y="2441027"/>
+            <a:ext cx="0" cy="1352630"/>
+          </a:xfrm>
+          <a:prstGeom prst="line">
+            <a:avLst/>
+          </a:prstGeom>
+          <a:ln w="12700">
+            <a:solidFill>
+              <a:srgbClr val="FF0000"/>
+            </a:solidFill>
+            <a:headEnd type="none" w="sm" len="sm"/>
+            <a:tailEnd type="none" w="sm" len="sm"/>
+          </a:ln>
+        </p:spPr>
+        <p:style>
+          <a:lnRef idx="2">
+            <a:schemeClr val="accent4"/>
+          </a:lnRef>
+          <a:fillRef idx="0">
+            <a:schemeClr val="accent4"/>
+          </a:fillRef>
+          <a:effectRef idx="1">
+            <a:schemeClr val="accent4"/>
+          </a:effectRef>
+          <a:fontRef idx="minor">
+            <a:schemeClr val="tx1"/>
+          </a:fontRef>
+        </p:style>
+      </p:cxnSp>
+      <p:sp>
+        <p:nvSpPr>
+          <p:cNvPr id="76" name="TextBox 75"/>
+          <p:cNvSpPr txBox="1"/>
+          <p:nvPr/>
+        </p:nvSpPr>
+        <p:spPr>
+          <a:xfrm rot="16200000">
+            <a:off x="991809" y="2795532"/>
+            <a:ext cx="802831" cy="246221"/>
+          </a:xfrm>
+          <a:prstGeom prst="rect">
+            <a:avLst/>
+          </a:prstGeom>
+          <a:noFill/>
+        </p:spPr>
+        <p:txBody>
+          <a:bodyPr wrap="square" rtlCol="0">
+            <a:spAutoFit/>
+          </a:bodyPr>
+          <a:lstStyle/>
+          <a:p>
+            <a:r>
+              <a:rPr lang="en-US" sz="1000" dirty="0" smtClean="0">
+                <a:solidFill>
+                  <a:srgbClr val="CC99FF"/>
+                </a:solidFill>
+                <a:effectLst>
+                  <a:outerShdw blurRad="38100" dist="38100" dir="2700000" algn="tl">
+                    <a:srgbClr val="000000">
+                      <a:alpha val="43137"/>
+                    </a:srgbClr>
+                  </a:outerShdw>
+                </a:effectLst>
+              </a:rPr>
+              <a:t>#CS</a:t>
+            </a:r>
+            <a:endParaRPr lang="en-US" sz="1000" dirty="0">
+              <a:solidFill>
+                <a:srgbClr val="CC99FF"/>
+              </a:solidFill>
+              <a:effectLst>
+                <a:outerShdw blurRad="38100" dist="38100" dir="2700000" algn="tl">
+                  <a:srgbClr val="000000">
+                    <a:alpha val="43137"/>
+                  </a:srgbClr>
+                </a:outerShdw>
+              </a:effectLst>
+            </a:endParaRPr>
+          </a:p>
+        </p:txBody>
+      </p:sp>
+      <p:sp>
+        <p:nvSpPr>
+          <p:cNvPr id="77" name="TextBox 76"/>
+          <p:cNvSpPr txBox="1"/>
+          <p:nvPr/>
+        </p:nvSpPr>
+        <p:spPr>
+          <a:xfrm rot="16200000">
+            <a:off x="763209" y="2795532"/>
+            <a:ext cx="802831" cy="246221"/>
+          </a:xfrm>
+          <a:prstGeom prst="rect">
+            <a:avLst/>
+          </a:prstGeom>
+          <a:noFill/>
+        </p:spPr>
+        <p:txBody>
+          <a:bodyPr wrap="square" rtlCol="0">
+            <a:spAutoFit/>
+          </a:bodyPr>
+          <a:lstStyle/>
+          <a:p>
+            <a:r>
+              <a:rPr lang="en-US" sz="1000" dirty="0" smtClean="0">
+                <a:solidFill>
+                  <a:srgbClr val="FF0000"/>
+                </a:solidFill>
+                <a:effectLst>
+                  <a:outerShdw blurRad="38100" dist="38100" dir="2700000" algn="tl">
+                    <a:srgbClr val="000000">
+                      <a:alpha val="43137"/>
+                    </a:srgbClr>
+                  </a:outerShdw>
+                </a:effectLst>
+              </a:rPr>
+              <a:t>R/W</a:t>
+            </a:r>
+            <a:endParaRPr lang="en-US" sz="1000" dirty="0">
+              <a:solidFill>
+                <a:srgbClr val="FF0000"/>
+              </a:solidFill>
+              <a:effectLst>
+                <a:outerShdw blurRad="38100" dist="38100" dir="2700000" algn="tl">
+                  <a:srgbClr val="000000">
+                    <a:alpha val="43137"/>
+                  </a:srgbClr>
+                </a:outerShdw>
+              </a:effectLst>
+            </a:endParaRPr>
+          </a:p>
+        </p:txBody>
+      </p:sp>
+      <p:sp>
+        <p:nvSpPr>
+          <p:cNvPr id="78" name="Isosceles Triangle 77"/>
+          <p:cNvSpPr/>
+          <p:nvPr/>
+        </p:nvSpPr>
+        <p:spPr>
+          <a:xfrm>
+            <a:off x="1468257" y="2435453"/>
+            <a:ext cx="52759" cy="45719"/>
+          </a:xfrm>
+          <a:prstGeom prst="triangle">
+            <a:avLst/>
+          </a:prstGeom>
+          <a:ln>
+            <a:noFill/>
+          </a:ln>
+        </p:spPr>
+        <p:style>
+          <a:lnRef idx="2">
+            <a:schemeClr val="dk1">
+              <a:shade val="50000"/>
+            </a:schemeClr>
+          </a:lnRef>
+          <a:fillRef idx="1">
+            <a:schemeClr val="dk1"/>
+          </a:fillRef>
+          <a:effectRef idx="0">
+            <a:schemeClr val="dk1"/>
+          </a:effectRef>
+          <a:fontRef idx="minor">
+            <a:schemeClr val="lt1"/>
+          </a:fontRef>
+        </p:style>
+        <p:txBody>
+          <a:bodyPr rtlCol="0" anchor="ctr"/>
+          <a:lstStyle/>
+          <a:p>
+            <a:pPr algn="ctr"/>
+            <a:endParaRPr lang="en-US"/>
+          </a:p>
+        </p:txBody>
+      </p:sp>
+      <p:sp>
+        <p:nvSpPr>
+          <p:cNvPr id="79" name="Isosceles Triangle 78"/>
+          <p:cNvSpPr/>
+          <p:nvPr/>
+        </p:nvSpPr>
+        <p:spPr>
+          <a:xfrm>
+            <a:off x="1239053" y="2435453"/>
+            <a:ext cx="52759" cy="45719"/>
+          </a:xfrm>
+          <a:prstGeom prst="triangle">
+            <a:avLst/>
+          </a:prstGeom>
+          <a:ln>
+            <a:noFill/>
+          </a:ln>
+        </p:spPr>
+        <p:style>
+          <a:lnRef idx="2">
+            <a:schemeClr val="dk1">
+              <a:shade val="50000"/>
+            </a:schemeClr>
+          </a:lnRef>
+          <a:fillRef idx="1">
+            <a:schemeClr val="dk1"/>
+          </a:fillRef>
+          <a:effectRef idx="0">
+            <a:schemeClr val="dk1"/>
+          </a:effectRef>
+          <a:fontRef idx="minor">
+            <a:schemeClr val="lt1"/>
+          </a:fontRef>
+        </p:style>
+        <p:txBody>
+          <a:bodyPr rtlCol="0" anchor="ctr"/>
+          <a:lstStyle/>
+          <a:p>
+            <a:pPr algn="ctr"/>
+            <a:endParaRPr lang="en-US"/>
+          </a:p>
+        </p:txBody>
+      </p:sp>
+      <p:sp>
+        <p:nvSpPr>
+          <p:cNvPr id="84" name="Isosceles Triangle 83"/>
+          <p:cNvSpPr/>
+          <p:nvPr/>
+        </p:nvSpPr>
+        <p:spPr>
+          <a:xfrm>
+            <a:off x="1476412" y="3356172"/>
+            <a:ext cx="52759" cy="45719"/>
+          </a:xfrm>
+          <a:prstGeom prst="triangle">
+            <a:avLst/>
+          </a:prstGeom>
+          <a:ln>
+            <a:noFill/>
+          </a:ln>
+        </p:spPr>
+        <p:style>
+          <a:lnRef idx="2">
+            <a:schemeClr val="dk1">
+              <a:shade val="50000"/>
+            </a:schemeClr>
+          </a:lnRef>
+          <a:fillRef idx="1">
+            <a:schemeClr val="dk1"/>
+          </a:fillRef>
+          <a:effectRef idx="0">
+            <a:schemeClr val="dk1"/>
+          </a:effectRef>
+          <a:fontRef idx="minor">
+            <a:schemeClr val="lt1"/>
+          </a:fontRef>
+        </p:style>
+        <p:txBody>
+          <a:bodyPr rtlCol="0" anchor="ctr"/>
+          <a:lstStyle/>
+          <a:p>
+            <a:pPr algn="ctr"/>
+            <a:endParaRPr lang="en-US"/>
+          </a:p>
+        </p:txBody>
+      </p:sp>
+      <p:sp>
+        <p:nvSpPr>
+          <p:cNvPr id="85" name="Isosceles Triangle 84"/>
+          <p:cNvSpPr/>
+          <p:nvPr/>
+        </p:nvSpPr>
+        <p:spPr>
+          <a:xfrm>
+            <a:off x="1240378" y="3356172"/>
+            <a:ext cx="52759" cy="45719"/>
+          </a:xfrm>
+          <a:prstGeom prst="triangle">
+            <a:avLst/>
+          </a:prstGeom>
+          <a:ln>
+            <a:noFill/>
+          </a:ln>
+        </p:spPr>
+        <p:style>
+          <a:lnRef idx="2">
+            <a:schemeClr val="dk1">
+              <a:shade val="50000"/>
+            </a:schemeClr>
+          </a:lnRef>
+          <a:fillRef idx="1">
+            <a:schemeClr val="dk1"/>
+          </a:fillRef>
+          <a:effectRef idx="0">
+            <a:schemeClr val="dk1"/>
+          </a:effectRef>
+          <a:fontRef idx="minor">
+            <a:schemeClr val="lt1"/>
+          </a:fontRef>
+        </p:style>
+        <p:txBody>
+          <a:bodyPr rtlCol="0" anchor="ctr"/>
+          <a:lstStyle/>
+          <a:p>
+            <a:pPr algn="ctr"/>
+            <a:endParaRPr lang="en-US"/>
+          </a:p>
+        </p:txBody>
+      </p:sp>
+      <p:cxnSp>
+        <p:nvCxnSpPr>
+          <p:cNvPr id="86" name="Straight Connector 85"/>
+          <p:cNvCxnSpPr/>
+          <p:nvPr/>
+        </p:nvCxnSpPr>
+        <p:spPr>
+          <a:xfrm flipH="1">
+            <a:off x="2108314" y="3935291"/>
+            <a:ext cx="762001" cy="0"/>
+          </a:xfrm>
+          <a:prstGeom prst="line">
+            <a:avLst/>
+          </a:prstGeom>
+          <a:ln w="12700">
+            <a:solidFill>
+              <a:srgbClr val="00FF00"/>
+            </a:solidFill>
+            <a:headEnd type="none" w="sm" len="sm"/>
+            <a:tailEnd type="none" w="sm" len="sm"/>
+          </a:ln>
+        </p:spPr>
+        <p:style>
+          <a:lnRef idx="2">
+            <a:schemeClr val="accent4"/>
+          </a:lnRef>
+          <a:fillRef idx="0">
+            <a:schemeClr val="accent4"/>
+          </a:fillRef>
+          <a:effectRef idx="1">
+            <a:schemeClr val="accent4"/>
+          </a:effectRef>
+          <a:fontRef idx="minor">
+            <a:schemeClr val="tx1"/>
+          </a:fontRef>
+        </p:style>
+      </p:cxnSp>
+      <p:cxnSp>
+        <p:nvCxnSpPr>
+          <p:cNvPr id="88" name="Straight Connector 87"/>
+          <p:cNvCxnSpPr/>
+          <p:nvPr/>
+        </p:nvCxnSpPr>
+        <p:spPr>
+          <a:xfrm>
+            <a:off x="2108314" y="4087691"/>
+            <a:ext cx="762001" cy="0"/>
+          </a:xfrm>
+          <a:prstGeom prst="line">
+            <a:avLst/>
+          </a:prstGeom>
+          <a:ln w="12700">
+            <a:solidFill>
+              <a:srgbClr val="FF0000"/>
+            </a:solidFill>
+            <a:headEnd type="none" w="sm" len="sm"/>
+            <a:tailEnd type="none" w="sm" len="sm"/>
+          </a:ln>
+        </p:spPr>
+        <p:style>
+          <a:lnRef idx="2">
+            <a:schemeClr val="accent4"/>
+          </a:lnRef>
+          <a:fillRef idx="0">
+            <a:schemeClr val="accent4"/>
+          </a:fillRef>
+          <a:effectRef idx="1">
+            <a:schemeClr val="accent4"/>
+          </a:effectRef>
+          <a:fontRef idx="minor">
+            <a:schemeClr val="tx1"/>
+          </a:fontRef>
+        </p:style>
+      </p:cxnSp>
+      <p:sp>
+        <p:nvSpPr>
+          <p:cNvPr id="91" name="Isosceles Triangle 90"/>
+          <p:cNvSpPr/>
+          <p:nvPr/>
+        </p:nvSpPr>
+        <p:spPr>
+          <a:xfrm rot="5400000">
+            <a:off x="2485794" y="4068909"/>
+            <a:ext cx="52759" cy="45719"/>
+          </a:xfrm>
+          <a:prstGeom prst="triangle">
+            <a:avLst/>
+          </a:prstGeom>
+          <a:ln>
+            <a:noFill/>
+          </a:ln>
+        </p:spPr>
+        <p:style>
+          <a:lnRef idx="2">
+            <a:schemeClr val="dk1">
+              <a:shade val="50000"/>
+            </a:schemeClr>
+          </a:lnRef>
+          <a:fillRef idx="1">
+            <a:schemeClr val="dk1"/>
+          </a:fillRef>
+          <a:effectRef idx="0">
+            <a:schemeClr val="dk1"/>
+          </a:effectRef>
+          <a:fontRef idx="minor">
+            <a:schemeClr val="lt1"/>
+          </a:fontRef>
+        </p:style>
+        <p:txBody>
+          <a:bodyPr rtlCol="0" anchor="ctr"/>
+          <a:lstStyle/>
+          <a:p>
+            <a:pPr algn="ctr"/>
+            <a:endParaRPr lang="en-US"/>
+          </a:p>
+        </p:txBody>
+      </p:sp>
+      <p:sp>
+        <p:nvSpPr>
+          <p:cNvPr id="92" name="Isosceles Triangle 91"/>
+          <p:cNvSpPr/>
+          <p:nvPr/>
+        </p:nvSpPr>
+        <p:spPr>
+          <a:xfrm rot="5400000" flipV="1">
+            <a:off x="2485794" y="3910214"/>
+            <a:ext cx="52759" cy="45719"/>
+          </a:xfrm>
+          <a:prstGeom prst="triangle">
+            <a:avLst/>
+          </a:prstGeom>
+          <a:ln>
+            <a:noFill/>
+          </a:ln>
+        </p:spPr>
+        <p:style>
+          <a:lnRef idx="2">
+            <a:schemeClr val="dk1">
+              <a:shade val="50000"/>
+            </a:schemeClr>
+          </a:lnRef>
+          <a:fillRef idx="1">
+            <a:schemeClr val="dk1"/>
+          </a:fillRef>
+          <a:effectRef idx="0">
+            <a:schemeClr val="dk1"/>
+          </a:effectRef>
+          <a:fontRef idx="minor">
+            <a:schemeClr val="lt1"/>
+          </a:fontRef>
+        </p:style>
+        <p:txBody>
+          <a:bodyPr rtlCol="0" anchor="ctr"/>
+          <a:lstStyle/>
+          <a:p>
+            <a:pPr algn="ctr"/>
+            <a:endParaRPr lang="en-US"/>
+          </a:p>
+        </p:txBody>
+      </p:sp>
+      <p:sp>
+        <p:nvSpPr>
+          <p:cNvPr id="93" name="TextBox 92"/>
+          <p:cNvSpPr txBox="1"/>
+          <p:nvPr/>
+        </p:nvSpPr>
+        <p:spPr>
+          <a:xfrm>
+            <a:off x="2108314" y="3685310"/>
+            <a:ext cx="914400" cy="246221"/>
+          </a:xfrm>
+          <a:prstGeom prst="rect">
+            <a:avLst/>
+          </a:prstGeom>
+          <a:noFill/>
+        </p:spPr>
+        <p:txBody>
+          <a:bodyPr wrap="square" rtlCol="0">
+            <a:spAutoFit/>
+          </a:bodyPr>
+          <a:lstStyle/>
+          <a:p>
+            <a:r>
+              <a:rPr lang="en-US" sz="1000" dirty="0" smtClean="0">
+                <a:solidFill>
+                  <a:srgbClr val="00FF00"/>
+                </a:solidFill>
+                <a:effectLst>
+                  <a:outerShdw blurRad="38100" dist="38100" dir="2700000" algn="tl">
+                    <a:srgbClr val="000000">
+                      <a:alpha val="43137"/>
+                    </a:srgbClr>
+                  </a:outerShdw>
+                </a:effectLst>
+              </a:rPr>
+              <a:t>Serial</a:t>
+            </a:r>
+            <a:endParaRPr lang="en-US" sz="1000" dirty="0">
+              <a:solidFill>
+                <a:srgbClr val="00FF00"/>
+              </a:solidFill>
+              <a:effectLst>
+                <a:outerShdw blurRad="38100" dist="38100" dir="2700000" algn="tl">
+                  <a:srgbClr val="000000">
+                    <a:alpha val="43137"/>
+                  </a:srgbClr>
+                </a:outerShdw>
+              </a:effectLst>
+            </a:endParaRPr>
+          </a:p>
+        </p:txBody>
+      </p:sp>
+      <p:sp>
+        <p:nvSpPr>
+          <p:cNvPr id="94" name="TextBox 93"/>
+          <p:cNvSpPr txBox="1"/>
+          <p:nvPr/>
+        </p:nvSpPr>
+        <p:spPr>
+          <a:xfrm>
+            <a:off x="2108314" y="4091768"/>
+            <a:ext cx="914400" cy="246221"/>
+          </a:xfrm>
+          <a:prstGeom prst="rect">
+            <a:avLst/>
+          </a:prstGeom>
+          <a:noFill/>
+        </p:spPr>
+        <p:txBody>
+          <a:bodyPr wrap="square" rtlCol="0">
+            <a:spAutoFit/>
+          </a:bodyPr>
+          <a:lstStyle/>
+          <a:p>
+            <a:r>
+              <a:rPr lang="en-US" sz="1000" dirty="0" err="1" smtClean="0">
+                <a:solidFill>
+                  <a:srgbClr val="FF0000"/>
+                </a:solidFill>
+                <a:effectLst>
+                  <a:outerShdw blurRad="38100" dist="38100" dir="2700000" algn="tl">
+                    <a:srgbClr val="000000">
+                      <a:alpha val="43137"/>
+                    </a:srgbClr>
+                  </a:outerShdw>
+                </a:effectLst>
+              </a:rPr>
+              <a:t>Ack</a:t>
+            </a:r>
+            <a:endParaRPr lang="en-US" sz="1000" dirty="0">
+              <a:solidFill>
+                <a:srgbClr val="FF0000"/>
+              </a:solidFill>
+              <a:effectLst>
+                <a:outerShdw blurRad="38100" dist="38100" dir="2700000" algn="tl">
+                  <a:srgbClr val="000000">
+                    <a:alpha val="43137"/>
+                  </a:srgbClr>
+                </a:outerShdw>
+              </a:effectLst>
+            </a:endParaRPr>
+          </a:p>
+        </p:txBody>
+      </p:sp>
+      <p:cxnSp>
+        <p:nvCxnSpPr>
+          <p:cNvPr id="95" name="Straight Connector 94"/>
+          <p:cNvCxnSpPr/>
+          <p:nvPr/>
+        </p:nvCxnSpPr>
+        <p:spPr>
+          <a:xfrm flipV="1">
+            <a:off x="1955914" y="4697291"/>
+            <a:ext cx="0" cy="879384"/>
+          </a:xfrm>
+          <a:prstGeom prst="line">
+            <a:avLst/>
+          </a:prstGeom>
+          <a:ln w="12700">
+            <a:solidFill>
+              <a:srgbClr val="FF0000"/>
+            </a:solidFill>
+            <a:headEnd type="none" w="sm" len="sm"/>
+            <a:tailEnd type="none" w="sm" len="sm"/>
+          </a:ln>
+        </p:spPr>
+        <p:style>
+          <a:lnRef idx="2">
+            <a:schemeClr val="accent4"/>
+          </a:lnRef>
+          <a:fillRef idx="0">
+            <a:schemeClr val="accent4"/>
+          </a:fillRef>
+          <a:effectRef idx="1">
+            <a:schemeClr val="accent4"/>
+          </a:effectRef>
+          <a:fontRef idx="minor">
+            <a:schemeClr val="tx1"/>
+          </a:fontRef>
+        </p:style>
+      </p:cxnSp>
+      <p:cxnSp>
+        <p:nvCxnSpPr>
+          <p:cNvPr id="97" name="Straight Connector 96"/>
+          <p:cNvCxnSpPr/>
+          <p:nvPr/>
+        </p:nvCxnSpPr>
+        <p:spPr>
+          <a:xfrm flipH="1">
+            <a:off x="1955914" y="4849691"/>
+            <a:ext cx="1066800" cy="0"/>
+          </a:xfrm>
+          <a:prstGeom prst="line">
+            <a:avLst/>
+          </a:prstGeom>
+          <a:ln w="12700">
+            <a:solidFill>
+              <a:srgbClr val="FF0000"/>
+            </a:solidFill>
+            <a:headEnd type="none" w="sm" len="sm"/>
+            <a:tailEnd type="none" w="sm" len="sm"/>
+          </a:ln>
+        </p:spPr>
+        <p:style>
+          <a:lnRef idx="2">
+            <a:schemeClr val="accent4"/>
+          </a:lnRef>
+          <a:fillRef idx="0">
+            <a:schemeClr val="accent4"/>
+          </a:fillRef>
+          <a:effectRef idx="1">
+            <a:schemeClr val="accent4"/>
+          </a:effectRef>
+          <a:fontRef idx="minor">
+            <a:schemeClr val="tx1"/>
+          </a:fontRef>
+        </p:style>
+      </p:cxnSp>
+      <p:cxnSp>
+        <p:nvCxnSpPr>
+          <p:cNvPr id="100" name="Straight Connector 99"/>
+          <p:cNvCxnSpPr/>
+          <p:nvPr/>
+        </p:nvCxnSpPr>
+        <p:spPr>
+          <a:xfrm flipV="1">
+            <a:off x="3022714" y="4703956"/>
+            <a:ext cx="0" cy="145735"/>
+          </a:xfrm>
+          <a:prstGeom prst="line">
+            <a:avLst/>
+          </a:prstGeom>
+          <a:ln w="12700">
+            <a:solidFill>
+              <a:srgbClr val="FF0000"/>
+            </a:solidFill>
+            <a:headEnd type="none" w="sm" len="sm"/>
+            <a:tailEnd type="none" w="sm" len="sm"/>
+          </a:ln>
+        </p:spPr>
+        <p:style>
+          <a:lnRef idx="2">
+            <a:schemeClr val="accent4"/>
+          </a:lnRef>
+          <a:fillRef idx="0">
+            <a:schemeClr val="accent4"/>
+          </a:fillRef>
+          <a:effectRef idx="1">
+            <a:schemeClr val="accent4"/>
+          </a:effectRef>
+          <a:fontRef idx="minor">
+            <a:schemeClr val="tx1"/>
+          </a:fontRef>
+        </p:style>
+      </p:cxnSp>
+      <p:sp>
+        <p:nvSpPr>
+          <p:cNvPr id="102" name="Isosceles Triangle 101"/>
+          <p:cNvSpPr/>
+          <p:nvPr/>
+        </p:nvSpPr>
+        <p:spPr>
+          <a:xfrm>
+            <a:off x="1925457" y="5108772"/>
+            <a:ext cx="52759" cy="45719"/>
+          </a:xfrm>
+          <a:prstGeom prst="triangle">
+            <a:avLst/>
+          </a:prstGeom>
+          <a:ln>
+            <a:noFill/>
+          </a:ln>
+        </p:spPr>
+        <p:style>
+          <a:lnRef idx="2">
+            <a:schemeClr val="dk1">
+              <a:shade val="50000"/>
+            </a:schemeClr>
+          </a:lnRef>
+          <a:fillRef idx="1">
+            <a:schemeClr val="dk1"/>
+          </a:fillRef>
+          <a:effectRef idx="0">
+            <a:schemeClr val="dk1"/>
+          </a:effectRef>
+          <a:fontRef idx="minor">
+            <a:schemeClr val="lt1"/>
+          </a:fontRef>
+        </p:style>
+        <p:txBody>
+          <a:bodyPr rtlCol="0" anchor="ctr"/>
+          <a:lstStyle/>
+          <a:p>
+            <a:pPr algn="ctr"/>
+            <a:endParaRPr lang="en-US"/>
+          </a:p>
+        </p:txBody>
+      </p:sp>
+      <p:sp>
+        <p:nvSpPr>
+          <p:cNvPr id="103" name="TextBox 102"/>
+          <p:cNvSpPr txBox="1"/>
+          <p:nvPr/>
+        </p:nvSpPr>
+        <p:spPr>
+          <a:xfrm rot="16200000">
+            <a:off x="1431388" y="5051796"/>
+            <a:ext cx="802831" cy="246221"/>
+          </a:xfrm>
+          <a:prstGeom prst="rect">
+            <a:avLst/>
+          </a:prstGeom>
+          <a:noFill/>
+        </p:spPr>
+        <p:txBody>
+          <a:bodyPr wrap="square" rtlCol="0">
+            <a:spAutoFit/>
+          </a:bodyPr>
+          <a:lstStyle/>
+          <a:p>
+            <a:r>
+              <a:rPr lang="en-US" sz="1000" dirty="0" smtClean="0">
+                <a:solidFill>
+                  <a:srgbClr val="FF0000"/>
+                </a:solidFill>
+                <a:effectLst>
+                  <a:outerShdw blurRad="38100" dist="38100" dir="2700000" algn="tl">
+                    <a:srgbClr val="000000">
+                      <a:alpha val="43137"/>
+                    </a:srgbClr>
+                  </a:outerShdw>
+                </a:effectLst>
+              </a:rPr>
+              <a:t>Reset</a:t>
+            </a:r>
+            <a:endParaRPr lang="en-US" sz="1000" dirty="0">
+              <a:solidFill>
+                <a:srgbClr val="FF0000"/>
+              </a:solidFill>
+              <a:effectLst>
+                <a:outerShdw blurRad="38100" dist="38100" dir="2700000" algn="tl">
+                  <a:srgbClr val="000000">
+                    <a:alpha val="43137"/>
+                  </a:srgbClr>
+                </a:outerShdw>
+              </a:effectLst>
+            </a:endParaRPr>
+          </a:p>
+        </p:txBody>
+      </p:sp>
+      <p:sp>
+        <p:nvSpPr>
+          <p:cNvPr id="104" name="Isosceles Triangle 103"/>
+          <p:cNvSpPr/>
+          <p:nvPr/>
+        </p:nvSpPr>
+        <p:spPr>
+          <a:xfrm rot="5400000">
+            <a:off x="2485794" y="4822754"/>
+            <a:ext cx="52759" cy="45719"/>
+          </a:xfrm>
+          <a:prstGeom prst="triangle">
+            <a:avLst/>
+          </a:prstGeom>
+          <a:ln>
+            <a:noFill/>
+          </a:ln>
+        </p:spPr>
+        <p:style>
+          <a:lnRef idx="2">
+            <a:schemeClr val="dk1">
+              <a:shade val="50000"/>
+            </a:schemeClr>
+          </a:lnRef>
+          <a:fillRef idx="1">
+            <a:schemeClr val="dk1"/>
+          </a:fillRef>
+          <a:effectRef idx="0">
+            <a:schemeClr val="dk1"/>
+          </a:effectRef>
+          <a:fontRef idx="minor">
+            <a:schemeClr val="lt1"/>
+          </a:fontRef>
+        </p:style>
+        <p:txBody>
+          <a:bodyPr rtlCol="0" anchor="ctr"/>
+          <a:lstStyle/>
+          <a:p>
+            <a:pPr algn="ctr"/>
+            <a:endParaRPr lang="en-US"/>
+          </a:p>
+        </p:txBody>
+      </p:sp>
+      <p:cxnSp>
+        <p:nvCxnSpPr>
+          <p:cNvPr id="113" name="Straight Connector 112"/>
+          <p:cNvCxnSpPr/>
+          <p:nvPr/>
+        </p:nvCxnSpPr>
+        <p:spPr>
+          <a:xfrm flipV="1">
+            <a:off x="812914" y="2432679"/>
+            <a:ext cx="0" cy="3139285"/>
+          </a:xfrm>
+          <a:prstGeom prst="line">
+            <a:avLst/>
+          </a:prstGeom>
+          <a:ln w="12700">
+            <a:solidFill>
+              <a:srgbClr val="00FF00"/>
+            </a:solidFill>
+            <a:headEnd type="none" w="sm" len="sm"/>
+            <a:tailEnd type="none" w="sm" len="sm"/>
+          </a:ln>
+        </p:spPr>
+        <p:style>
+          <a:lnRef idx="2">
+            <a:schemeClr val="accent4"/>
+          </a:lnRef>
+          <a:fillRef idx="0">
+            <a:schemeClr val="accent4"/>
+          </a:fillRef>
+          <a:effectRef idx="1">
+            <a:schemeClr val="accent4"/>
+          </a:effectRef>
+          <a:fontRef idx="minor">
+            <a:schemeClr val="tx1"/>
+          </a:fontRef>
+        </p:style>
+      </p:cxnSp>
+      <p:grpSp>
+        <p:nvGrpSpPr>
+          <p:cNvPr id="118" name="Group 117"/>
+          <p:cNvGrpSpPr/>
+          <p:nvPr/>
+        </p:nvGrpSpPr>
+        <p:grpSpPr>
+          <a:xfrm>
+            <a:off x="782834" y="2428019"/>
+            <a:ext cx="52759" cy="101370"/>
+            <a:chOff x="985428" y="2723692"/>
+            <a:chExt cx="52759" cy="101370"/>
+          </a:xfrm>
+        </p:grpSpPr>
+        <p:sp>
+          <p:nvSpPr>
+            <p:cNvPr id="119" name="Isosceles Triangle 118"/>
+            <p:cNvSpPr/>
+            <p:nvPr/>
+          </p:nvSpPr>
+          <p:spPr>
+            <a:xfrm>
+              <a:off x="985428" y="2723692"/>
+              <a:ext cx="52759" cy="45719"/>
+            </a:xfrm>
+            <a:prstGeom prst="triangle">
+              <a:avLst/>
+            </a:prstGeom>
+            <a:ln>
+              <a:noFill/>
+            </a:ln>
+          </p:spPr>
+          <p:style>
+            <a:lnRef idx="2">
+              <a:schemeClr val="dk1">
+                <a:shade val="50000"/>
+              </a:schemeClr>
+            </a:lnRef>
+            <a:fillRef idx="1">
+              <a:schemeClr val="dk1"/>
+            </a:fillRef>
+            <a:effectRef idx="0">
+              <a:schemeClr val="dk1"/>
+            </a:effectRef>
+            <a:fontRef idx="minor">
+              <a:schemeClr val="lt1"/>
+            </a:fontRef>
+          </p:style>
+          <p:txBody>
+            <a:bodyPr rtlCol="0" anchor="ctr"/>
+            <a:lstStyle/>
+            <a:p>
+              <a:pPr algn="ctr"/>
+              <a:endParaRPr lang="en-US"/>
+            </a:p>
+          </p:txBody>
+        </p:sp>
+        <p:sp>
+          <p:nvSpPr>
+            <p:cNvPr id="120" name="Isosceles Triangle 119"/>
+            <p:cNvSpPr/>
+            <p:nvPr/>
+          </p:nvSpPr>
+          <p:spPr>
+            <a:xfrm flipV="1">
+              <a:off x="985428" y="2779343"/>
+              <a:ext cx="52759" cy="45719"/>
+            </a:xfrm>
+            <a:prstGeom prst="triangle">
+              <a:avLst/>
+            </a:prstGeom>
+            <a:ln>
+              <a:noFill/>
+            </a:ln>
+          </p:spPr>
+          <p:style>
+            <a:lnRef idx="2">
+              <a:schemeClr val="dk1">
+                <a:shade val="50000"/>
+              </a:schemeClr>
+            </a:lnRef>
+            <a:fillRef idx="1">
+              <a:schemeClr val="dk1"/>
+            </a:fillRef>
+            <a:effectRef idx="0">
+              <a:schemeClr val="dk1"/>
+            </a:effectRef>
+            <a:fontRef idx="minor">
+              <a:schemeClr val="lt1"/>
+            </a:fontRef>
+          </p:style>
+          <p:txBody>
+            <a:bodyPr rtlCol="0" anchor="ctr"/>
+            <a:lstStyle/>
+            <a:p>
+              <a:pPr algn="ctr"/>
+              <a:endParaRPr lang="en-US"/>
+            </a:p>
+          </p:txBody>
+        </p:sp>
+      </p:grpSp>
+      <p:grpSp>
+        <p:nvGrpSpPr>
+          <p:cNvPr id="124" name="Group 123"/>
+          <p:cNvGrpSpPr/>
+          <p:nvPr/>
+        </p:nvGrpSpPr>
+        <p:grpSpPr>
+          <a:xfrm>
+            <a:off x="775744" y="3325691"/>
+            <a:ext cx="52759" cy="101370"/>
+            <a:chOff x="985428" y="2723692"/>
+            <a:chExt cx="52759" cy="101370"/>
+          </a:xfrm>
+        </p:grpSpPr>
+        <p:sp>
+          <p:nvSpPr>
+            <p:cNvPr id="125" name="Isosceles Triangle 124"/>
+            <p:cNvSpPr/>
+            <p:nvPr/>
+          </p:nvSpPr>
+          <p:spPr>
+            <a:xfrm>
+              <a:off x="985428" y="2723692"/>
+              <a:ext cx="52759" cy="45719"/>
+            </a:xfrm>
+            <a:prstGeom prst="triangle">
+              <a:avLst/>
+            </a:prstGeom>
+            <a:ln>
+              <a:noFill/>
+            </a:ln>
+          </p:spPr>
+          <p:style>
+            <a:lnRef idx="2">
+              <a:schemeClr val="dk1">
+                <a:shade val="50000"/>
+              </a:schemeClr>
+            </a:lnRef>
+            <a:fillRef idx="1">
+              <a:schemeClr val="dk1"/>
+            </a:fillRef>
+            <a:effectRef idx="0">
+              <a:schemeClr val="dk1"/>
+            </a:effectRef>
+            <a:fontRef idx="minor">
+              <a:schemeClr val="lt1"/>
+            </a:fontRef>
+          </p:style>
+          <p:txBody>
+            <a:bodyPr rtlCol="0" anchor="ctr"/>
+            <a:lstStyle/>
+            <a:p>
+              <a:pPr algn="ctr"/>
+              <a:endParaRPr lang="en-US"/>
+            </a:p>
+          </p:txBody>
+        </p:sp>
+        <p:sp>
+          <p:nvSpPr>
+            <p:cNvPr id="126" name="Isosceles Triangle 125"/>
+            <p:cNvSpPr/>
+            <p:nvPr/>
+          </p:nvSpPr>
+          <p:spPr>
+            <a:xfrm flipV="1">
+              <a:off x="985428" y="2779343"/>
+              <a:ext cx="52759" cy="45719"/>
+            </a:xfrm>
+            <a:prstGeom prst="triangle">
+              <a:avLst/>
+            </a:prstGeom>
+            <a:ln>
+              <a:noFill/>
+            </a:ln>
+          </p:spPr>
+          <p:style>
+            <a:lnRef idx="2">
+              <a:schemeClr val="dk1">
+                <a:shade val="50000"/>
+              </a:schemeClr>
+            </a:lnRef>
+            <a:fillRef idx="1">
+              <a:schemeClr val="dk1"/>
+            </a:fillRef>
+            <a:effectRef idx="0">
+              <a:schemeClr val="dk1"/>
+            </a:effectRef>
+            <a:fontRef idx="minor">
+              <a:schemeClr val="lt1"/>
+            </a:fontRef>
+          </p:style>
+          <p:txBody>
+            <a:bodyPr rtlCol="0" anchor="ctr"/>
+            <a:lstStyle/>
+            <a:p>
+              <a:pPr algn="ctr"/>
+              <a:endParaRPr lang="en-US"/>
+            </a:p>
+          </p:txBody>
+        </p:sp>
+      </p:grpSp>
+      <p:grpSp>
+        <p:nvGrpSpPr>
+          <p:cNvPr id="127" name="Group 126"/>
+          <p:cNvGrpSpPr/>
+          <p:nvPr/>
+        </p:nvGrpSpPr>
+        <p:grpSpPr>
+          <a:xfrm>
+            <a:off x="775744" y="5474159"/>
+            <a:ext cx="52759" cy="101370"/>
+            <a:chOff x="985428" y="2723692"/>
+            <a:chExt cx="52759" cy="101370"/>
+          </a:xfrm>
+        </p:grpSpPr>
+        <p:sp>
+          <p:nvSpPr>
+            <p:cNvPr id="128" name="Isosceles Triangle 127"/>
+            <p:cNvSpPr/>
+            <p:nvPr/>
+          </p:nvSpPr>
+          <p:spPr>
+            <a:xfrm>
+              <a:off x="985428" y="2723692"/>
+              <a:ext cx="52759" cy="45719"/>
+            </a:xfrm>
+            <a:prstGeom prst="triangle">
+              <a:avLst/>
+            </a:prstGeom>
+            <a:ln>
+              <a:noFill/>
+            </a:ln>
+          </p:spPr>
+          <p:style>
+            <a:lnRef idx="2">
+              <a:schemeClr val="dk1">
+                <a:shade val="50000"/>
+              </a:schemeClr>
+            </a:lnRef>
+            <a:fillRef idx="1">
+              <a:schemeClr val="dk1"/>
+            </a:fillRef>
+            <a:effectRef idx="0">
+              <a:schemeClr val="dk1"/>
+            </a:effectRef>
+            <a:fontRef idx="minor">
+              <a:schemeClr val="lt1"/>
+            </a:fontRef>
+          </p:style>
+          <p:txBody>
+            <a:bodyPr rtlCol="0" anchor="ctr"/>
+            <a:lstStyle/>
+            <a:p>
+              <a:pPr algn="ctr"/>
+              <a:endParaRPr lang="en-US"/>
+            </a:p>
+          </p:txBody>
+        </p:sp>
+        <p:sp>
+          <p:nvSpPr>
+            <p:cNvPr id="129" name="Isosceles Triangle 128"/>
+            <p:cNvSpPr/>
+            <p:nvPr/>
+          </p:nvSpPr>
+          <p:spPr>
+            <a:xfrm flipV="1">
+              <a:off x="985428" y="2779343"/>
+              <a:ext cx="52759" cy="45719"/>
+            </a:xfrm>
+            <a:prstGeom prst="triangle">
+              <a:avLst/>
+            </a:prstGeom>
+            <a:ln>
+              <a:noFill/>
+            </a:ln>
+          </p:spPr>
+          <p:style>
+            <a:lnRef idx="2">
+              <a:schemeClr val="dk1">
+                <a:shade val="50000"/>
+              </a:schemeClr>
+            </a:lnRef>
+            <a:fillRef idx="1">
+              <a:schemeClr val="dk1"/>
+            </a:fillRef>
+            <a:effectRef idx="0">
+              <a:schemeClr val="dk1"/>
+            </a:effectRef>
+            <a:fontRef idx="minor">
+              <a:schemeClr val="lt1"/>
+            </a:fontRef>
+          </p:style>
+          <p:txBody>
+            <a:bodyPr rtlCol="0" anchor="ctr"/>
+            <a:lstStyle/>
+            <a:p>
+              <a:pPr algn="ctr"/>
+              <a:endParaRPr lang="en-US"/>
+            </a:p>
+          </p:txBody>
+        </p:sp>
+      </p:grpSp>
+      <p:sp>
+        <p:nvSpPr>
+          <p:cNvPr id="130" name="Isosceles Triangle 129"/>
+          <p:cNvSpPr/>
+          <p:nvPr/>
+        </p:nvSpPr>
+        <p:spPr>
+          <a:xfrm>
+            <a:off x="1477016" y="3737172"/>
+            <a:ext cx="52759" cy="45719"/>
+          </a:xfrm>
+          <a:prstGeom prst="triangle">
+            <a:avLst/>
+          </a:prstGeom>
+          <a:ln>
+            <a:noFill/>
+          </a:ln>
+        </p:spPr>
+        <p:style>
+          <a:lnRef idx="2">
+            <a:schemeClr val="dk1">
+              <a:shade val="50000"/>
+            </a:schemeClr>
+          </a:lnRef>
+          <a:fillRef idx="1">
+            <a:schemeClr val="dk1"/>
+          </a:fillRef>
+          <a:effectRef idx="0">
+            <a:schemeClr val="dk1"/>
+          </a:effectRef>
+          <a:fontRef idx="minor">
+            <a:schemeClr val="lt1"/>
+          </a:fontRef>
+        </p:style>
+        <p:txBody>
+          <a:bodyPr rtlCol="0" anchor="ctr"/>
+          <a:lstStyle/>
+          <a:p>
+            <a:pPr algn="ctr"/>
+            <a:endParaRPr lang="en-US"/>
+          </a:p>
+        </p:txBody>
+      </p:sp>
+      <p:sp>
+        <p:nvSpPr>
+          <p:cNvPr id="131" name="Isosceles Triangle 130"/>
+          <p:cNvSpPr/>
+          <p:nvPr/>
+        </p:nvSpPr>
+        <p:spPr>
+          <a:xfrm>
+            <a:off x="1247812" y="3737172"/>
+            <a:ext cx="52759" cy="45719"/>
+          </a:xfrm>
+          <a:prstGeom prst="triangle">
+            <a:avLst/>
+          </a:prstGeom>
+          <a:ln>
+            <a:noFill/>
+          </a:ln>
+        </p:spPr>
+        <p:style>
+          <a:lnRef idx="2">
+            <a:schemeClr val="dk1">
+              <a:shade val="50000"/>
+            </a:schemeClr>
+          </a:lnRef>
+          <a:fillRef idx="1">
+            <a:schemeClr val="dk1"/>
+          </a:fillRef>
+          <a:effectRef idx="0">
+            <a:schemeClr val="dk1"/>
+          </a:effectRef>
+          <a:fontRef idx="minor">
+            <a:schemeClr val="lt1"/>
+          </a:fontRef>
+        </p:style>
+        <p:txBody>
+          <a:bodyPr rtlCol="0" anchor="ctr"/>
+          <a:lstStyle/>
+          <a:p>
+            <a:pPr algn="ctr"/>
+            <a:endParaRPr lang="en-US"/>
+          </a:p>
+        </p:txBody>
+      </p:sp>
+      <p:cxnSp>
+        <p:nvCxnSpPr>
+          <p:cNvPr id="132" name="Straight Connector 131"/>
+          <p:cNvCxnSpPr/>
+          <p:nvPr/>
+        </p:nvCxnSpPr>
+        <p:spPr>
+          <a:xfrm flipV="1">
+            <a:off x="1955914" y="2437695"/>
+            <a:ext cx="0" cy="1352630"/>
+          </a:xfrm>
+          <a:prstGeom prst="line">
+            <a:avLst/>
+          </a:prstGeom>
+          <a:ln w="12700">
+            <a:solidFill>
+              <a:srgbClr val="FF0000"/>
+            </a:solidFill>
+            <a:headEnd type="none" w="sm" len="sm"/>
+            <a:tailEnd type="none" w="sm" len="sm"/>
+          </a:ln>
+        </p:spPr>
+        <p:style>
+          <a:lnRef idx="2">
+            <a:schemeClr val="accent4"/>
+          </a:lnRef>
+          <a:fillRef idx="0">
+            <a:schemeClr val="accent4"/>
+          </a:fillRef>
+          <a:effectRef idx="1">
+            <a:schemeClr val="accent4"/>
+          </a:effectRef>
+          <a:fontRef idx="minor">
+            <a:schemeClr val="tx1"/>
+          </a:fontRef>
+        </p:style>
+      </p:cxnSp>
+      <p:sp>
+        <p:nvSpPr>
+          <p:cNvPr id="133" name="TextBox 132"/>
+          <p:cNvSpPr txBox="1"/>
+          <p:nvPr/>
+        </p:nvSpPr>
+        <p:spPr>
+          <a:xfrm rot="16200000">
+            <a:off x="1449009" y="2792200"/>
+            <a:ext cx="802831" cy="246221"/>
+          </a:xfrm>
+          <a:prstGeom prst="rect">
+            <a:avLst/>
+          </a:prstGeom>
+          <a:noFill/>
+        </p:spPr>
+        <p:txBody>
+          <a:bodyPr wrap="square" rtlCol="0">
+            <a:spAutoFit/>
+          </a:bodyPr>
+          <a:lstStyle/>
+          <a:p>
+            <a:r>
+              <a:rPr lang="en-US" sz="1000" dirty="0" smtClean="0">
+                <a:solidFill>
+                  <a:srgbClr val="FF0000"/>
+                </a:solidFill>
+                <a:effectLst>
+                  <a:outerShdw blurRad="38100" dist="38100" dir="2700000" algn="tl">
+                    <a:srgbClr val="000000">
+                      <a:alpha val="43137"/>
+                    </a:srgbClr>
+                  </a:outerShdw>
+                </a:effectLst>
+              </a:rPr>
+              <a:t>RAS / CAS</a:t>
+            </a:r>
+            <a:endParaRPr lang="en-US" sz="1000" dirty="0">
+              <a:solidFill>
+                <a:srgbClr val="FF0000"/>
+              </a:solidFill>
+              <a:effectLst>
+                <a:outerShdw blurRad="38100" dist="38100" dir="2700000" algn="tl">
+                  <a:srgbClr val="000000">
+                    <a:alpha val="43137"/>
+                  </a:srgbClr>
+                </a:outerShdw>
+              </a:effectLst>
+            </a:endParaRPr>
+          </a:p>
+        </p:txBody>
+      </p:sp>
+      <p:sp>
+        <p:nvSpPr>
+          <p:cNvPr id="134" name="Isosceles Triangle 133"/>
+          <p:cNvSpPr/>
+          <p:nvPr/>
+        </p:nvSpPr>
+        <p:spPr>
+          <a:xfrm>
+            <a:off x="1924853" y="2432121"/>
+            <a:ext cx="52759" cy="45719"/>
+          </a:xfrm>
+          <a:prstGeom prst="triangle">
+            <a:avLst/>
+          </a:prstGeom>
+          <a:ln>
+            <a:noFill/>
+          </a:ln>
+        </p:spPr>
+        <p:style>
+          <a:lnRef idx="2">
+            <a:schemeClr val="dk1">
+              <a:shade val="50000"/>
+            </a:schemeClr>
+          </a:lnRef>
+          <a:fillRef idx="1">
+            <a:schemeClr val="dk1"/>
+          </a:fillRef>
+          <a:effectRef idx="0">
+            <a:schemeClr val="dk1"/>
+          </a:effectRef>
+          <a:fontRef idx="minor">
+            <a:schemeClr val="lt1"/>
+          </a:fontRef>
+        </p:style>
+        <p:txBody>
+          <a:bodyPr rtlCol="0" anchor="ctr"/>
+          <a:lstStyle/>
+          <a:p>
+            <a:pPr algn="ctr"/>
+            <a:endParaRPr lang="en-US"/>
+          </a:p>
+        </p:txBody>
+      </p:sp>
+      <p:sp>
+        <p:nvSpPr>
+          <p:cNvPr id="135" name="Isosceles Triangle 134"/>
+          <p:cNvSpPr/>
+          <p:nvPr/>
+        </p:nvSpPr>
+        <p:spPr>
+          <a:xfrm>
+            <a:off x="1926178" y="3352840"/>
+            <a:ext cx="52759" cy="45719"/>
+          </a:xfrm>
+          <a:prstGeom prst="triangle">
+            <a:avLst/>
+          </a:prstGeom>
+          <a:ln>
+            <a:noFill/>
+          </a:ln>
+        </p:spPr>
+        <p:style>
+          <a:lnRef idx="2">
+            <a:schemeClr val="dk1">
+              <a:shade val="50000"/>
+            </a:schemeClr>
+          </a:lnRef>
+          <a:fillRef idx="1">
+            <a:schemeClr val="dk1"/>
+          </a:fillRef>
+          <a:effectRef idx="0">
+            <a:schemeClr val="dk1"/>
+          </a:effectRef>
+          <a:fontRef idx="minor">
+            <a:schemeClr val="lt1"/>
+          </a:fontRef>
+        </p:style>
+        <p:txBody>
+          <a:bodyPr rtlCol="0" anchor="ctr"/>
+          <a:lstStyle/>
+          <a:p>
+            <a:pPr algn="ctr"/>
+            <a:endParaRPr lang="en-US"/>
+          </a:p>
+        </p:txBody>
+      </p:sp>
+      <p:sp>
+        <p:nvSpPr>
+          <p:cNvPr id="136" name="Isosceles Triangle 135"/>
+          <p:cNvSpPr/>
+          <p:nvPr/>
+        </p:nvSpPr>
+        <p:spPr>
+          <a:xfrm>
+            <a:off x="1933612" y="3733840"/>
+            <a:ext cx="52759" cy="45719"/>
+          </a:xfrm>
+          <a:prstGeom prst="triangle">
+            <a:avLst/>
+          </a:prstGeom>
+          <a:ln>
+            <a:noFill/>
+          </a:ln>
+        </p:spPr>
+        <p:style>
+          <a:lnRef idx="2">
+            <a:schemeClr val="dk1">
+              <a:shade val="50000"/>
+            </a:schemeClr>
+          </a:lnRef>
+          <a:fillRef idx="1">
+            <a:schemeClr val="dk1"/>
+          </a:fillRef>
+          <a:effectRef idx="0">
+            <a:schemeClr val="dk1"/>
+          </a:effectRef>
+          <a:fontRef idx="minor">
+            <a:schemeClr val="lt1"/>
+          </a:fontRef>
+        </p:style>
+        <p:txBody>
+          <a:bodyPr rtlCol="0" anchor="ctr"/>
+          <a:lstStyle/>
+          <a:p>
+            <a:pPr algn="ctr"/>
+            <a:endParaRPr lang="en-US"/>
+          </a:p>
+        </p:txBody>
+      </p:sp>
+      <p:cxnSp>
+        <p:nvCxnSpPr>
+          <p:cNvPr id="137" name="Straight Connector 136"/>
+          <p:cNvCxnSpPr/>
+          <p:nvPr/>
+        </p:nvCxnSpPr>
+        <p:spPr>
+          <a:xfrm flipV="1">
+            <a:off x="3144657" y="2449075"/>
+            <a:ext cx="0" cy="1352630"/>
+          </a:xfrm>
+          <a:prstGeom prst="line">
+            <a:avLst/>
+          </a:prstGeom>
+          <a:ln w="12700">
+            <a:solidFill>
+              <a:srgbClr val="FF0000"/>
+            </a:solidFill>
+            <a:headEnd type="none" w="sm" len="sm"/>
+            <a:tailEnd type="none" w="sm" len="sm"/>
+          </a:ln>
+        </p:spPr>
+        <p:style>
+          <a:lnRef idx="2">
+            <a:schemeClr val="accent4"/>
+          </a:lnRef>
+          <a:fillRef idx="0">
+            <a:schemeClr val="accent4"/>
+          </a:fillRef>
+          <a:effectRef idx="1">
+            <a:schemeClr val="accent4"/>
+          </a:effectRef>
+          <a:fontRef idx="minor">
+            <a:schemeClr val="tx1"/>
+          </a:fontRef>
+        </p:style>
+      </p:cxnSp>
+      <p:sp>
+        <p:nvSpPr>
+          <p:cNvPr id="138" name="TextBox 137"/>
+          <p:cNvSpPr txBox="1"/>
+          <p:nvPr/>
+        </p:nvSpPr>
+        <p:spPr>
+          <a:xfrm rot="16200000">
+            <a:off x="2637752" y="2803580"/>
+            <a:ext cx="802831" cy="246221"/>
+          </a:xfrm>
+          <a:prstGeom prst="rect">
+            <a:avLst/>
+          </a:prstGeom>
+          <a:noFill/>
+        </p:spPr>
+        <p:txBody>
+          <a:bodyPr wrap="square" rtlCol="0">
+            <a:spAutoFit/>
+          </a:bodyPr>
+          <a:lstStyle/>
+          <a:p>
+            <a:r>
+              <a:rPr lang="en-US" sz="1000" dirty="0" smtClean="0">
+                <a:solidFill>
+                  <a:srgbClr val="FF0000"/>
+                </a:solidFill>
+                <a:effectLst>
+                  <a:outerShdw blurRad="38100" dist="38100" dir="2700000" algn="tl">
+                    <a:srgbClr val="000000">
+                      <a:alpha val="43137"/>
+                    </a:srgbClr>
+                  </a:outerShdw>
+                </a:effectLst>
+              </a:rPr>
+              <a:t>VSYNC</a:t>
+            </a:r>
+            <a:endParaRPr lang="en-US" sz="1000" dirty="0">
+              <a:solidFill>
+                <a:srgbClr val="FF0000"/>
+              </a:solidFill>
+              <a:effectLst>
+                <a:outerShdw blurRad="38100" dist="38100" dir="2700000" algn="tl">
+                  <a:srgbClr val="000000">
+                    <a:alpha val="43137"/>
+                  </a:srgbClr>
+                </a:outerShdw>
+              </a:effectLst>
+            </a:endParaRPr>
+          </a:p>
+        </p:txBody>
+      </p:sp>
+      <p:sp>
+        <p:nvSpPr>
+          <p:cNvPr id="139" name="Isosceles Triangle 138"/>
+          <p:cNvSpPr/>
+          <p:nvPr/>
+        </p:nvSpPr>
+        <p:spPr>
+          <a:xfrm>
+            <a:off x="3113596" y="2443501"/>
+            <a:ext cx="52759" cy="45719"/>
+          </a:xfrm>
+          <a:prstGeom prst="triangle">
+            <a:avLst/>
+          </a:prstGeom>
+          <a:ln>
+            <a:noFill/>
+          </a:ln>
+        </p:spPr>
+        <p:style>
+          <a:lnRef idx="2">
+            <a:schemeClr val="dk1">
+              <a:shade val="50000"/>
+            </a:schemeClr>
+          </a:lnRef>
+          <a:fillRef idx="1">
+            <a:schemeClr val="dk1"/>
+          </a:fillRef>
+          <a:effectRef idx="0">
+            <a:schemeClr val="dk1"/>
+          </a:effectRef>
+          <a:fontRef idx="minor">
+            <a:schemeClr val="lt1"/>
+          </a:fontRef>
+        </p:style>
+        <p:txBody>
+          <a:bodyPr rtlCol="0" anchor="ctr"/>
+          <a:lstStyle/>
+          <a:p>
+            <a:pPr algn="ctr"/>
+            <a:endParaRPr lang="en-US"/>
+          </a:p>
+        </p:txBody>
+      </p:sp>
+      <p:sp>
+        <p:nvSpPr>
+          <p:cNvPr id="140" name="Isosceles Triangle 139"/>
+          <p:cNvSpPr/>
+          <p:nvPr/>
+        </p:nvSpPr>
+        <p:spPr>
+          <a:xfrm>
+            <a:off x="3114921" y="3364220"/>
+            <a:ext cx="52759" cy="45719"/>
+          </a:xfrm>
+          <a:prstGeom prst="triangle">
+            <a:avLst/>
+          </a:prstGeom>
+          <a:ln>
+            <a:noFill/>
+          </a:ln>
+        </p:spPr>
+        <p:style>
+          <a:lnRef idx="2">
+            <a:schemeClr val="dk1">
+              <a:shade val="50000"/>
+            </a:schemeClr>
+          </a:lnRef>
+          <a:fillRef idx="1">
+            <a:schemeClr val="dk1"/>
+          </a:fillRef>
+          <a:effectRef idx="0">
+            <a:schemeClr val="dk1"/>
+          </a:effectRef>
+          <a:fontRef idx="minor">
+            <a:schemeClr val="lt1"/>
+          </a:fontRef>
+        </p:style>
+        <p:txBody>
+          <a:bodyPr rtlCol="0" anchor="ctr"/>
+          <a:lstStyle/>
+          <a:p>
+            <a:pPr algn="ctr"/>
+            <a:endParaRPr lang="en-US"/>
+          </a:p>
+        </p:txBody>
+      </p:sp>
+      <p:sp>
+        <p:nvSpPr>
+          <p:cNvPr id="141" name="Isosceles Triangle 140"/>
+          <p:cNvSpPr/>
+          <p:nvPr/>
+        </p:nvSpPr>
+        <p:spPr>
+          <a:xfrm>
+            <a:off x="3122355" y="3745220"/>
+            <a:ext cx="52759" cy="45719"/>
+          </a:xfrm>
+          <a:prstGeom prst="triangle">
+            <a:avLst/>
+          </a:prstGeom>
+          <a:ln>
+            <a:noFill/>
+          </a:ln>
+        </p:spPr>
+        <p:style>
+          <a:lnRef idx="2">
+            <a:schemeClr val="dk1">
+              <a:shade val="50000"/>
+            </a:schemeClr>
+          </a:lnRef>
+          <a:fillRef idx="1">
+            <a:schemeClr val="dk1"/>
+          </a:fillRef>
+          <a:effectRef idx="0">
+            <a:schemeClr val="dk1"/>
+          </a:effectRef>
+          <a:fontRef idx="minor">
+            <a:schemeClr val="lt1"/>
+          </a:fontRef>
+        </p:style>
+        <p:txBody>
+          <a:bodyPr rtlCol="0" anchor="ctr"/>
+          <a:lstStyle/>
+          <a:p>
+            <a:pPr algn="ctr"/>
+            <a:endParaRPr lang="en-US"/>
+          </a:p>
+        </p:txBody>
+      </p:sp>
+      <p:cxnSp>
+        <p:nvCxnSpPr>
+          <p:cNvPr id="142" name="Straight Connector 141"/>
+          <p:cNvCxnSpPr/>
+          <p:nvPr/>
+        </p:nvCxnSpPr>
+        <p:spPr>
+          <a:xfrm flipV="1">
+            <a:off x="3373257" y="2446601"/>
+            <a:ext cx="0" cy="1352630"/>
+          </a:xfrm>
+          <a:prstGeom prst="line">
+            <a:avLst/>
+          </a:prstGeom>
+          <a:ln w="12700">
+            <a:solidFill>
+              <a:srgbClr val="FF0000"/>
+            </a:solidFill>
+            <a:headEnd type="none" w="sm" len="sm"/>
+            <a:tailEnd type="none" w="sm" len="sm"/>
+          </a:ln>
+        </p:spPr>
+        <p:style>
+          <a:lnRef idx="2">
+            <a:schemeClr val="accent4"/>
+          </a:lnRef>
+          <a:fillRef idx="0">
+            <a:schemeClr val="accent4"/>
+          </a:fillRef>
+          <a:effectRef idx="1">
+            <a:schemeClr val="accent4"/>
+          </a:effectRef>
+          <a:fontRef idx="minor">
+            <a:schemeClr val="tx1"/>
+          </a:fontRef>
+        </p:style>
+      </p:cxnSp>
+      <p:sp>
+        <p:nvSpPr>
+          <p:cNvPr id="143" name="TextBox 142"/>
+          <p:cNvSpPr txBox="1"/>
+          <p:nvPr/>
+        </p:nvSpPr>
+        <p:spPr>
+          <a:xfrm rot="16200000">
+            <a:off x="2866352" y="2801106"/>
+            <a:ext cx="802831" cy="246221"/>
+          </a:xfrm>
+          <a:prstGeom prst="rect">
+            <a:avLst/>
+          </a:prstGeom>
+          <a:noFill/>
+        </p:spPr>
+        <p:txBody>
+          <a:bodyPr wrap="square" rtlCol="0">
+            <a:spAutoFit/>
+          </a:bodyPr>
+          <a:lstStyle/>
+          <a:p>
+            <a:r>
+              <a:rPr lang="en-US" sz="1000" dirty="0" smtClean="0">
+                <a:solidFill>
+                  <a:srgbClr val="FF0000"/>
+                </a:solidFill>
+                <a:effectLst>
+                  <a:outerShdw blurRad="38100" dist="38100" dir="2700000" algn="tl">
+                    <a:srgbClr val="000000">
+                      <a:alpha val="43137"/>
+                    </a:srgbClr>
+                  </a:outerShdw>
+                </a:effectLst>
+              </a:rPr>
+              <a:t>HSYNC</a:t>
+            </a:r>
+            <a:endParaRPr lang="en-US" sz="1000" dirty="0">
+              <a:solidFill>
+                <a:srgbClr val="FF0000"/>
+              </a:solidFill>
+              <a:effectLst>
+                <a:outerShdw blurRad="38100" dist="38100" dir="2700000" algn="tl">
+                  <a:srgbClr val="000000">
+                    <a:alpha val="43137"/>
+                  </a:srgbClr>
+                </a:outerShdw>
+              </a:effectLst>
+            </a:endParaRPr>
+          </a:p>
+        </p:txBody>
+      </p:sp>
+      <p:sp>
+        <p:nvSpPr>
+          <p:cNvPr id="144" name="Isosceles Triangle 143"/>
+          <p:cNvSpPr/>
+          <p:nvPr/>
+        </p:nvSpPr>
+        <p:spPr>
+          <a:xfrm>
+            <a:off x="3342196" y="2441027"/>
+            <a:ext cx="52759" cy="45719"/>
+          </a:xfrm>
+          <a:prstGeom prst="triangle">
+            <a:avLst/>
+          </a:prstGeom>
+          <a:ln>
+            <a:noFill/>
+          </a:ln>
+        </p:spPr>
+        <p:style>
+          <a:lnRef idx="2">
+            <a:schemeClr val="dk1">
+              <a:shade val="50000"/>
+            </a:schemeClr>
+          </a:lnRef>
+          <a:fillRef idx="1">
+            <a:schemeClr val="dk1"/>
+          </a:fillRef>
+          <a:effectRef idx="0">
+            <a:schemeClr val="dk1"/>
+          </a:effectRef>
+          <a:fontRef idx="minor">
+            <a:schemeClr val="lt1"/>
+          </a:fontRef>
+        </p:style>
+        <p:txBody>
+          <a:bodyPr rtlCol="0" anchor="ctr"/>
+          <a:lstStyle/>
+          <a:p>
+            <a:pPr algn="ctr"/>
+            <a:endParaRPr lang="en-US"/>
+          </a:p>
+        </p:txBody>
+      </p:sp>
+      <p:sp>
+        <p:nvSpPr>
+          <p:cNvPr id="145" name="Isosceles Triangle 144"/>
+          <p:cNvSpPr/>
+          <p:nvPr/>
+        </p:nvSpPr>
+        <p:spPr>
+          <a:xfrm>
+            <a:off x="3343521" y="3361746"/>
+            <a:ext cx="52759" cy="45719"/>
+          </a:xfrm>
+          <a:prstGeom prst="triangle">
+            <a:avLst/>
+          </a:prstGeom>
+          <a:ln>
+            <a:noFill/>
+          </a:ln>
+        </p:spPr>
+        <p:style>
+          <a:lnRef idx="2">
+            <a:schemeClr val="dk1">
+              <a:shade val="50000"/>
+            </a:schemeClr>
+          </a:lnRef>
+          <a:fillRef idx="1">
+            <a:schemeClr val="dk1"/>
+          </a:fillRef>
+          <a:effectRef idx="0">
+            <a:schemeClr val="dk1"/>
+          </a:effectRef>
+          <a:fontRef idx="minor">
+            <a:schemeClr val="lt1"/>
+          </a:fontRef>
+        </p:style>
+        <p:txBody>
+          <a:bodyPr rtlCol="0" anchor="ctr"/>
+          <a:lstStyle/>
+          <a:p>
+            <a:pPr algn="ctr"/>
+            <a:endParaRPr lang="en-US"/>
+          </a:p>
+        </p:txBody>
+      </p:sp>
+      <p:sp>
+        <p:nvSpPr>
+          <p:cNvPr id="146" name="Isosceles Triangle 145"/>
+          <p:cNvSpPr/>
+          <p:nvPr/>
+        </p:nvSpPr>
+        <p:spPr>
+          <a:xfrm>
+            <a:off x="3350955" y="3742746"/>
+            <a:ext cx="52759" cy="45719"/>
+          </a:xfrm>
+          <a:prstGeom prst="triangle">
+            <a:avLst/>
+          </a:prstGeom>
+          <a:ln>
+            <a:noFill/>
+          </a:ln>
+        </p:spPr>
+        <p:style>
+          <a:lnRef idx="2">
+            <a:schemeClr val="dk1">
+              <a:shade val="50000"/>
+            </a:schemeClr>
+          </a:lnRef>
+          <a:fillRef idx="1">
+            <a:schemeClr val="dk1"/>
+          </a:fillRef>
+          <a:effectRef idx="0">
+            <a:schemeClr val="dk1"/>
+          </a:effectRef>
+          <a:fontRef idx="minor">
+            <a:schemeClr val="lt1"/>
+          </a:fontRef>
+        </p:style>
+        <p:txBody>
+          <a:bodyPr rtlCol="0" anchor="ctr"/>
+          <a:lstStyle/>
+          <a:p>
+            <a:pPr algn="ctr"/>
+            <a:endParaRPr lang="en-US"/>
+          </a:p>
+        </p:txBody>
+      </p:sp>
+      <p:cxnSp>
+        <p:nvCxnSpPr>
+          <p:cNvPr id="147" name="Straight Connector 146"/>
+          <p:cNvCxnSpPr/>
+          <p:nvPr/>
+        </p:nvCxnSpPr>
+        <p:spPr>
+          <a:xfrm flipV="1">
+            <a:off x="3601857" y="2452563"/>
+            <a:ext cx="0" cy="1352630"/>
+          </a:xfrm>
+          <a:prstGeom prst="line">
+            <a:avLst/>
+          </a:prstGeom>
+          <a:ln w="12700">
+            <a:solidFill>
+              <a:srgbClr val="FF0000"/>
+            </a:solidFill>
+            <a:headEnd type="none" w="sm" len="sm"/>
+            <a:tailEnd type="none" w="sm" len="sm"/>
+          </a:ln>
+        </p:spPr>
+        <p:style>
+          <a:lnRef idx="2">
+            <a:schemeClr val="accent4"/>
+          </a:lnRef>
+          <a:fillRef idx="0">
+            <a:schemeClr val="accent4"/>
+          </a:fillRef>
+          <a:effectRef idx="1">
+            <a:schemeClr val="accent4"/>
+          </a:effectRef>
+          <a:fontRef idx="minor">
+            <a:schemeClr val="tx1"/>
+          </a:fontRef>
+        </p:style>
+      </p:cxnSp>
+      <p:sp>
+        <p:nvSpPr>
+          <p:cNvPr id="148" name="TextBox 147"/>
+          <p:cNvSpPr txBox="1"/>
+          <p:nvPr/>
+        </p:nvSpPr>
+        <p:spPr>
+          <a:xfrm rot="16200000">
+            <a:off x="3094952" y="2807068"/>
+            <a:ext cx="802831" cy="246221"/>
+          </a:xfrm>
+          <a:prstGeom prst="rect">
+            <a:avLst/>
+          </a:prstGeom>
+          <a:noFill/>
+        </p:spPr>
+        <p:txBody>
+          <a:bodyPr wrap="square" rtlCol="0">
+            <a:spAutoFit/>
+          </a:bodyPr>
+          <a:lstStyle/>
+          <a:p>
+            <a:r>
+              <a:rPr lang="en-US" sz="1000" dirty="0" smtClean="0">
+                <a:solidFill>
+                  <a:srgbClr val="FF0000"/>
+                </a:solidFill>
+                <a:effectLst>
+                  <a:outerShdw blurRad="38100" dist="38100" dir="2700000" algn="tl">
+                    <a:srgbClr val="000000">
+                      <a:alpha val="43137"/>
+                    </a:srgbClr>
+                  </a:outerShdw>
+                </a:effectLst>
+              </a:rPr>
+              <a:t>DCLK</a:t>
+            </a:r>
+            <a:endParaRPr lang="en-US" sz="1000" dirty="0">
+              <a:solidFill>
+                <a:srgbClr val="FF0000"/>
+              </a:solidFill>
+              <a:effectLst>
+                <a:outerShdw blurRad="38100" dist="38100" dir="2700000" algn="tl">
+                  <a:srgbClr val="000000">
+                    <a:alpha val="43137"/>
+                  </a:srgbClr>
+                </a:outerShdw>
+              </a:effectLst>
+            </a:endParaRPr>
+          </a:p>
+        </p:txBody>
+      </p:sp>
+      <p:sp>
+        <p:nvSpPr>
+          <p:cNvPr id="149" name="Isosceles Triangle 148"/>
+          <p:cNvSpPr/>
+          <p:nvPr/>
+        </p:nvSpPr>
+        <p:spPr>
+          <a:xfrm>
+            <a:off x="3570796" y="2446989"/>
+            <a:ext cx="52759" cy="45719"/>
+          </a:xfrm>
+          <a:prstGeom prst="triangle">
+            <a:avLst/>
+          </a:prstGeom>
+          <a:ln>
+            <a:noFill/>
+          </a:ln>
+        </p:spPr>
+        <p:style>
+          <a:lnRef idx="2">
+            <a:schemeClr val="dk1">
+              <a:shade val="50000"/>
+            </a:schemeClr>
+          </a:lnRef>
+          <a:fillRef idx="1">
+            <a:schemeClr val="dk1"/>
+          </a:fillRef>
+          <a:effectRef idx="0">
+            <a:schemeClr val="dk1"/>
+          </a:effectRef>
+          <a:fontRef idx="minor">
+            <a:schemeClr val="lt1"/>
+          </a:fontRef>
+        </p:style>
+        <p:txBody>
+          <a:bodyPr rtlCol="0" anchor="ctr"/>
+          <a:lstStyle/>
+          <a:p>
+            <a:pPr algn="ctr"/>
+            <a:endParaRPr lang="en-US"/>
+          </a:p>
+        </p:txBody>
+      </p:sp>
+      <p:sp>
+        <p:nvSpPr>
+          <p:cNvPr id="150" name="Isosceles Triangle 149"/>
+          <p:cNvSpPr/>
+          <p:nvPr/>
+        </p:nvSpPr>
+        <p:spPr>
+          <a:xfrm>
+            <a:off x="3572121" y="3367708"/>
+            <a:ext cx="52759" cy="45719"/>
+          </a:xfrm>
+          <a:prstGeom prst="triangle">
+            <a:avLst/>
+          </a:prstGeom>
+          <a:ln>
+            <a:noFill/>
+          </a:ln>
+        </p:spPr>
+        <p:style>
+          <a:lnRef idx="2">
+            <a:schemeClr val="dk1">
+              <a:shade val="50000"/>
+            </a:schemeClr>
+          </a:lnRef>
+          <a:fillRef idx="1">
+            <a:schemeClr val="dk1"/>
+          </a:fillRef>
+          <a:effectRef idx="0">
+            <a:schemeClr val="dk1"/>
+          </a:effectRef>
+          <a:fontRef idx="minor">
+            <a:schemeClr val="lt1"/>
+          </a:fontRef>
+        </p:style>
+        <p:txBody>
+          <a:bodyPr rtlCol="0" anchor="ctr"/>
+          <a:lstStyle/>
+          <a:p>
+            <a:pPr algn="ctr"/>
+            <a:endParaRPr lang="en-US"/>
+          </a:p>
+        </p:txBody>
+      </p:sp>
+      <p:sp>
+        <p:nvSpPr>
+          <p:cNvPr id="151" name="Isosceles Triangle 150"/>
+          <p:cNvSpPr/>
+          <p:nvPr/>
+        </p:nvSpPr>
+        <p:spPr>
+          <a:xfrm>
+            <a:off x="3579555" y="3748708"/>
+            <a:ext cx="52759" cy="45719"/>
+          </a:xfrm>
+          <a:prstGeom prst="triangle">
+            <a:avLst/>
+          </a:prstGeom>
+          <a:ln>
+            <a:noFill/>
+          </a:ln>
+        </p:spPr>
+        <p:style>
+          <a:lnRef idx="2">
+            <a:schemeClr val="dk1">
+              <a:shade val="50000"/>
+            </a:schemeClr>
+          </a:lnRef>
+          <a:fillRef idx="1">
+            <a:schemeClr val="dk1"/>
+          </a:fillRef>
+          <a:effectRef idx="0">
+            <a:schemeClr val="dk1"/>
+          </a:effectRef>
+          <a:fontRef idx="minor">
+            <a:schemeClr val="lt1"/>
+          </a:fontRef>
+        </p:style>
+        <p:txBody>
+          <a:bodyPr rtlCol="0" anchor="ctr"/>
+          <a:lstStyle/>
+          <a:p>
+            <a:pPr algn="ctr"/>
+            <a:endParaRPr lang="en-US"/>
+          </a:p>
+        </p:txBody>
+      </p:sp>
+      <p:cxnSp>
+        <p:nvCxnSpPr>
+          <p:cNvPr id="152" name="Straight Connector 151"/>
+          <p:cNvCxnSpPr/>
+          <p:nvPr/>
+        </p:nvCxnSpPr>
+        <p:spPr>
+          <a:xfrm flipV="1">
+            <a:off x="3830457" y="2446601"/>
+            <a:ext cx="0" cy="1352630"/>
+          </a:xfrm>
+          <a:prstGeom prst="line">
+            <a:avLst/>
+          </a:prstGeom>
+          <a:ln w="12700">
+            <a:solidFill>
+              <a:srgbClr val="FF0000"/>
+            </a:solidFill>
+            <a:headEnd type="none" w="sm" len="sm"/>
+            <a:tailEnd type="none" w="sm" len="sm"/>
+          </a:ln>
+        </p:spPr>
+        <p:style>
+          <a:lnRef idx="2">
+            <a:schemeClr val="accent4"/>
+          </a:lnRef>
+          <a:fillRef idx="0">
+            <a:schemeClr val="accent4"/>
+          </a:fillRef>
+          <a:effectRef idx="1">
+            <a:schemeClr val="accent4"/>
+          </a:effectRef>
+          <a:fontRef idx="minor">
+            <a:schemeClr val="tx1"/>
+          </a:fontRef>
+        </p:style>
+      </p:cxnSp>
+      <p:sp>
+        <p:nvSpPr>
+          <p:cNvPr id="153" name="TextBox 152"/>
+          <p:cNvSpPr txBox="1"/>
+          <p:nvPr/>
+        </p:nvSpPr>
+        <p:spPr>
+          <a:xfrm rot="16200000">
+            <a:off x="3323552" y="2801106"/>
+            <a:ext cx="802831" cy="246221"/>
+          </a:xfrm>
+          <a:prstGeom prst="rect">
+            <a:avLst/>
+          </a:prstGeom>
+          <a:noFill/>
+        </p:spPr>
+        <p:txBody>
+          <a:bodyPr wrap="square" rtlCol="0">
+            <a:spAutoFit/>
+          </a:bodyPr>
+          <a:lstStyle/>
+          <a:p>
+            <a:r>
+              <a:rPr lang="en-US" sz="1000" dirty="0" smtClean="0">
+                <a:solidFill>
+                  <a:srgbClr val="FF0000"/>
+                </a:solidFill>
+                <a:effectLst>
+                  <a:outerShdw blurRad="38100" dist="38100" dir="2700000" algn="tl">
+                    <a:srgbClr val="000000">
+                      <a:alpha val="43137"/>
+                    </a:srgbClr>
+                  </a:outerShdw>
+                </a:effectLst>
+              </a:rPr>
+              <a:t>SCLK</a:t>
+            </a:r>
+            <a:endParaRPr lang="en-US" sz="1000" dirty="0">
+              <a:solidFill>
+                <a:srgbClr val="FF0000"/>
+              </a:solidFill>
+              <a:effectLst>
+                <a:outerShdw blurRad="38100" dist="38100" dir="2700000" algn="tl">
+                  <a:srgbClr val="000000">
+                    <a:alpha val="43137"/>
+                  </a:srgbClr>
+                </a:outerShdw>
+              </a:effectLst>
+            </a:endParaRPr>
+          </a:p>
+        </p:txBody>
+      </p:sp>
+      <p:sp>
+        <p:nvSpPr>
+          <p:cNvPr id="154" name="Isosceles Triangle 153"/>
+          <p:cNvSpPr/>
+          <p:nvPr/>
+        </p:nvSpPr>
+        <p:spPr>
+          <a:xfrm>
+            <a:off x="3799396" y="2441027"/>
+            <a:ext cx="52759" cy="45719"/>
+          </a:xfrm>
+          <a:prstGeom prst="triangle">
+            <a:avLst/>
+          </a:prstGeom>
+          <a:ln>
+            <a:noFill/>
+          </a:ln>
+        </p:spPr>
+        <p:style>
+          <a:lnRef idx="2">
+            <a:schemeClr val="dk1">
+              <a:shade val="50000"/>
+            </a:schemeClr>
+          </a:lnRef>
+          <a:fillRef idx="1">
+            <a:schemeClr val="dk1"/>
+          </a:fillRef>
+          <a:effectRef idx="0">
+            <a:schemeClr val="dk1"/>
+          </a:effectRef>
+          <a:fontRef idx="minor">
+            <a:schemeClr val="lt1"/>
+          </a:fontRef>
+        </p:style>
+        <p:txBody>
+          <a:bodyPr rtlCol="0" anchor="ctr"/>
+          <a:lstStyle/>
+          <a:p>
+            <a:pPr algn="ctr"/>
+            <a:endParaRPr lang="en-US"/>
+          </a:p>
+        </p:txBody>
+      </p:sp>
+      <p:sp>
+        <p:nvSpPr>
+          <p:cNvPr id="155" name="Isosceles Triangle 154"/>
+          <p:cNvSpPr/>
+          <p:nvPr/>
+        </p:nvSpPr>
+        <p:spPr>
+          <a:xfrm>
+            <a:off x="3800721" y="3361746"/>
+            <a:ext cx="52759" cy="45719"/>
+          </a:xfrm>
+          <a:prstGeom prst="triangle">
+            <a:avLst/>
+          </a:prstGeom>
+          <a:ln>
+            <a:noFill/>
+          </a:ln>
+        </p:spPr>
+        <p:style>
+          <a:lnRef idx="2">
+            <a:schemeClr val="dk1">
+              <a:shade val="50000"/>
+            </a:schemeClr>
+          </a:lnRef>
+          <a:fillRef idx="1">
+            <a:schemeClr val="dk1"/>
+          </a:fillRef>
+          <a:effectRef idx="0">
+            <a:schemeClr val="dk1"/>
+          </a:effectRef>
+          <a:fontRef idx="minor">
+            <a:schemeClr val="lt1"/>
+          </a:fontRef>
+        </p:style>
+        <p:txBody>
+          <a:bodyPr rtlCol="0" anchor="ctr"/>
+          <a:lstStyle/>
+          <a:p>
+            <a:pPr algn="ctr"/>
+            <a:endParaRPr lang="en-US"/>
+          </a:p>
+        </p:txBody>
+      </p:sp>
+      <p:sp>
+        <p:nvSpPr>
+          <p:cNvPr id="156" name="Isosceles Triangle 155"/>
+          <p:cNvSpPr/>
+          <p:nvPr/>
+        </p:nvSpPr>
+        <p:spPr>
+          <a:xfrm>
+            <a:off x="3808155" y="3742746"/>
+            <a:ext cx="52759" cy="45719"/>
+          </a:xfrm>
+          <a:prstGeom prst="triangle">
+            <a:avLst/>
+          </a:prstGeom>
+          <a:ln>
+            <a:noFill/>
+          </a:ln>
+        </p:spPr>
+        <p:style>
+          <a:lnRef idx="2">
+            <a:schemeClr val="dk1">
+              <a:shade val="50000"/>
+            </a:schemeClr>
+          </a:lnRef>
+          <a:fillRef idx="1">
+            <a:schemeClr val="dk1"/>
+          </a:fillRef>
+          <a:effectRef idx="0">
+            <a:schemeClr val="dk1"/>
+          </a:effectRef>
+          <a:fontRef idx="minor">
+            <a:schemeClr val="lt1"/>
+          </a:fontRef>
+        </p:style>
+        <p:txBody>
+          <a:bodyPr rtlCol="0" anchor="ctr"/>
+          <a:lstStyle/>
+          <a:p>
+            <a:pPr algn="ctr"/>
+            <a:endParaRPr lang="en-US"/>
+          </a:p>
+        </p:txBody>
+      </p:sp>
+      <p:sp>
+        <p:nvSpPr>
+          <p:cNvPr id="157" name="TextBox 156"/>
+          <p:cNvSpPr txBox="1"/>
+          <p:nvPr/>
+        </p:nvSpPr>
+        <p:spPr>
+          <a:xfrm>
+            <a:off x="2214250" y="1784070"/>
+            <a:ext cx="914400" cy="246221"/>
+          </a:xfrm>
+          <a:prstGeom prst="rect">
+            <a:avLst/>
+          </a:prstGeom>
+          <a:noFill/>
+        </p:spPr>
+        <p:txBody>
+          <a:bodyPr wrap="square" rtlCol="0">
+            <a:spAutoFit/>
+          </a:bodyPr>
+          <a:lstStyle/>
+          <a:p>
+            <a:r>
+              <a:rPr lang="en-US" sz="1000" dirty="0" smtClean="0">
+                <a:solidFill>
+                  <a:srgbClr val="00FF00"/>
+                </a:solidFill>
+                <a:effectLst>
+                  <a:outerShdw blurRad="38100" dist="38100" dir="2700000" algn="tl">
+                    <a:srgbClr val="000000">
+                      <a:alpha val="43137"/>
+                    </a:srgbClr>
+                  </a:outerShdw>
+                </a:effectLst>
+              </a:rPr>
+              <a:t>SDQ0-SDQ15</a:t>
+            </a:r>
+            <a:endParaRPr lang="en-US" sz="1000" dirty="0">
+              <a:solidFill>
+                <a:srgbClr val="00FF00"/>
+              </a:solidFill>
+              <a:effectLst>
+                <a:outerShdw blurRad="38100" dist="38100" dir="2700000" algn="tl">
+                  <a:srgbClr val="000000">
+                    <a:alpha val="43137"/>
+                  </a:srgbClr>
+                </a:outerShdw>
+              </a:effectLst>
+            </a:endParaRPr>
+          </a:p>
+        </p:txBody>
+      </p:sp>
+      <p:cxnSp>
+        <p:nvCxnSpPr>
+          <p:cNvPr id="161" name="Straight Connector 160"/>
+          <p:cNvCxnSpPr/>
+          <p:nvPr/>
+        </p:nvCxnSpPr>
+        <p:spPr>
+          <a:xfrm flipV="1">
+            <a:off x="2163264" y="2435453"/>
+            <a:ext cx="0" cy="204438"/>
+          </a:xfrm>
+          <a:prstGeom prst="line">
+            <a:avLst/>
+          </a:prstGeom>
+          <a:ln w="12700">
+            <a:solidFill>
+              <a:srgbClr val="FF0000"/>
+            </a:solidFill>
+            <a:headEnd type="none" w="sm" len="sm"/>
+            <a:tailEnd type="none" w="sm" len="sm"/>
+          </a:ln>
+        </p:spPr>
+        <p:style>
+          <a:lnRef idx="2">
+            <a:schemeClr val="accent4"/>
+          </a:lnRef>
+          <a:fillRef idx="0">
+            <a:schemeClr val="accent4"/>
+          </a:fillRef>
+          <a:effectRef idx="1">
+            <a:schemeClr val="accent4"/>
+          </a:effectRef>
+          <a:fontRef idx="minor">
+            <a:schemeClr val="tx1"/>
+          </a:fontRef>
+        </p:style>
+      </p:cxnSp>
+      <p:sp>
+        <p:nvSpPr>
+          <p:cNvPr id="27" name="Isosceles Triangle 26"/>
+          <p:cNvSpPr/>
+          <p:nvPr/>
+        </p:nvSpPr>
+        <p:spPr>
+          <a:xfrm>
+            <a:off x="2136884" y="2430873"/>
+            <a:ext cx="52759" cy="45719"/>
+          </a:xfrm>
+          <a:prstGeom prst="triangle">
+            <a:avLst/>
+          </a:prstGeom>
+          <a:ln>
+            <a:noFill/>
+          </a:ln>
+        </p:spPr>
+        <p:style>
+          <a:lnRef idx="2">
+            <a:schemeClr val="dk1">
+              <a:shade val="50000"/>
+            </a:schemeClr>
+          </a:lnRef>
+          <a:fillRef idx="1">
+            <a:schemeClr val="dk1"/>
+          </a:fillRef>
+          <a:effectRef idx="0">
+            <a:schemeClr val="dk1"/>
+          </a:effectRef>
+          <a:fontRef idx="minor">
+            <a:schemeClr val="lt1"/>
+          </a:fontRef>
+        </p:style>
+        <p:txBody>
+          <a:bodyPr rtlCol="0" anchor="ctr"/>
+          <a:lstStyle/>
+          <a:p>
+            <a:pPr algn="ctr"/>
+            <a:endParaRPr lang="en-US"/>
+          </a:p>
+        </p:txBody>
+      </p:sp>
+      <p:sp>
+        <p:nvSpPr>
+          <p:cNvPr id="167" name="TextBox 166"/>
+          <p:cNvSpPr txBox="1"/>
+          <p:nvPr/>
+        </p:nvSpPr>
+        <p:spPr>
+          <a:xfrm>
+            <a:off x="5695054" y="304800"/>
+            <a:ext cx="3214023" cy="923330"/>
+          </a:xfrm>
+          <a:prstGeom prst="rect">
+            <a:avLst/>
+          </a:prstGeom>
+          <a:noFill/>
+        </p:spPr>
+        <p:txBody>
+          <a:bodyPr wrap="square" rtlCol="0">
+            <a:spAutoFit/>
+          </a:bodyPr>
+          <a:lstStyle/>
+          <a:p>
+            <a:pPr algn="r"/>
+            <a:r>
+              <a:rPr lang="en-US" dirty="0" smtClean="0"/>
+              <a:t>Albert </a:t>
+            </a:r>
+            <a:r>
+              <a:rPr lang="en-US" dirty="0" err="1" smtClean="0"/>
+              <a:t>Gural</a:t>
+            </a:r>
+            <a:endParaRPr lang="en-US" dirty="0"/>
+          </a:p>
+          <a:p>
+            <a:pPr algn="r"/>
+            <a:r>
+              <a:rPr lang="en-US" dirty="0" smtClean="0"/>
+              <a:t>EE52 – FPGA </a:t>
+            </a:r>
+            <a:r>
+              <a:rPr lang="en-US" dirty="0" smtClean="0"/>
+              <a:t>Oscilloscope</a:t>
+            </a:r>
+          </a:p>
+          <a:p>
+            <a:pPr algn="r"/>
+            <a:r>
+              <a:rPr lang="en-US" dirty="0" smtClean="0"/>
+              <a:t>Video Display Block Diagram</a:t>
+            </a:r>
+            <a:endParaRPr lang="en-US" dirty="0"/>
+          </a:p>
+        </p:txBody>
+      </p:sp>
+    </p:spTree>
+    <p:extLst>
+      <p:ext uri="{BB962C8B-B14F-4D97-AF65-F5344CB8AC3E}">
+        <p14:creationId xmlns:p14="http://schemas.microsoft.com/office/powerpoint/2010/main" val="3329408700"/>
       </p:ext>
     </p:extLst>
   </p:cSld>

</xml_diff>

<commit_message>
Started VRAM Block Diagram in Quartus.
</commit_message>
<xml_diff>
--- a/Documentation/osc-block-design.pptx
+++ b/Documentation/osc-block-design.pptx
@@ -193,7 +193,7 @@
           <a:p>
             <a:fld id="{FFB0E71B-32EB-48BB-ACFC-DB0AFE2E6F1D}" type="datetimeFigureOut">
               <a:rPr lang="en-US" smtClean="0"/>
-              <a:t>2/16/2014</a:t>
+              <a:t>2/23/2014</a:t>
             </a:fld>
             <a:endParaRPr lang="en-US"/>
           </a:p>
@@ -642,7 +642,7 @@
           <a:p>
             <a:fld id="{08A35B09-16DA-4D86-8913-C92676B2D7D8}" type="datetimeFigureOut">
               <a:rPr lang="en-US" smtClean="0"/>
-              <a:t>2/16/2014</a:t>
+              <a:t>2/23/2014</a:t>
             </a:fld>
             <a:endParaRPr lang="en-US"/>
           </a:p>
@@ -812,7 +812,7 @@
           <a:p>
             <a:fld id="{08A35B09-16DA-4D86-8913-C92676B2D7D8}" type="datetimeFigureOut">
               <a:rPr lang="en-US" smtClean="0"/>
-              <a:t>2/16/2014</a:t>
+              <a:t>2/23/2014</a:t>
             </a:fld>
             <a:endParaRPr lang="en-US"/>
           </a:p>
@@ -992,7 +992,7 @@
           <a:p>
             <a:fld id="{08A35B09-16DA-4D86-8913-C92676B2D7D8}" type="datetimeFigureOut">
               <a:rPr lang="en-US" smtClean="0"/>
-              <a:t>2/16/2014</a:t>
+              <a:t>2/23/2014</a:t>
             </a:fld>
             <a:endParaRPr lang="en-US"/>
           </a:p>
@@ -1162,7 +1162,7 @@
           <a:p>
             <a:fld id="{08A35B09-16DA-4D86-8913-C92676B2D7D8}" type="datetimeFigureOut">
               <a:rPr lang="en-US" smtClean="0"/>
-              <a:t>2/16/2014</a:t>
+              <a:t>2/23/2014</a:t>
             </a:fld>
             <a:endParaRPr lang="en-US"/>
           </a:p>
@@ -1408,7 +1408,7 @@
           <a:p>
             <a:fld id="{08A35B09-16DA-4D86-8913-C92676B2D7D8}" type="datetimeFigureOut">
               <a:rPr lang="en-US" smtClean="0"/>
-              <a:t>2/16/2014</a:t>
+              <a:t>2/23/2014</a:t>
             </a:fld>
             <a:endParaRPr lang="en-US"/>
           </a:p>
@@ -1696,7 +1696,7 @@
           <a:p>
             <a:fld id="{08A35B09-16DA-4D86-8913-C92676B2D7D8}" type="datetimeFigureOut">
               <a:rPr lang="en-US" smtClean="0"/>
-              <a:t>2/16/2014</a:t>
+              <a:t>2/23/2014</a:t>
             </a:fld>
             <a:endParaRPr lang="en-US"/>
           </a:p>
@@ -2118,7 +2118,7 @@
           <a:p>
             <a:fld id="{08A35B09-16DA-4D86-8913-C92676B2D7D8}" type="datetimeFigureOut">
               <a:rPr lang="en-US" smtClean="0"/>
-              <a:t>2/16/2014</a:t>
+              <a:t>2/23/2014</a:t>
             </a:fld>
             <a:endParaRPr lang="en-US"/>
           </a:p>
@@ -2236,7 +2236,7 @@
           <a:p>
             <a:fld id="{08A35B09-16DA-4D86-8913-C92676B2D7D8}" type="datetimeFigureOut">
               <a:rPr lang="en-US" smtClean="0"/>
-              <a:t>2/16/2014</a:t>
+              <a:t>2/23/2014</a:t>
             </a:fld>
             <a:endParaRPr lang="en-US"/>
           </a:p>
@@ -2331,7 +2331,7 @@
           <a:p>
             <a:fld id="{08A35B09-16DA-4D86-8913-C92676B2D7D8}" type="datetimeFigureOut">
               <a:rPr lang="en-US" smtClean="0"/>
-              <a:t>2/16/2014</a:t>
+              <a:t>2/23/2014</a:t>
             </a:fld>
             <a:endParaRPr lang="en-US"/>
           </a:p>
@@ -2608,7 +2608,7 @@
           <a:p>
             <a:fld id="{08A35B09-16DA-4D86-8913-C92676B2D7D8}" type="datetimeFigureOut">
               <a:rPr lang="en-US" smtClean="0"/>
-              <a:t>2/16/2014</a:t>
+              <a:t>2/23/2014</a:t>
             </a:fld>
             <a:endParaRPr lang="en-US"/>
           </a:p>
@@ -2861,7 +2861,7 @@
           <a:p>
             <a:fld id="{08A35B09-16DA-4D86-8913-C92676B2D7D8}" type="datetimeFigureOut">
               <a:rPr lang="en-US" smtClean="0"/>
-              <a:t>2/16/2014</a:t>
+              <a:t>2/23/2014</a:t>
             </a:fld>
             <a:endParaRPr lang="en-US"/>
           </a:p>
@@ -3074,7 +3074,7 @@
           <a:p>
             <a:fld id="{08A35B09-16DA-4D86-8913-C92676B2D7D8}" type="datetimeFigureOut">
               <a:rPr lang="en-US" smtClean="0"/>
-              <a:t>2/16/2014</a:t>
+              <a:t>2/23/2014</a:t>
             </a:fld>
             <a:endParaRPr lang="en-US"/>
           </a:p>
@@ -16528,7 +16528,7 @@
         </p:nvCxnSpPr>
         <p:spPr>
           <a:xfrm flipV="1">
-            <a:off x="1727692" y="2258891"/>
+            <a:off x="1731003" y="2258891"/>
             <a:ext cx="0" cy="1534766"/>
           </a:xfrm>
           <a:prstGeom prst="line">
@@ -16642,8 +16642,8 @@
         </p:nvCxnSpPr>
         <p:spPr>
           <a:xfrm flipH="1">
-            <a:off x="2163264" y="2639891"/>
-            <a:ext cx="1663836" cy="0"/>
+            <a:off x="2245038" y="2639891"/>
+            <a:ext cx="1582062" cy="0"/>
           </a:xfrm>
           <a:prstGeom prst="line">
             <a:avLst/>
@@ -16721,7 +16721,7 @@
         </p:nvGrpSpPr>
         <p:grpSpPr>
           <a:xfrm>
-            <a:off x="1701312" y="2427818"/>
+            <a:off x="1704623" y="2427818"/>
             <a:ext cx="52759" cy="101370"/>
             <a:chOff x="985428" y="2723692"/>
             <a:chExt cx="52759" cy="101370"/>
@@ -16822,7 +16822,7 @@
         </p:nvGrpSpPr>
         <p:grpSpPr>
           <a:xfrm>
-            <a:off x="1701312" y="3350874"/>
+            <a:off x="1704623" y="3350874"/>
             <a:ext cx="52759" cy="101370"/>
             <a:chOff x="985428" y="2723692"/>
             <a:chExt cx="52759" cy="101370"/>
@@ -16923,7 +16923,7 @@
         </p:nvGrpSpPr>
         <p:grpSpPr>
           <a:xfrm>
-            <a:off x="1701311" y="3686284"/>
+            <a:off x="1704622" y="3686284"/>
             <a:ext cx="52759" cy="101370"/>
             <a:chOff x="985428" y="2723692"/>
             <a:chExt cx="52759" cy="101370"/>
@@ -17024,7 +17024,7 @@
         </p:nvSpPr>
         <p:spPr>
           <a:xfrm rot="16200000">
-            <a:off x="1175231" y="2757506"/>
+            <a:off x="1178542" y="2757506"/>
             <a:ext cx="950872" cy="246221"/>
           </a:xfrm>
           <a:prstGeom prst="rect">
@@ -17366,11 +17366,7 @@
             <a:pPr algn="ctr"/>
             <a:r>
               <a:rPr lang="en-US" sz="1200" dirty="0" smtClean="0"/>
-              <a:t>Display </a:t>
-            </a:r>
-            <a:r>
-              <a:rPr lang="en-US" sz="1200" dirty="0" smtClean="0"/>
-              <a:t>Controller</a:t>
+              <a:t>Display Controller</a:t>
             </a:r>
             <a:endParaRPr lang="en-US" sz="1200" dirty="0"/>
           </a:p>
@@ -17960,50 +17956,13 @@
       </p:sp>
       <p:cxnSp>
         <p:nvCxnSpPr>
-          <p:cNvPr id="74" name="Straight Connector 73"/>
-          <p:cNvCxnSpPr/>
-          <p:nvPr/>
-        </p:nvCxnSpPr>
-        <p:spPr>
-          <a:xfrm flipV="1">
-            <a:off x="1498714" y="2441028"/>
-            <a:ext cx="0" cy="1352629"/>
-          </a:xfrm>
-          <a:prstGeom prst="line">
-            <a:avLst/>
-          </a:prstGeom>
-          <a:ln w="12700">
-            <a:solidFill>
-              <a:srgbClr val="CC99FF"/>
-            </a:solidFill>
-            <a:headEnd type="none" w="sm" len="sm"/>
-            <a:tailEnd type="none" w="sm" len="sm"/>
-          </a:ln>
-        </p:spPr>
-        <p:style>
-          <a:lnRef idx="2">
-            <a:schemeClr val="accent4"/>
-          </a:lnRef>
-          <a:fillRef idx="0">
-            <a:schemeClr val="accent4"/>
-          </a:fillRef>
-          <a:effectRef idx="1">
-            <a:schemeClr val="accent4"/>
-          </a:effectRef>
-          <a:fontRef idx="minor">
-            <a:schemeClr val="tx1"/>
-          </a:fontRef>
-        </p:style>
-      </p:cxnSp>
-      <p:cxnSp>
-        <p:nvCxnSpPr>
           <p:cNvPr id="75" name="Straight Connector 74"/>
           <p:cNvCxnSpPr/>
           <p:nvPr/>
         </p:nvCxnSpPr>
         <p:spPr>
           <a:xfrm flipV="1">
-            <a:off x="1270114" y="2441027"/>
+            <a:off x="1491280" y="2441027"/>
             <a:ext cx="0" cy="1352630"/>
           </a:xfrm>
           <a:prstGeom prst="line">
@@ -18034,65 +17993,13 @@
       </p:cxnSp>
       <p:sp>
         <p:nvSpPr>
-          <p:cNvPr id="76" name="TextBox 75"/>
-          <p:cNvSpPr txBox="1"/>
-          <p:nvPr/>
-        </p:nvSpPr>
-        <p:spPr>
-          <a:xfrm rot="16200000">
-            <a:off x="991809" y="2795532"/>
-            <a:ext cx="802831" cy="246221"/>
-          </a:xfrm>
-          <a:prstGeom prst="rect">
-            <a:avLst/>
-          </a:prstGeom>
-          <a:noFill/>
-        </p:spPr>
-        <p:txBody>
-          <a:bodyPr wrap="square" rtlCol="0">
-            <a:spAutoFit/>
-          </a:bodyPr>
-          <a:lstStyle/>
-          <a:p>
-            <a:r>
-              <a:rPr lang="en-US" sz="1000" dirty="0" smtClean="0">
-                <a:solidFill>
-                  <a:srgbClr val="CC99FF"/>
-                </a:solidFill>
-                <a:effectLst>
-                  <a:outerShdw blurRad="38100" dist="38100" dir="2700000" algn="tl">
-                    <a:srgbClr val="000000">
-                      <a:alpha val="43137"/>
-                    </a:srgbClr>
-                  </a:outerShdw>
-                </a:effectLst>
-              </a:rPr>
-              <a:t>#CS</a:t>
-            </a:r>
-            <a:endParaRPr lang="en-US" sz="1000" dirty="0">
-              <a:solidFill>
-                <a:srgbClr val="CC99FF"/>
-              </a:solidFill>
-              <a:effectLst>
-                <a:outerShdw blurRad="38100" dist="38100" dir="2700000" algn="tl">
-                  <a:srgbClr val="000000">
-                    <a:alpha val="43137"/>
-                  </a:srgbClr>
-                </a:outerShdw>
-              </a:effectLst>
-            </a:endParaRPr>
-          </a:p>
-        </p:txBody>
-      </p:sp>
-      <p:sp>
-        <p:nvSpPr>
           <p:cNvPr id="77" name="TextBox 76"/>
           <p:cNvSpPr txBox="1"/>
           <p:nvPr/>
         </p:nvSpPr>
         <p:spPr>
           <a:xfrm rot="16200000">
-            <a:off x="763209" y="2795532"/>
+            <a:off x="984375" y="2795532"/>
             <a:ext cx="802831" cy="246221"/>
           </a:xfrm>
           <a:prstGeom prst="rect">
@@ -18119,7 +18026,7 @@
                   </a:outerShdw>
                 </a:effectLst>
               </a:rPr>
-              <a:t>R/W</a:t>
+              <a:t>WEU/L</a:t>
             </a:r>
             <a:endParaRPr lang="en-US" sz="1000" dirty="0">
               <a:solidFill>
@@ -18138,13 +18045,13 @@
       </p:sp>
       <p:sp>
         <p:nvSpPr>
-          <p:cNvPr id="78" name="Isosceles Triangle 77"/>
+          <p:cNvPr id="79" name="Isosceles Triangle 78"/>
           <p:cNvSpPr/>
           <p:nvPr/>
         </p:nvSpPr>
         <p:spPr>
           <a:xfrm>
-            <a:off x="1468257" y="2435453"/>
+            <a:off x="1460219" y="2435453"/>
             <a:ext cx="52759" cy="45719"/>
           </a:xfrm>
           <a:prstGeom prst="triangle">
@@ -18181,99 +18088,13 @@
       </p:sp>
       <p:sp>
         <p:nvSpPr>
-          <p:cNvPr id="79" name="Isosceles Triangle 78"/>
-          <p:cNvSpPr/>
-          <p:nvPr/>
-        </p:nvSpPr>
-        <p:spPr>
-          <a:xfrm>
-            <a:off x="1239053" y="2435453"/>
-            <a:ext cx="52759" cy="45719"/>
-          </a:xfrm>
-          <a:prstGeom prst="triangle">
-            <a:avLst/>
-          </a:prstGeom>
-          <a:ln>
-            <a:noFill/>
-          </a:ln>
-        </p:spPr>
-        <p:style>
-          <a:lnRef idx="2">
-            <a:schemeClr val="dk1">
-              <a:shade val="50000"/>
-            </a:schemeClr>
-          </a:lnRef>
-          <a:fillRef idx="1">
-            <a:schemeClr val="dk1"/>
-          </a:fillRef>
-          <a:effectRef idx="0">
-            <a:schemeClr val="dk1"/>
-          </a:effectRef>
-          <a:fontRef idx="minor">
-            <a:schemeClr val="lt1"/>
-          </a:fontRef>
-        </p:style>
-        <p:txBody>
-          <a:bodyPr rtlCol="0" anchor="ctr"/>
-          <a:lstStyle/>
-          <a:p>
-            <a:pPr algn="ctr"/>
-            <a:endParaRPr lang="en-US"/>
-          </a:p>
-        </p:txBody>
-      </p:sp>
-      <p:sp>
-        <p:nvSpPr>
-          <p:cNvPr id="84" name="Isosceles Triangle 83"/>
-          <p:cNvSpPr/>
-          <p:nvPr/>
-        </p:nvSpPr>
-        <p:spPr>
-          <a:xfrm>
-            <a:off x="1476412" y="3356172"/>
-            <a:ext cx="52759" cy="45719"/>
-          </a:xfrm>
-          <a:prstGeom prst="triangle">
-            <a:avLst/>
-          </a:prstGeom>
-          <a:ln>
-            <a:noFill/>
-          </a:ln>
-        </p:spPr>
-        <p:style>
-          <a:lnRef idx="2">
-            <a:schemeClr val="dk1">
-              <a:shade val="50000"/>
-            </a:schemeClr>
-          </a:lnRef>
-          <a:fillRef idx="1">
-            <a:schemeClr val="dk1"/>
-          </a:fillRef>
-          <a:effectRef idx="0">
-            <a:schemeClr val="dk1"/>
-          </a:effectRef>
-          <a:fontRef idx="minor">
-            <a:schemeClr val="lt1"/>
-          </a:fontRef>
-        </p:style>
-        <p:txBody>
-          <a:bodyPr rtlCol="0" anchor="ctr"/>
-          <a:lstStyle/>
-          <a:p>
-            <a:pPr algn="ctr"/>
-            <a:endParaRPr lang="en-US"/>
-          </a:p>
-        </p:txBody>
-      </p:sp>
-      <p:sp>
-        <p:nvSpPr>
           <p:cNvPr id="85" name="Isosceles Triangle 84"/>
           <p:cNvSpPr/>
           <p:nvPr/>
         </p:nvSpPr>
         <p:spPr>
           <a:xfrm>
-            <a:off x="1240378" y="3356172"/>
+            <a:off x="1461544" y="3356172"/>
             <a:ext cx="52759" cy="45719"/>
           </a:xfrm>
           <a:prstGeom prst="triangle">
@@ -19163,56 +18984,13 @@
       </p:grpSp>
       <p:sp>
         <p:nvSpPr>
-          <p:cNvPr id="130" name="Isosceles Triangle 129"/>
-          <p:cNvSpPr/>
-          <p:nvPr/>
-        </p:nvSpPr>
-        <p:spPr>
-          <a:xfrm>
-            <a:off x="1477016" y="3737172"/>
-            <a:ext cx="52759" cy="45719"/>
-          </a:xfrm>
-          <a:prstGeom prst="triangle">
-            <a:avLst/>
-          </a:prstGeom>
-          <a:ln>
-            <a:noFill/>
-          </a:ln>
-        </p:spPr>
-        <p:style>
-          <a:lnRef idx="2">
-            <a:schemeClr val="dk1">
-              <a:shade val="50000"/>
-            </a:schemeClr>
-          </a:lnRef>
-          <a:fillRef idx="1">
-            <a:schemeClr val="dk1"/>
-          </a:fillRef>
-          <a:effectRef idx="0">
-            <a:schemeClr val="dk1"/>
-          </a:effectRef>
-          <a:fontRef idx="minor">
-            <a:schemeClr val="lt1"/>
-          </a:fontRef>
-        </p:style>
-        <p:txBody>
-          <a:bodyPr rtlCol="0" anchor="ctr"/>
-          <a:lstStyle/>
-          <a:p>
-            <a:pPr algn="ctr"/>
-            <a:endParaRPr lang="en-US"/>
-          </a:p>
-        </p:txBody>
-      </p:sp>
-      <p:sp>
-        <p:nvSpPr>
           <p:cNvPr id="131" name="Isosceles Triangle 130"/>
           <p:cNvSpPr/>
           <p:nvPr/>
         </p:nvSpPr>
         <p:spPr>
           <a:xfrm>
-            <a:off x="1247812" y="3737172"/>
+            <a:off x="1461544" y="3737172"/>
             <a:ext cx="52759" cy="45719"/>
           </a:xfrm>
           <a:prstGeom prst="triangle">
@@ -19255,7 +19033,7 @@
         </p:nvCxnSpPr>
         <p:spPr>
           <a:xfrm flipV="1">
-            <a:off x="1955914" y="2437695"/>
+            <a:off x="1959225" y="2437695"/>
             <a:ext cx="0" cy="1352630"/>
           </a:xfrm>
           <a:prstGeom prst="line">
@@ -19292,7 +19070,7 @@
         </p:nvSpPr>
         <p:spPr>
           <a:xfrm rot="16200000">
-            <a:off x="1449009" y="2792200"/>
+            <a:off x="1452320" y="2792200"/>
             <a:ext cx="802831" cy="246221"/>
           </a:xfrm>
           <a:prstGeom prst="rect">
@@ -19344,7 +19122,7 @@
         </p:nvSpPr>
         <p:spPr>
           <a:xfrm>
-            <a:off x="1924853" y="2432121"/>
+            <a:off x="1928164" y="2432121"/>
             <a:ext cx="52759" cy="45719"/>
           </a:xfrm>
           <a:prstGeom prst="triangle">
@@ -19387,7 +19165,7 @@
         </p:nvSpPr>
         <p:spPr>
           <a:xfrm>
-            <a:off x="1926178" y="3352840"/>
+            <a:off x="1929489" y="3352840"/>
             <a:ext cx="52759" cy="45719"/>
           </a:xfrm>
           <a:prstGeom prst="triangle">
@@ -19430,7 +19208,7 @@
         </p:nvSpPr>
         <p:spPr>
           <a:xfrm>
-            <a:off x="1933612" y="3733840"/>
+            <a:off x="1936923" y="3733840"/>
             <a:ext cx="52759" cy="45719"/>
           </a:xfrm>
           <a:prstGeom prst="triangle">
@@ -20127,8 +19905,8 @@
         </p:nvCxnSpPr>
         <p:spPr>
           <a:xfrm flipV="1">
-            <a:off x="3830457" y="2446601"/>
-            <a:ext cx="0" cy="1352630"/>
+            <a:off x="3830457" y="2639891"/>
+            <a:ext cx="0" cy="1159340"/>
           </a:xfrm>
           <a:prstGeom prst="line">
             <a:avLst/>
@@ -20210,49 +19988,6 @@
       </p:sp>
       <p:sp>
         <p:nvSpPr>
-          <p:cNvPr id="154" name="Isosceles Triangle 153"/>
-          <p:cNvSpPr/>
-          <p:nvPr/>
-        </p:nvSpPr>
-        <p:spPr>
-          <a:xfrm>
-            <a:off x="3799396" y="2441027"/>
-            <a:ext cx="52759" cy="45719"/>
-          </a:xfrm>
-          <a:prstGeom prst="triangle">
-            <a:avLst/>
-          </a:prstGeom>
-          <a:ln>
-            <a:noFill/>
-          </a:ln>
-        </p:spPr>
-        <p:style>
-          <a:lnRef idx="2">
-            <a:schemeClr val="dk1">
-              <a:shade val="50000"/>
-            </a:schemeClr>
-          </a:lnRef>
-          <a:fillRef idx="1">
-            <a:schemeClr val="dk1"/>
-          </a:fillRef>
-          <a:effectRef idx="0">
-            <a:schemeClr val="dk1"/>
-          </a:effectRef>
-          <a:fontRef idx="minor">
-            <a:schemeClr val="lt1"/>
-          </a:fontRef>
-        </p:style>
-        <p:txBody>
-          <a:bodyPr rtlCol="0" anchor="ctr"/>
-          <a:lstStyle/>
-          <a:p>
-            <a:pPr algn="ctr"/>
-            <a:endParaRPr lang="en-US"/>
-          </a:p>
-        </p:txBody>
-      </p:sp>
-      <p:sp>
-        <p:nvSpPr>
           <p:cNvPr id="155" name="Isosceles Triangle 154"/>
           <p:cNvSpPr/>
           <p:nvPr/>
@@ -20397,7 +20132,7 @@
         </p:nvCxnSpPr>
         <p:spPr>
           <a:xfrm flipV="1">
-            <a:off x="2163264" y="2435453"/>
+            <a:off x="2245038" y="2435453"/>
             <a:ext cx="0" cy="204438"/>
           </a:xfrm>
           <a:prstGeom prst="line">
@@ -20434,7 +20169,7 @@
         </p:nvSpPr>
         <p:spPr>
           <a:xfrm>
-            <a:off x="2136884" y="2430873"/>
+            <a:off x="2218658" y="2430873"/>
             <a:ext cx="52759" cy="45719"/>
           </a:xfrm>
           <a:prstGeom prst="triangle">
@@ -20506,11 +20241,7 @@
             <a:pPr algn="r"/>
             <a:r>
               <a:rPr lang="en-US" dirty="0" smtClean="0"/>
-              <a:t>EE52 – FPGA </a:t>
-            </a:r>
-            <a:r>
-              <a:rPr lang="en-US" dirty="0" smtClean="0"/>
-              <a:t>Oscilloscope</a:t>
+              <a:t>EE52 – FPGA Oscilloscope</a:t>
             </a:r>
           </a:p>
           <a:p>
@@ -20520,6 +20251,356 @@
               <a:t>Video Display Block Diagram</a:t>
             </a:r>
             <a:endParaRPr lang="en-US" dirty="0"/>
+          </a:p>
+        </p:txBody>
+      </p:sp>
+      <p:cxnSp>
+        <p:nvCxnSpPr>
+          <p:cNvPr id="105" name="Straight Connector 104"/>
+          <p:cNvCxnSpPr/>
+          <p:nvPr/>
+        </p:nvCxnSpPr>
+        <p:spPr>
+          <a:xfrm flipV="1">
+            <a:off x="1250797" y="2443974"/>
+            <a:ext cx="0" cy="1352630"/>
+          </a:xfrm>
+          <a:prstGeom prst="line">
+            <a:avLst/>
+          </a:prstGeom>
+          <a:ln w="12700">
+            <a:solidFill>
+              <a:srgbClr val="FF0000"/>
+            </a:solidFill>
+            <a:headEnd type="none" w="sm" len="sm"/>
+            <a:tailEnd type="none" w="sm" len="sm"/>
+          </a:ln>
+        </p:spPr>
+        <p:style>
+          <a:lnRef idx="2">
+            <a:schemeClr val="accent4"/>
+          </a:lnRef>
+          <a:fillRef idx="0">
+            <a:schemeClr val="accent4"/>
+          </a:fillRef>
+          <a:effectRef idx="1">
+            <a:schemeClr val="accent4"/>
+          </a:effectRef>
+          <a:fontRef idx="minor">
+            <a:schemeClr val="tx1"/>
+          </a:fontRef>
+        </p:style>
+      </p:cxnSp>
+      <p:sp>
+        <p:nvSpPr>
+          <p:cNvPr id="106" name="TextBox 105"/>
+          <p:cNvSpPr txBox="1"/>
+          <p:nvPr/>
+        </p:nvSpPr>
+        <p:spPr>
+          <a:xfrm rot="16200000">
+            <a:off x="743892" y="2798479"/>
+            <a:ext cx="802831" cy="246221"/>
+          </a:xfrm>
+          <a:prstGeom prst="rect">
+            <a:avLst/>
+          </a:prstGeom>
+          <a:noFill/>
+        </p:spPr>
+        <p:txBody>
+          <a:bodyPr wrap="square" rtlCol="0">
+            <a:spAutoFit/>
+          </a:bodyPr>
+          <a:lstStyle/>
+          <a:p>
+            <a:r>
+              <a:rPr lang="en-US" sz="1000" dirty="0" smtClean="0">
+                <a:solidFill>
+                  <a:srgbClr val="FF0000"/>
+                </a:solidFill>
+                <a:effectLst>
+                  <a:outerShdw blurRad="38100" dist="38100" dir="2700000" algn="tl">
+                    <a:srgbClr val="000000">
+                      <a:alpha val="43137"/>
+                    </a:srgbClr>
+                  </a:outerShdw>
+                </a:effectLst>
+              </a:rPr>
+              <a:t>TRG</a:t>
+            </a:r>
+            <a:endParaRPr lang="en-US" sz="1000" dirty="0">
+              <a:solidFill>
+                <a:srgbClr val="FF0000"/>
+              </a:solidFill>
+              <a:effectLst>
+                <a:outerShdw blurRad="38100" dist="38100" dir="2700000" algn="tl">
+                  <a:srgbClr val="000000">
+                    <a:alpha val="43137"/>
+                  </a:srgbClr>
+                </a:outerShdw>
+              </a:effectLst>
+            </a:endParaRPr>
+          </a:p>
+        </p:txBody>
+      </p:sp>
+      <p:sp>
+        <p:nvSpPr>
+          <p:cNvPr id="107" name="Isosceles Triangle 106"/>
+          <p:cNvSpPr/>
+          <p:nvPr/>
+        </p:nvSpPr>
+        <p:spPr>
+          <a:xfrm>
+            <a:off x="1219736" y="2438400"/>
+            <a:ext cx="52759" cy="45719"/>
+          </a:xfrm>
+          <a:prstGeom prst="triangle">
+            <a:avLst/>
+          </a:prstGeom>
+          <a:ln>
+            <a:noFill/>
+          </a:ln>
+        </p:spPr>
+        <p:style>
+          <a:lnRef idx="2">
+            <a:schemeClr val="dk1">
+              <a:shade val="50000"/>
+            </a:schemeClr>
+          </a:lnRef>
+          <a:fillRef idx="1">
+            <a:schemeClr val="dk1"/>
+          </a:fillRef>
+          <a:effectRef idx="0">
+            <a:schemeClr val="dk1"/>
+          </a:effectRef>
+          <a:fontRef idx="minor">
+            <a:schemeClr val="lt1"/>
+          </a:fontRef>
+        </p:style>
+        <p:txBody>
+          <a:bodyPr rtlCol="0" anchor="ctr"/>
+          <a:lstStyle/>
+          <a:p>
+            <a:pPr algn="ctr"/>
+            <a:endParaRPr lang="en-US"/>
+          </a:p>
+        </p:txBody>
+      </p:sp>
+      <p:sp>
+        <p:nvSpPr>
+          <p:cNvPr id="108" name="Isosceles Triangle 107"/>
+          <p:cNvSpPr/>
+          <p:nvPr/>
+        </p:nvSpPr>
+        <p:spPr>
+          <a:xfrm>
+            <a:off x="1221061" y="3359119"/>
+            <a:ext cx="52759" cy="45719"/>
+          </a:xfrm>
+          <a:prstGeom prst="triangle">
+            <a:avLst/>
+          </a:prstGeom>
+          <a:ln>
+            <a:noFill/>
+          </a:ln>
+        </p:spPr>
+        <p:style>
+          <a:lnRef idx="2">
+            <a:schemeClr val="dk1">
+              <a:shade val="50000"/>
+            </a:schemeClr>
+          </a:lnRef>
+          <a:fillRef idx="1">
+            <a:schemeClr val="dk1"/>
+          </a:fillRef>
+          <a:effectRef idx="0">
+            <a:schemeClr val="dk1"/>
+          </a:effectRef>
+          <a:fontRef idx="minor">
+            <a:schemeClr val="lt1"/>
+          </a:fontRef>
+        </p:style>
+        <p:txBody>
+          <a:bodyPr rtlCol="0" anchor="ctr"/>
+          <a:lstStyle/>
+          <a:p>
+            <a:pPr algn="ctr"/>
+            <a:endParaRPr lang="en-US"/>
+          </a:p>
+        </p:txBody>
+      </p:sp>
+      <p:sp>
+        <p:nvSpPr>
+          <p:cNvPr id="109" name="Isosceles Triangle 108"/>
+          <p:cNvSpPr/>
+          <p:nvPr/>
+        </p:nvSpPr>
+        <p:spPr>
+          <a:xfrm>
+            <a:off x="1228495" y="3740119"/>
+            <a:ext cx="52759" cy="45719"/>
+          </a:xfrm>
+          <a:prstGeom prst="triangle">
+            <a:avLst/>
+          </a:prstGeom>
+          <a:ln>
+            <a:noFill/>
+          </a:ln>
+        </p:spPr>
+        <p:style>
+          <a:lnRef idx="2">
+            <a:schemeClr val="dk1">
+              <a:shade val="50000"/>
+            </a:schemeClr>
+          </a:lnRef>
+          <a:fillRef idx="1">
+            <a:schemeClr val="dk1"/>
+          </a:fillRef>
+          <a:effectRef idx="0">
+            <a:schemeClr val="dk1"/>
+          </a:effectRef>
+          <a:fontRef idx="minor">
+            <a:schemeClr val="lt1"/>
+          </a:fontRef>
+        </p:style>
+        <p:txBody>
+          <a:bodyPr rtlCol="0" anchor="ctr"/>
+          <a:lstStyle/>
+          <a:p>
+            <a:pPr algn="ctr"/>
+            <a:endParaRPr lang="en-US"/>
+          </a:p>
+        </p:txBody>
+      </p:sp>
+      <p:cxnSp>
+        <p:nvCxnSpPr>
+          <p:cNvPr id="110" name="Straight Connector 109"/>
+          <p:cNvCxnSpPr/>
+          <p:nvPr/>
+        </p:nvCxnSpPr>
+        <p:spPr>
+          <a:xfrm flipV="1">
+            <a:off x="1045102" y="4694664"/>
+            <a:ext cx="0" cy="876300"/>
+          </a:xfrm>
+          <a:prstGeom prst="line">
+            <a:avLst/>
+          </a:prstGeom>
+          <a:ln w="12700">
+            <a:solidFill>
+              <a:srgbClr val="FF0000"/>
+            </a:solidFill>
+            <a:headEnd type="none" w="sm" len="sm"/>
+            <a:tailEnd type="none" w="sm" len="sm"/>
+          </a:ln>
+        </p:spPr>
+        <p:style>
+          <a:lnRef idx="2">
+            <a:schemeClr val="accent4"/>
+          </a:lnRef>
+          <a:fillRef idx="0">
+            <a:schemeClr val="accent4"/>
+          </a:fillRef>
+          <a:effectRef idx="1">
+            <a:schemeClr val="accent4"/>
+          </a:effectRef>
+          <a:fontRef idx="minor">
+            <a:schemeClr val="tx1"/>
+          </a:fontRef>
+        </p:style>
+      </p:cxnSp>
+      <p:sp>
+        <p:nvSpPr>
+          <p:cNvPr id="111" name="TextBox 110"/>
+          <p:cNvSpPr txBox="1"/>
+          <p:nvPr/>
+        </p:nvSpPr>
+        <p:spPr>
+          <a:xfrm rot="16200000">
+            <a:off x="538197" y="5049169"/>
+            <a:ext cx="802831" cy="246221"/>
+          </a:xfrm>
+          <a:prstGeom prst="rect">
+            <a:avLst/>
+          </a:prstGeom>
+          <a:noFill/>
+        </p:spPr>
+        <p:txBody>
+          <a:bodyPr wrap="square" rtlCol="0">
+            <a:spAutoFit/>
+          </a:bodyPr>
+          <a:lstStyle/>
+          <a:p>
+            <a:r>
+              <a:rPr lang="en-US" sz="1000" dirty="0" smtClean="0">
+                <a:solidFill>
+                  <a:srgbClr val="FF0000"/>
+                </a:solidFill>
+                <a:effectLst>
+                  <a:outerShdw blurRad="38100" dist="38100" dir="2700000" algn="tl">
+                    <a:srgbClr val="000000">
+                      <a:alpha val="43137"/>
+                    </a:srgbClr>
+                  </a:outerShdw>
+                </a:effectLst>
+              </a:rPr>
+              <a:t>BUSY</a:t>
+            </a:r>
+            <a:endParaRPr lang="en-US" sz="1000" dirty="0">
+              <a:solidFill>
+                <a:srgbClr val="FF0000"/>
+              </a:solidFill>
+              <a:effectLst>
+                <a:outerShdw blurRad="38100" dist="38100" dir="2700000" algn="tl">
+                  <a:srgbClr val="000000">
+                    <a:alpha val="43137"/>
+                  </a:srgbClr>
+                </a:outerShdw>
+              </a:effectLst>
+            </a:endParaRPr>
+          </a:p>
+        </p:txBody>
+      </p:sp>
+      <p:sp>
+        <p:nvSpPr>
+          <p:cNvPr id="112" name="Isosceles Triangle 111"/>
+          <p:cNvSpPr/>
+          <p:nvPr/>
+        </p:nvSpPr>
+        <p:spPr>
+          <a:xfrm rot="10800000">
+            <a:off x="1021475" y="5106145"/>
+            <a:ext cx="52759" cy="45719"/>
+          </a:xfrm>
+          <a:prstGeom prst="triangle">
+            <a:avLst/>
+          </a:prstGeom>
+          <a:ln>
+            <a:noFill/>
+          </a:ln>
+        </p:spPr>
+        <p:style>
+          <a:lnRef idx="2">
+            <a:schemeClr val="dk1">
+              <a:shade val="50000"/>
+            </a:schemeClr>
+          </a:lnRef>
+          <a:fillRef idx="1">
+            <a:schemeClr val="dk1"/>
+          </a:fillRef>
+          <a:effectRef idx="0">
+            <a:schemeClr val="dk1"/>
+          </a:effectRef>
+          <a:fontRef idx="minor">
+            <a:schemeClr val="lt1"/>
+          </a:fontRef>
+        </p:style>
+        <p:txBody>
+          <a:bodyPr rtlCol="0" anchor="ctr"/>
+          <a:lstStyle/>
+          <a:p>
+            <a:pPr algn="ctr"/>
+            <a:endParaRPr lang="en-US"/>
           </a:p>
         </p:txBody>
       </p:sp>

</xml_diff>

<commit_message>
Finished rough draft of documentation.
</commit_message>
<xml_diff>
--- a/Documentation/osc-block-design.pptx
+++ b/Documentation/osc-block-design.pptx
@@ -5,11 +5,12 @@
     <p:sldMasterId id="2147483648" r:id="rId1"/>
   </p:sldMasterIdLst>
   <p:notesMasterIdLst>
-    <p:notesMasterId r:id="rId4"/>
+    <p:notesMasterId r:id="rId5"/>
   </p:notesMasterIdLst>
   <p:sldIdLst>
     <p:sldId id="256" r:id="rId2"/>
     <p:sldId id="257" r:id="rId3"/>
+    <p:sldId id="258" r:id="rId4"/>
   </p:sldIdLst>
   <p:sldSz cx="9144000" cy="6858000" type="screen4x3"/>
   <p:notesSz cx="6858000" cy="9144000"/>
@@ -108,6 +109,22 @@
       </a:defRPr>
     </a:lvl9pPr>
   </p:defaultTextStyle>
+  <p:extLst>
+    <p:ext uri="{EFAFB233-063F-42B5-8137-9DF3F51BA10A}">
+      <p15:sldGuideLst xmlns:p15="http://schemas.microsoft.com/office/powerpoint/2012/main">
+        <p15:guide id="1" orient="horz" pos="2160">
+          <p15:clr>
+            <a:srgbClr val="A4A3A4"/>
+          </p15:clr>
+        </p15:guide>
+        <p15:guide id="2" pos="2880">
+          <p15:clr>
+            <a:srgbClr val="A4A3A4"/>
+          </p15:clr>
+        </p15:guide>
+      </p15:sldGuideLst>
+    </p:ext>
+  </p:extLst>
 </p:presentation>
 </file>
 
@@ -193,7 +210,7 @@
           <a:p>
             <a:fld id="{FFB0E71B-32EB-48BB-ACFC-DB0AFE2E6F1D}" type="datetimeFigureOut">
               <a:rPr lang="en-US" smtClean="0"/>
-              <a:t>2/23/2014</a:t>
+              <a:t>7/4/2014</a:t>
             </a:fld>
             <a:endParaRPr lang="en-US"/>
           </a:p>
@@ -642,7 +659,7 @@
           <a:p>
             <a:fld id="{08A35B09-16DA-4D86-8913-C92676B2D7D8}" type="datetimeFigureOut">
               <a:rPr lang="en-US" smtClean="0"/>
-              <a:t>2/23/2014</a:t>
+              <a:t>7/4/2014</a:t>
             </a:fld>
             <a:endParaRPr lang="en-US"/>
           </a:p>
@@ -812,7 +829,7 @@
           <a:p>
             <a:fld id="{08A35B09-16DA-4D86-8913-C92676B2D7D8}" type="datetimeFigureOut">
               <a:rPr lang="en-US" smtClean="0"/>
-              <a:t>2/23/2014</a:t>
+              <a:t>7/4/2014</a:t>
             </a:fld>
             <a:endParaRPr lang="en-US"/>
           </a:p>
@@ -992,7 +1009,7 @@
           <a:p>
             <a:fld id="{08A35B09-16DA-4D86-8913-C92676B2D7D8}" type="datetimeFigureOut">
               <a:rPr lang="en-US" smtClean="0"/>
-              <a:t>2/23/2014</a:t>
+              <a:t>7/4/2014</a:t>
             </a:fld>
             <a:endParaRPr lang="en-US"/>
           </a:p>
@@ -1162,7 +1179,7 @@
           <a:p>
             <a:fld id="{08A35B09-16DA-4D86-8913-C92676B2D7D8}" type="datetimeFigureOut">
               <a:rPr lang="en-US" smtClean="0"/>
-              <a:t>2/23/2014</a:t>
+              <a:t>7/4/2014</a:t>
             </a:fld>
             <a:endParaRPr lang="en-US"/>
           </a:p>
@@ -1408,7 +1425,7 @@
           <a:p>
             <a:fld id="{08A35B09-16DA-4D86-8913-C92676B2D7D8}" type="datetimeFigureOut">
               <a:rPr lang="en-US" smtClean="0"/>
-              <a:t>2/23/2014</a:t>
+              <a:t>7/4/2014</a:t>
             </a:fld>
             <a:endParaRPr lang="en-US"/>
           </a:p>
@@ -1696,7 +1713,7 @@
           <a:p>
             <a:fld id="{08A35B09-16DA-4D86-8913-C92676B2D7D8}" type="datetimeFigureOut">
               <a:rPr lang="en-US" smtClean="0"/>
-              <a:t>2/23/2014</a:t>
+              <a:t>7/4/2014</a:t>
             </a:fld>
             <a:endParaRPr lang="en-US"/>
           </a:p>
@@ -2118,7 +2135,7 @@
           <a:p>
             <a:fld id="{08A35B09-16DA-4D86-8913-C92676B2D7D8}" type="datetimeFigureOut">
               <a:rPr lang="en-US" smtClean="0"/>
-              <a:t>2/23/2014</a:t>
+              <a:t>7/4/2014</a:t>
             </a:fld>
             <a:endParaRPr lang="en-US"/>
           </a:p>
@@ -2236,7 +2253,7 @@
           <a:p>
             <a:fld id="{08A35B09-16DA-4D86-8913-C92676B2D7D8}" type="datetimeFigureOut">
               <a:rPr lang="en-US" smtClean="0"/>
-              <a:t>2/23/2014</a:t>
+              <a:t>7/4/2014</a:t>
             </a:fld>
             <a:endParaRPr lang="en-US"/>
           </a:p>
@@ -2331,7 +2348,7 @@
           <a:p>
             <a:fld id="{08A35B09-16DA-4D86-8913-C92676B2D7D8}" type="datetimeFigureOut">
               <a:rPr lang="en-US" smtClean="0"/>
-              <a:t>2/23/2014</a:t>
+              <a:t>7/4/2014</a:t>
             </a:fld>
             <a:endParaRPr lang="en-US"/>
           </a:p>
@@ -2608,7 +2625,7 @@
           <a:p>
             <a:fld id="{08A35B09-16DA-4D86-8913-C92676B2D7D8}" type="datetimeFigureOut">
               <a:rPr lang="en-US" smtClean="0"/>
-              <a:t>2/23/2014</a:t>
+              <a:t>7/4/2014</a:t>
             </a:fld>
             <a:endParaRPr lang="en-US"/>
           </a:p>
@@ -2861,7 +2878,7 @@
           <a:p>
             <a:fld id="{08A35B09-16DA-4D86-8913-C92676B2D7D8}" type="datetimeFigureOut">
               <a:rPr lang="en-US" smtClean="0"/>
-              <a:t>2/23/2014</a:t>
+              <a:t>7/4/2014</a:t>
             </a:fld>
             <a:endParaRPr lang="en-US"/>
           </a:p>
@@ -3074,7 +3091,7 @@
           <a:p>
             <a:fld id="{08A35B09-16DA-4D86-8913-C92676B2D7D8}" type="datetimeFigureOut">
               <a:rPr lang="en-US" smtClean="0"/>
-              <a:t>2/23/2014</a:t>
+              <a:t>7/4/2014</a:t>
             </a:fld>
             <a:endParaRPr lang="en-US"/>
           </a:p>
@@ -4264,49 +4281,7 @@
             <a:pPr algn="ctr"/>
             <a:r>
               <a:rPr lang="en-US" sz="1200" dirty="0" smtClean="0"/>
-              <a:t>A,B Vertical / Horizontal Offset Potentiometers</a:t>
-            </a:r>
-            <a:endParaRPr lang="en-US" sz="1200" dirty="0"/>
-          </a:p>
-        </p:txBody>
-      </p:sp>
-      <p:sp>
-        <p:nvSpPr>
-          <p:cNvPr id="36" name="Flowchart: Process 35"/>
-          <p:cNvSpPr/>
-          <p:nvPr/>
-        </p:nvSpPr>
-        <p:spPr>
-          <a:xfrm>
-            <a:off x="6553199" y="2632497"/>
-            <a:ext cx="530240" cy="361778"/>
-          </a:xfrm>
-          <a:prstGeom prst="flowChartProcess">
-            <a:avLst/>
-          </a:prstGeom>
-        </p:spPr>
-        <p:style>
-          <a:lnRef idx="1">
-            <a:schemeClr val="accent6"/>
-          </a:lnRef>
-          <a:fillRef idx="2">
-            <a:schemeClr val="accent6"/>
-          </a:fillRef>
-          <a:effectRef idx="1">
-            <a:schemeClr val="accent6"/>
-          </a:effectRef>
-          <a:fontRef idx="minor">
-            <a:schemeClr val="dk1"/>
-          </a:fontRef>
-        </p:style>
-        <p:txBody>
-          <a:bodyPr rtlCol="0" anchor="ctr"/>
-          <a:lstStyle/>
-          <a:p>
-            <a:pPr algn="ctr"/>
-            <a:r>
-              <a:rPr lang="en-US" sz="1200" dirty="0" smtClean="0"/>
-              <a:t>ADC</a:t>
+              <a:t>A,B Vertical Offset Potentiometers</a:t>
             </a:r>
             <a:endParaRPr lang="en-US" sz="1200" dirty="0"/>
           </a:p>
@@ -4687,53 +4662,45 @@
               <a:t>DC/AC/GND Select (A/B)</a:t>
             </a:r>
           </a:p>
+        </p:txBody>
+      </p:sp>
+      <p:sp>
+        <p:nvSpPr>
+          <p:cNvPr id="45" name="Flowchart: Process 44"/>
+          <p:cNvSpPr/>
+          <p:nvPr/>
+        </p:nvSpPr>
+        <p:spPr>
+          <a:xfrm>
+            <a:off x="1213060" y="1676044"/>
+            <a:ext cx="857511" cy="857511"/>
+          </a:xfrm>
+          <a:prstGeom prst="flowChartProcess">
+            <a:avLst/>
+          </a:prstGeom>
+        </p:spPr>
+        <p:style>
+          <a:lnRef idx="1">
+            <a:schemeClr val="accent6"/>
+          </a:lnRef>
+          <a:fillRef idx="2">
+            <a:schemeClr val="accent6"/>
+          </a:fillRef>
+          <a:effectRef idx="1">
+            <a:schemeClr val="accent6"/>
+          </a:effectRef>
+          <a:fontRef idx="minor">
+            <a:schemeClr val="dk1"/>
+          </a:fontRef>
+        </p:style>
+        <p:txBody>
+          <a:bodyPr rtlCol="0" anchor="ctr"/>
+          <a:lstStyle/>
           <a:p>
             <a:pPr algn="ctr"/>
             <a:r>
               <a:rPr lang="en-US" sz="1200" dirty="0" smtClean="0"/>
-              <a:t>A/B/Dual/Logic Select</a:t>
-            </a:r>
-            <a:endParaRPr lang="en-US" sz="1200" dirty="0"/>
-          </a:p>
-        </p:txBody>
-      </p:sp>
-      <p:sp>
-        <p:nvSpPr>
-          <p:cNvPr id="45" name="Flowchart: Process 44"/>
-          <p:cNvSpPr/>
-          <p:nvPr/>
-        </p:nvSpPr>
-        <p:spPr>
-          <a:xfrm>
-            <a:off x="1213060" y="1676044"/>
-            <a:ext cx="857511" cy="857511"/>
-          </a:xfrm>
-          <a:prstGeom prst="flowChartProcess">
-            <a:avLst/>
-          </a:prstGeom>
-        </p:spPr>
-        <p:style>
-          <a:lnRef idx="1">
-            <a:schemeClr val="accent6"/>
-          </a:lnRef>
-          <a:fillRef idx="2">
-            <a:schemeClr val="accent6"/>
-          </a:fillRef>
-          <a:effectRef idx="1">
-            <a:schemeClr val="accent6"/>
-          </a:effectRef>
-          <a:fontRef idx="minor">
-            <a:schemeClr val="dk1"/>
-          </a:fontRef>
-        </p:style>
-        <p:txBody>
-          <a:bodyPr rtlCol="0" anchor="ctr"/>
-          <a:lstStyle/>
-          <a:p>
-            <a:pPr algn="ctr"/>
-            <a:r>
-              <a:rPr lang="en-US" sz="1200" dirty="0" smtClean="0"/>
-              <a:t>EEPROM</a:t>
+              <a:t>Flash</a:t>
             </a:r>
             <a:endParaRPr lang="en-US" sz="1200" dirty="0"/>
           </a:p>
@@ -4777,48 +4744,6 @@
               <a:rPr lang="en-US" sz="1200" dirty="0" smtClean="0"/>
               <a:t>Display / Touchscreen</a:t>
             </a:r>
-          </a:p>
-        </p:txBody>
-      </p:sp>
-      <p:sp>
-        <p:nvSpPr>
-          <p:cNvPr id="48" name="Flowchart: Process 47"/>
-          <p:cNvSpPr/>
-          <p:nvPr/>
-        </p:nvSpPr>
-        <p:spPr>
-          <a:xfrm>
-            <a:off x="2661598" y="6044765"/>
-            <a:ext cx="491177" cy="351860"/>
-          </a:xfrm>
-          <a:prstGeom prst="flowChartProcess">
-            <a:avLst/>
-          </a:prstGeom>
-        </p:spPr>
-        <p:style>
-          <a:lnRef idx="1">
-            <a:schemeClr val="accent1"/>
-          </a:lnRef>
-          <a:fillRef idx="2">
-            <a:schemeClr val="accent1"/>
-          </a:fillRef>
-          <a:effectRef idx="1">
-            <a:schemeClr val="accent1"/>
-          </a:effectRef>
-          <a:fontRef idx="minor">
-            <a:schemeClr val="dk1"/>
-          </a:fontRef>
-        </p:style>
-        <p:txBody>
-          <a:bodyPr rtlCol="0" anchor="ctr"/>
-          <a:lstStyle/>
-          <a:p>
-            <a:pPr algn="ctr"/>
-            <a:r>
-              <a:rPr lang="en-US" sz="1200" dirty="0" smtClean="0"/>
-              <a:t>MUX</a:t>
-            </a:r>
-            <a:endParaRPr lang="en-US" sz="1200" dirty="0"/>
           </a:p>
         </p:txBody>
       </p:sp>
@@ -4866,48 +4791,6 @@
       </p:sp>
       <p:sp>
         <p:nvSpPr>
-          <p:cNvPr id="64" name="Flowchart: Process 63"/>
-          <p:cNvSpPr/>
-          <p:nvPr/>
-        </p:nvSpPr>
-        <p:spPr>
-          <a:xfrm>
-            <a:off x="6881700" y="4343400"/>
-            <a:ext cx="2030537" cy="169963"/>
-          </a:xfrm>
-          <a:prstGeom prst="flowChartProcess">
-            <a:avLst/>
-          </a:prstGeom>
-        </p:spPr>
-        <p:style>
-          <a:lnRef idx="1">
-            <a:schemeClr val="accent6"/>
-          </a:lnRef>
-          <a:fillRef idx="2">
-            <a:schemeClr val="accent6"/>
-          </a:fillRef>
-          <a:effectRef idx="1">
-            <a:schemeClr val="accent6"/>
-          </a:effectRef>
-          <a:fontRef idx="minor">
-            <a:schemeClr val="dk1"/>
-          </a:fontRef>
-        </p:style>
-        <p:txBody>
-          <a:bodyPr rtlCol="0" anchor="ctr"/>
-          <a:lstStyle/>
-          <a:p>
-            <a:pPr algn="ctr"/>
-            <a:r>
-              <a:rPr lang="en-US" sz="1200" dirty="0" smtClean="0"/>
-              <a:t>Voltage Reference</a:t>
-            </a:r>
-            <a:endParaRPr lang="en-US" sz="1200" dirty="0"/>
-          </a:p>
-        </p:txBody>
-      </p:sp>
-      <p:sp>
-        <p:nvSpPr>
           <p:cNvPr id="96" name="Flowchart: Process 95"/>
           <p:cNvSpPr/>
           <p:nvPr/>
@@ -4957,7 +4840,7 @@
         <p:spPr>
           <a:xfrm>
             <a:off x="351769" y="5507601"/>
-            <a:ext cx="553233" cy="497910"/>
+            <a:ext cx="553233" cy="381819"/>
           </a:xfrm>
           <a:prstGeom prst="flowChartProcess">
             <a:avLst/>
@@ -4985,48 +4868,6 @@
             <a:r>
               <a:rPr lang="en-US" sz="1200" dirty="0" smtClean="0"/>
               <a:t>JTAG</a:t>
-            </a:r>
-            <a:endParaRPr lang="en-US" sz="1200" dirty="0"/>
-          </a:p>
-        </p:txBody>
-      </p:sp>
-      <p:sp>
-        <p:nvSpPr>
-          <p:cNvPr id="98" name="Flowchart: Process 97"/>
-          <p:cNvSpPr/>
-          <p:nvPr/>
-        </p:nvSpPr>
-        <p:spPr>
-          <a:xfrm>
-            <a:off x="351768" y="6148568"/>
-            <a:ext cx="553233" cy="248955"/>
-          </a:xfrm>
-          <a:prstGeom prst="flowChartProcess">
-            <a:avLst/>
-          </a:prstGeom>
-        </p:spPr>
-        <p:style>
-          <a:lnRef idx="1">
-            <a:schemeClr val="accent3"/>
-          </a:lnRef>
-          <a:fillRef idx="2">
-            <a:schemeClr val="accent3"/>
-          </a:fillRef>
-          <a:effectRef idx="1">
-            <a:schemeClr val="accent3"/>
-          </a:effectRef>
-          <a:fontRef idx="minor">
-            <a:schemeClr val="dk1"/>
-          </a:fontRef>
-        </p:style>
-        <p:txBody>
-          <a:bodyPr rtlCol="0" anchor="ctr"/>
-          <a:lstStyle/>
-          <a:p>
-            <a:pPr algn="ctr"/>
-            <a:r>
-              <a:rPr lang="en-US" sz="1200" dirty="0" smtClean="0"/>
-              <a:t>USB</a:t>
             </a:r>
             <a:endParaRPr lang="en-US" sz="1200" dirty="0"/>
           </a:p>
@@ -5775,46 +5616,6 @@
       </p:cxnSp>
       <p:cxnSp>
         <p:nvCxnSpPr>
-          <p:cNvPr id="149" name="Straight Connector 148"/>
-          <p:cNvCxnSpPr>
-            <a:stCxn id="97" idx="2"/>
-            <a:endCxn id="98" idx="0"/>
-          </p:cNvCxnSpPr>
-          <p:nvPr/>
-        </p:nvCxnSpPr>
-        <p:spPr>
-          <a:xfrm flipH="1">
-            <a:off x="628385" y="6005511"/>
-            <a:ext cx="1" cy="143057"/>
-          </a:xfrm>
-          <a:prstGeom prst="line">
-            <a:avLst/>
-          </a:prstGeom>
-          <a:ln w="12700">
-            <a:solidFill>
-              <a:srgbClr val="FF00FF"/>
-            </a:solidFill>
-            <a:headEnd type="none" w="sm" len="sm"/>
-            <a:tailEnd type="none" w="sm" len="sm"/>
-          </a:ln>
-        </p:spPr>
-        <p:style>
-          <a:lnRef idx="2">
-            <a:schemeClr val="accent4"/>
-          </a:lnRef>
-          <a:fillRef idx="0">
-            <a:schemeClr val="accent4"/>
-          </a:fillRef>
-          <a:effectRef idx="1">
-            <a:schemeClr val="accent4"/>
-          </a:effectRef>
-          <a:fontRef idx="minor">
-            <a:schemeClr val="tx1"/>
-          </a:fontRef>
-        </p:style>
-      </p:cxnSp>
-      <p:cxnSp>
-        <p:nvCxnSpPr>
           <p:cNvPr id="163" name="Straight Connector 162"/>
           <p:cNvCxnSpPr>
             <a:stCxn id="7" idx="1"/>
@@ -5985,45 +5786,6 @@
           <a:ln w="12700">
             <a:solidFill>
               <a:srgbClr val="00FF00"/>
-            </a:solidFill>
-            <a:headEnd type="none" w="sm" len="sm"/>
-            <a:tailEnd type="none" w="sm" len="sm"/>
-          </a:ln>
-        </p:spPr>
-        <p:style>
-          <a:lnRef idx="2">
-            <a:schemeClr val="accent4"/>
-          </a:lnRef>
-          <a:fillRef idx="0">
-            <a:schemeClr val="accent4"/>
-          </a:fillRef>
-          <a:effectRef idx="1">
-            <a:schemeClr val="accent4"/>
-          </a:effectRef>
-          <a:fontRef idx="minor">
-            <a:schemeClr val="tx1"/>
-          </a:fontRef>
-        </p:style>
-      </p:cxnSp>
-      <p:cxnSp>
-        <p:nvCxnSpPr>
-          <p:cNvPr id="192" name="Straight Connector 191"/>
-          <p:cNvCxnSpPr>
-            <a:stCxn id="48" idx="1"/>
-          </p:cNvCxnSpPr>
-          <p:nvPr/>
-        </p:nvCxnSpPr>
-        <p:spPr>
-          <a:xfrm flipH="1">
-            <a:off x="2387100" y="6220695"/>
-            <a:ext cx="274498" cy="0"/>
-          </a:xfrm>
-          <a:prstGeom prst="line">
-            <a:avLst/>
-          </a:prstGeom>
-          <a:ln w="12700">
-            <a:solidFill>
-              <a:srgbClr val="FF00FF"/>
             </a:solidFill>
             <a:headEnd type="none" w="sm" len="sm"/>
             <a:tailEnd type="none" w="sm" len="sm"/>
@@ -6172,45 +5934,6 @@
       </p:cxnSp>
       <p:cxnSp>
         <p:nvCxnSpPr>
-          <p:cNvPr id="272" name="Straight Connector 271"/>
-          <p:cNvCxnSpPr>
-            <a:stCxn id="34" idx="1"/>
-          </p:cNvCxnSpPr>
-          <p:nvPr/>
-        </p:nvCxnSpPr>
-        <p:spPr>
-          <a:xfrm flipH="1" flipV="1">
-            <a:off x="7083439" y="2814382"/>
-            <a:ext cx="132943" cy="1"/>
-          </a:xfrm>
-          <a:prstGeom prst="line">
-            <a:avLst/>
-          </a:prstGeom>
-          <a:ln w="12700">
-            <a:solidFill>
-              <a:srgbClr val="00FFFF"/>
-            </a:solidFill>
-            <a:headEnd type="none" w="sm" len="sm"/>
-            <a:tailEnd type="none" w="sm" len="sm"/>
-          </a:ln>
-        </p:spPr>
-        <p:style>
-          <a:lnRef idx="2">
-            <a:schemeClr val="accent4"/>
-          </a:lnRef>
-          <a:fillRef idx="0">
-            <a:schemeClr val="accent4"/>
-          </a:fillRef>
-          <a:effectRef idx="1">
-            <a:schemeClr val="accent4"/>
-          </a:effectRef>
-          <a:fontRef idx="minor">
-            <a:schemeClr val="tx1"/>
-          </a:fontRef>
-        </p:style>
-      </p:cxnSp>
-      <p:cxnSp>
-        <p:nvCxnSpPr>
           <p:cNvPr id="278" name="Straight Connector 277"/>
           <p:cNvCxnSpPr/>
           <p:nvPr/>
@@ -6593,45 +6316,6 @@
           <a:xfrm flipH="1">
             <a:off x="5203199" y="1874998"/>
             <a:ext cx="2013183" cy="0"/>
-          </a:xfrm>
-          <a:prstGeom prst="line">
-            <a:avLst/>
-          </a:prstGeom>
-          <a:ln w="12700">
-            <a:solidFill>
-              <a:srgbClr val="00FFFF"/>
-            </a:solidFill>
-            <a:headEnd type="none" w="sm" len="sm"/>
-            <a:tailEnd type="none" w="sm" len="sm"/>
-          </a:ln>
-        </p:spPr>
-        <p:style>
-          <a:lnRef idx="2">
-            <a:schemeClr val="accent4"/>
-          </a:lnRef>
-          <a:fillRef idx="0">
-            <a:schemeClr val="accent4"/>
-          </a:fillRef>
-          <a:effectRef idx="1">
-            <a:schemeClr val="accent4"/>
-          </a:effectRef>
-          <a:fontRef idx="minor">
-            <a:schemeClr val="tx1"/>
-          </a:fontRef>
-        </p:style>
-      </p:cxnSp>
-      <p:cxnSp>
-        <p:nvCxnSpPr>
-          <p:cNvPr id="333" name="Straight Connector 332"/>
-          <p:cNvCxnSpPr>
-            <a:stCxn id="41" idx="1"/>
-          </p:cNvCxnSpPr>
-          <p:nvPr/>
-        </p:nvCxnSpPr>
-        <p:spPr>
-          <a:xfrm flipH="1" flipV="1">
-            <a:off x="5203200" y="3248494"/>
-            <a:ext cx="2013184" cy="1766"/>
           </a:xfrm>
           <a:prstGeom prst="line">
             <a:avLst/>
@@ -7393,8 +7077,8 @@
         </p:nvCxnSpPr>
         <p:spPr>
           <a:xfrm>
-            <a:off x="6775119" y="2994275"/>
-            <a:ext cx="0" cy="2563941"/>
+            <a:off x="6775119" y="733557"/>
+            <a:ext cx="1" cy="4824659"/>
           </a:xfrm>
           <a:prstGeom prst="line">
             <a:avLst/>
@@ -7732,8 +7416,8 @@
         </p:nvCxnSpPr>
         <p:spPr>
           <a:xfrm>
-            <a:off x="6669599" y="2994275"/>
-            <a:ext cx="0" cy="1612565"/>
+            <a:off x="6669599" y="3152024"/>
+            <a:ext cx="0" cy="1454816"/>
           </a:xfrm>
           <a:prstGeom prst="line">
             <a:avLst/>
@@ -7808,46 +7492,6 @@
           <a:xfrm>
             <a:off x="7903199" y="4606840"/>
             <a:ext cx="0" cy="1122202"/>
-          </a:xfrm>
-          <a:prstGeom prst="line">
-            <a:avLst/>
-          </a:prstGeom>
-          <a:ln w="12700">
-            <a:solidFill>
-              <a:srgbClr val="FF0000"/>
-            </a:solidFill>
-            <a:headEnd type="none" w="sm" len="sm"/>
-            <a:tailEnd type="none" w="sm" len="sm"/>
-          </a:ln>
-        </p:spPr>
-        <p:style>
-          <a:lnRef idx="2">
-            <a:schemeClr val="accent4"/>
-          </a:lnRef>
-          <a:fillRef idx="0">
-            <a:schemeClr val="accent4"/>
-          </a:fillRef>
-          <a:effectRef idx="1">
-            <a:schemeClr val="accent4"/>
-          </a:effectRef>
-          <a:fontRef idx="minor">
-            <a:schemeClr val="tx1"/>
-          </a:fontRef>
-        </p:style>
-      </p:cxnSp>
-      <p:cxnSp>
-        <p:nvCxnSpPr>
-          <p:cNvPr id="475" name="Straight Connector 474"/>
-          <p:cNvCxnSpPr>
-            <a:stCxn id="17" idx="3"/>
-            <a:endCxn id="20" idx="1"/>
-          </p:cNvCxnSpPr>
-          <p:nvPr/>
-        </p:nvCxnSpPr>
-        <p:spPr>
-          <a:xfrm>
-            <a:off x="7816340" y="4938540"/>
-            <a:ext cx="164532" cy="0"/>
           </a:xfrm>
           <a:prstGeom prst="line">
             <a:avLst/>
@@ -8032,49 +7676,6 @@
           </a:fontRef>
         </p:style>
       </p:cxnSp>
-      <p:sp>
-        <p:nvSpPr>
-          <p:cNvPr id="551" name="TextBox 550"/>
-          <p:cNvSpPr txBox="1"/>
-          <p:nvPr/>
-        </p:nvSpPr>
-        <p:spPr>
-          <a:xfrm>
-            <a:off x="5695054" y="304800"/>
-            <a:ext cx="3214023" cy="646331"/>
-          </a:xfrm>
-          <a:prstGeom prst="rect">
-            <a:avLst/>
-          </a:prstGeom>
-          <a:noFill/>
-        </p:spPr>
-        <p:txBody>
-          <a:bodyPr wrap="square" rtlCol="0">
-            <a:spAutoFit/>
-          </a:bodyPr>
-          <a:lstStyle/>
-          <a:p>
-            <a:pPr algn="r"/>
-            <a:r>
-              <a:rPr lang="en-US" dirty="0" smtClean="0"/>
-              <a:t>Albert </a:t>
-            </a:r>
-            <a:r>
-              <a:rPr lang="en-US" dirty="0" err="1" smtClean="0"/>
-              <a:t>Gural</a:t>
-            </a:r>
-            <a:endParaRPr lang="en-US" dirty="0"/>
-          </a:p>
-          <a:p>
-            <a:pPr algn="r"/>
-            <a:r>
-              <a:rPr lang="en-US" dirty="0" smtClean="0"/>
-              <a:t>EE52 – FPGA Oscilloscope</a:t>
-            </a:r>
-            <a:endParaRPr lang="en-US" dirty="0"/>
-          </a:p>
-        </p:txBody>
-      </p:sp>
       <p:sp>
         <p:nvSpPr>
           <p:cNvPr id="557" name="Isosceles Triangle 556"/>
@@ -9429,92 +9030,6 @@
       </p:grpSp>
       <p:sp>
         <p:nvSpPr>
-          <p:cNvPr id="601" name="Isosceles Triangle 600"/>
-          <p:cNvSpPr/>
-          <p:nvPr/>
-        </p:nvSpPr>
-        <p:spPr>
-          <a:xfrm>
-            <a:off x="6636019" y="3007800"/>
-            <a:ext cx="52759" cy="45719"/>
-          </a:xfrm>
-          <a:prstGeom prst="triangle">
-            <a:avLst/>
-          </a:prstGeom>
-          <a:ln>
-            <a:noFill/>
-          </a:ln>
-        </p:spPr>
-        <p:style>
-          <a:lnRef idx="2">
-            <a:schemeClr val="dk1">
-              <a:shade val="50000"/>
-            </a:schemeClr>
-          </a:lnRef>
-          <a:fillRef idx="1">
-            <a:schemeClr val="dk1"/>
-          </a:fillRef>
-          <a:effectRef idx="0">
-            <a:schemeClr val="dk1"/>
-          </a:effectRef>
-          <a:fontRef idx="minor">
-            <a:schemeClr val="lt1"/>
-          </a:fontRef>
-        </p:style>
-        <p:txBody>
-          <a:bodyPr rtlCol="0" anchor="ctr"/>
-          <a:lstStyle/>
-          <a:p>
-            <a:pPr algn="ctr"/>
-            <a:endParaRPr lang="en-US"/>
-          </a:p>
-        </p:txBody>
-      </p:sp>
-      <p:sp>
-        <p:nvSpPr>
-          <p:cNvPr id="602" name="Isosceles Triangle 601"/>
-          <p:cNvSpPr/>
-          <p:nvPr/>
-        </p:nvSpPr>
-        <p:spPr>
-          <a:xfrm flipV="1">
-            <a:off x="6749029" y="3007800"/>
-            <a:ext cx="52759" cy="45719"/>
-          </a:xfrm>
-          <a:prstGeom prst="triangle">
-            <a:avLst/>
-          </a:prstGeom>
-          <a:ln>
-            <a:noFill/>
-          </a:ln>
-        </p:spPr>
-        <p:style>
-          <a:lnRef idx="2">
-            <a:schemeClr val="dk1">
-              <a:shade val="50000"/>
-            </a:schemeClr>
-          </a:lnRef>
-          <a:fillRef idx="1">
-            <a:schemeClr val="dk1"/>
-          </a:fillRef>
-          <a:effectRef idx="0">
-            <a:schemeClr val="dk1"/>
-          </a:effectRef>
-          <a:fontRef idx="minor">
-            <a:schemeClr val="lt1"/>
-          </a:fontRef>
-        </p:style>
-        <p:txBody>
-          <a:bodyPr rtlCol="0" anchor="ctr"/>
-          <a:lstStyle/>
-          <a:p>
-            <a:pPr algn="ctr"/>
-            <a:endParaRPr lang="en-US"/>
-          </a:p>
-        </p:txBody>
-      </p:sp>
-      <p:sp>
-        <p:nvSpPr>
           <p:cNvPr id="605" name="Isosceles Triangle 604"/>
           <p:cNvSpPr/>
           <p:nvPr/>
@@ -10663,13 +10178,13 @@
       </p:sp>
       <p:sp>
         <p:nvSpPr>
-          <p:cNvPr id="654" name="Isosceles Triangle 653"/>
+          <p:cNvPr id="655" name="Isosceles Triangle 654"/>
           <p:cNvSpPr/>
           <p:nvPr/>
         </p:nvSpPr>
         <p:spPr>
           <a:xfrm rot="5400000" flipV="1">
-            <a:off x="7799360" y="4918790"/>
+            <a:off x="7159279" y="3789905"/>
             <a:ext cx="52759" cy="45719"/>
           </a:xfrm>
           <a:prstGeom prst="triangle">
@@ -10706,13 +10221,13 @@
       </p:sp>
       <p:sp>
         <p:nvSpPr>
-          <p:cNvPr id="655" name="Isosceles Triangle 654"/>
+          <p:cNvPr id="656" name="Isosceles Triangle 655"/>
           <p:cNvSpPr/>
           <p:nvPr/>
         </p:nvSpPr>
         <p:spPr>
           <a:xfrm rot="5400000" flipV="1">
-            <a:off x="7159279" y="3789905"/>
+            <a:off x="7808886" y="5710570"/>
             <a:ext cx="52759" cy="45719"/>
           </a:xfrm>
           <a:prstGeom prst="triangle">
@@ -10749,13 +10264,13 @@
       </p:sp>
       <p:sp>
         <p:nvSpPr>
-          <p:cNvPr id="656" name="Isosceles Triangle 655"/>
+          <p:cNvPr id="658" name="Isosceles Triangle 657"/>
           <p:cNvSpPr/>
           <p:nvPr/>
         </p:nvSpPr>
         <p:spPr>
-          <a:xfrm rot="5400000" flipV="1">
-            <a:off x="7808886" y="5710570"/>
+          <a:xfrm rot="5400000">
+            <a:off x="7937471" y="5710570"/>
             <a:ext cx="52759" cy="45719"/>
           </a:xfrm>
           <a:prstGeom prst="triangle">
@@ -10792,13 +10307,13 @@
       </p:sp>
       <p:sp>
         <p:nvSpPr>
-          <p:cNvPr id="657" name="Isosceles Triangle 656"/>
+          <p:cNvPr id="659" name="Isosceles Triangle 658"/>
           <p:cNvSpPr/>
           <p:nvPr/>
         </p:nvSpPr>
         <p:spPr>
-          <a:xfrm rot="5400000">
-            <a:off x="7943904" y="4918790"/>
+          <a:xfrm rot="5400000" flipV="1">
+            <a:off x="7159280" y="3227735"/>
             <a:ext cx="52759" cy="45719"/>
           </a:xfrm>
           <a:prstGeom prst="triangle">
@@ -10835,13 +10350,13 @@
       </p:sp>
       <p:sp>
         <p:nvSpPr>
-          <p:cNvPr id="658" name="Isosceles Triangle 657"/>
+          <p:cNvPr id="660" name="Isosceles Triangle 659"/>
           <p:cNvSpPr/>
           <p:nvPr/>
         </p:nvSpPr>
         <p:spPr>
-          <a:xfrm rot="5400000">
-            <a:off x="7937471" y="5710570"/>
+          <a:xfrm rot="5400000" flipV="1">
+            <a:off x="7159280" y="2793976"/>
             <a:ext cx="52759" cy="45719"/>
           </a:xfrm>
           <a:prstGeom prst="triangle">
@@ -10878,13 +10393,13 @@
       </p:sp>
       <p:sp>
         <p:nvSpPr>
-          <p:cNvPr id="659" name="Isosceles Triangle 658"/>
+          <p:cNvPr id="661" name="Isosceles Triangle 660"/>
           <p:cNvSpPr/>
           <p:nvPr/>
         </p:nvSpPr>
         <p:spPr>
           <a:xfrm rot="5400000" flipV="1">
-            <a:off x="7159280" y="3227735"/>
+            <a:off x="7159280" y="2346668"/>
             <a:ext cx="52759" cy="45719"/>
           </a:xfrm>
           <a:prstGeom prst="triangle">
@@ -10921,13 +10436,13 @@
       </p:sp>
       <p:sp>
         <p:nvSpPr>
-          <p:cNvPr id="660" name="Isosceles Triangle 659"/>
+          <p:cNvPr id="662" name="Isosceles Triangle 661"/>
           <p:cNvSpPr/>
           <p:nvPr/>
         </p:nvSpPr>
         <p:spPr>
           <a:xfrm rot="5400000" flipV="1">
-            <a:off x="7159280" y="2793976"/>
+            <a:off x="7159280" y="1856135"/>
             <a:ext cx="52759" cy="45719"/>
           </a:xfrm>
           <a:prstGeom prst="triangle">
@@ -10964,92 +10479,6 @@
       </p:sp>
       <p:sp>
         <p:nvSpPr>
-          <p:cNvPr id="661" name="Isosceles Triangle 660"/>
-          <p:cNvSpPr/>
-          <p:nvPr/>
-        </p:nvSpPr>
-        <p:spPr>
-          <a:xfrm rot="5400000" flipV="1">
-            <a:off x="7159280" y="2346668"/>
-            <a:ext cx="52759" cy="45719"/>
-          </a:xfrm>
-          <a:prstGeom prst="triangle">
-            <a:avLst/>
-          </a:prstGeom>
-          <a:ln>
-            <a:noFill/>
-          </a:ln>
-        </p:spPr>
-        <p:style>
-          <a:lnRef idx="2">
-            <a:schemeClr val="dk1">
-              <a:shade val="50000"/>
-            </a:schemeClr>
-          </a:lnRef>
-          <a:fillRef idx="1">
-            <a:schemeClr val="dk1"/>
-          </a:fillRef>
-          <a:effectRef idx="0">
-            <a:schemeClr val="dk1"/>
-          </a:effectRef>
-          <a:fontRef idx="minor">
-            <a:schemeClr val="lt1"/>
-          </a:fontRef>
-        </p:style>
-        <p:txBody>
-          <a:bodyPr rtlCol="0" anchor="ctr"/>
-          <a:lstStyle/>
-          <a:p>
-            <a:pPr algn="ctr"/>
-            <a:endParaRPr lang="en-US"/>
-          </a:p>
-        </p:txBody>
-      </p:sp>
-      <p:sp>
-        <p:nvSpPr>
-          <p:cNvPr id="662" name="Isosceles Triangle 661"/>
-          <p:cNvSpPr/>
-          <p:nvPr/>
-        </p:nvSpPr>
-        <p:spPr>
-          <a:xfrm rot="5400000" flipV="1">
-            <a:off x="7159280" y="1856135"/>
-            <a:ext cx="52759" cy="45719"/>
-          </a:xfrm>
-          <a:prstGeom prst="triangle">
-            <a:avLst/>
-          </a:prstGeom>
-          <a:ln>
-            <a:noFill/>
-          </a:ln>
-        </p:spPr>
-        <p:style>
-          <a:lnRef idx="2">
-            <a:schemeClr val="dk1">
-              <a:shade val="50000"/>
-            </a:schemeClr>
-          </a:lnRef>
-          <a:fillRef idx="1">
-            <a:schemeClr val="dk1"/>
-          </a:fillRef>
-          <a:effectRef idx="0">
-            <a:schemeClr val="dk1"/>
-          </a:effectRef>
-          <a:fontRef idx="minor">
-            <a:schemeClr val="lt1"/>
-          </a:fontRef>
-        </p:style>
-        <p:txBody>
-          <a:bodyPr rtlCol="0" anchor="ctr"/>
-          <a:lstStyle/>
-          <a:p>
-            <a:pPr algn="ctr"/>
-            <a:endParaRPr lang="en-US"/>
-          </a:p>
-        </p:txBody>
-      </p:sp>
-      <p:sp>
-        <p:nvSpPr>
           <p:cNvPr id="663" name="Isosceles Triangle 662"/>
           <p:cNvSpPr/>
           <p:nvPr/>
@@ -11057,92 +10486,6 @@
         <p:spPr>
           <a:xfrm rot="5400000" flipV="1">
             <a:off x="7159280" y="1408087"/>
-            <a:ext cx="52759" cy="45719"/>
-          </a:xfrm>
-          <a:prstGeom prst="triangle">
-            <a:avLst/>
-          </a:prstGeom>
-          <a:ln>
-            <a:noFill/>
-          </a:ln>
-        </p:spPr>
-        <p:style>
-          <a:lnRef idx="2">
-            <a:schemeClr val="dk1">
-              <a:shade val="50000"/>
-            </a:schemeClr>
-          </a:lnRef>
-          <a:fillRef idx="1">
-            <a:schemeClr val="dk1"/>
-          </a:fillRef>
-          <a:effectRef idx="0">
-            <a:schemeClr val="dk1"/>
-          </a:effectRef>
-          <a:fontRef idx="minor">
-            <a:schemeClr val="lt1"/>
-          </a:fontRef>
-        </p:style>
-        <p:txBody>
-          <a:bodyPr rtlCol="0" anchor="ctr"/>
-          <a:lstStyle/>
-          <a:p>
-            <a:pPr algn="ctr"/>
-            <a:endParaRPr lang="en-US"/>
-          </a:p>
-        </p:txBody>
-      </p:sp>
-      <p:sp>
-        <p:nvSpPr>
-          <p:cNvPr id="666" name="Isosceles Triangle 665"/>
-          <p:cNvSpPr/>
-          <p:nvPr/>
-        </p:nvSpPr>
-        <p:spPr>
-          <a:xfrm flipV="1">
-            <a:off x="604333" y="6064570"/>
-            <a:ext cx="52759" cy="45719"/>
-          </a:xfrm>
-          <a:prstGeom prst="triangle">
-            <a:avLst/>
-          </a:prstGeom>
-          <a:ln>
-            <a:noFill/>
-          </a:ln>
-        </p:spPr>
-        <p:style>
-          <a:lnRef idx="2">
-            <a:schemeClr val="dk1">
-              <a:shade val="50000"/>
-            </a:schemeClr>
-          </a:lnRef>
-          <a:fillRef idx="1">
-            <a:schemeClr val="dk1"/>
-          </a:fillRef>
-          <a:effectRef idx="0">
-            <a:schemeClr val="dk1"/>
-          </a:effectRef>
-          <a:fontRef idx="minor">
-            <a:schemeClr val="lt1"/>
-          </a:fontRef>
-        </p:style>
-        <p:txBody>
-          <a:bodyPr rtlCol="0" anchor="ctr"/>
-          <a:lstStyle/>
-          <a:p>
-            <a:pPr algn="ctr"/>
-            <a:endParaRPr lang="en-US"/>
-          </a:p>
-        </p:txBody>
-      </p:sp>
-      <p:sp>
-        <p:nvSpPr>
-          <p:cNvPr id="668" name="Isosceles Triangle 667"/>
-          <p:cNvSpPr/>
-          <p:nvPr/>
-        </p:nvSpPr>
-        <p:spPr>
-          <a:xfrm rot="5400000" flipV="1">
-            <a:off x="2389161" y="6199535"/>
             <a:ext cx="52759" cy="45719"/>
           </a:xfrm>
           <a:prstGeom prst="triangle">
@@ -12511,13 +11854,14 @@
           <p:cNvPr id="849" name="Straight Connector 848"/>
           <p:cNvCxnSpPr>
             <a:stCxn id="844" idx="1"/>
+            <a:endCxn id="857" idx="3"/>
           </p:cNvCxnSpPr>
           <p:nvPr/>
         </p:nvCxnSpPr>
         <p:spPr>
           <a:xfrm flipH="1">
-            <a:off x="3152776" y="6119063"/>
-            <a:ext cx="280492" cy="0"/>
+            <a:off x="2432180" y="6119063"/>
+            <a:ext cx="1001088" cy="3301"/>
           </a:xfrm>
           <a:prstGeom prst="line">
             <a:avLst/>
@@ -12550,13 +11894,14 @@
           <p:cNvPr id="853" name="Straight Connector 852"/>
           <p:cNvCxnSpPr>
             <a:stCxn id="845" idx="1"/>
+            <a:endCxn id="858" idx="3"/>
           </p:cNvCxnSpPr>
           <p:nvPr/>
         </p:nvCxnSpPr>
         <p:spPr>
-          <a:xfrm flipH="1">
-            <a:off x="3152778" y="6322325"/>
-            <a:ext cx="278542" cy="0"/>
+          <a:xfrm flipH="1" flipV="1">
+            <a:off x="2432180" y="6322036"/>
+            <a:ext cx="999140" cy="289"/>
           </a:xfrm>
           <a:prstGeom prst="line">
             <a:avLst/>
@@ -12592,7 +11937,7 @@
         </p:nvSpPr>
         <p:spPr>
           <a:xfrm rot="5400000" flipV="1">
-            <a:off x="3149258" y="6099504"/>
+            <a:off x="2382941" y="6099504"/>
             <a:ext cx="52759" cy="45719"/>
           </a:xfrm>
           <a:prstGeom prst="triangle">
@@ -12635,7 +11980,7 @@
         </p:nvSpPr>
         <p:spPr>
           <a:xfrm rot="5400000" flipV="1">
-            <a:off x="3149258" y="6299176"/>
+            <a:off x="2382941" y="6299176"/>
             <a:ext cx="52759" cy="45719"/>
           </a:xfrm>
           <a:prstGeom prst="triangle">
@@ -13741,8 +13086,8 @@
         </p:nvCxnSpPr>
         <p:spPr>
           <a:xfrm flipH="1">
-            <a:off x="3152775" y="6041531"/>
-            <a:ext cx="273122" cy="0"/>
+            <a:off x="3295644" y="6041531"/>
+            <a:ext cx="130253" cy="0"/>
           </a:xfrm>
           <a:prstGeom prst="line">
             <a:avLst/>
@@ -13930,49 +13275,6 @@
         <p:spPr>
           <a:xfrm rot="5400000">
             <a:off x="3379761" y="6228105"/>
-            <a:ext cx="52759" cy="45719"/>
-          </a:xfrm>
-          <a:prstGeom prst="triangle">
-            <a:avLst/>
-          </a:prstGeom>
-          <a:ln>
-            <a:noFill/>
-          </a:ln>
-        </p:spPr>
-        <p:style>
-          <a:lnRef idx="2">
-            <a:schemeClr val="dk1">
-              <a:shade val="50000"/>
-            </a:schemeClr>
-          </a:lnRef>
-          <a:fillRef idx="1">
-            <a:schemeClr val="dk1"/>
-          </a:fillRef>
-          <a:effectRef idx="0">
-            <a:schemeClr val="dk1"/>
-          </a:effectRef>
-          <a:fontRef idx="minor">
-            <a:schemeClr val="lt1"/>
-          </a:fontRef>
-        </p:style>
-        <p:txBody>
-          <a:bodyPr rtlCol="0" anchor="ctr"/>
-          <a:lstStyle/>
-          <a:p>
-            <a:pPr algn="ctr"/>
-            <a:endParaRPr lang="en-US"/>
-          </a:p>
-        </p:txBody>
-      </p:sp>
-      <p:sp>
-        <p:nvSpPr>
-          <p:cNvPr id="982" name="Isosceles Triangle 981"/>
-          <p:cNvSpPr/>
-          <p:nvPr/>
-        </p:nvSpPr>
-        <p:spPr>
-          <a:xfrm rot="5400000" flipV="1">
-            <a:off x="3151161" y="6021525"/>
             <a:ext cx="52759" cy="45719"/>
           </a:xfrm>
           <a:prstGeom prst="triangle">
@@ -14374,49 +13676,6 @@
           </a:p>
         </p:txBody>
       </p:sp>
-      <p:sp>
-        <p:nvSpPr>
-          <p:cNvPr id="1012" name="Isosceles Triangle 1011"/>
-          <p:cNvSpPr/>
-          <p:nvPr/>
-        </p:nvSpPr>
-        <p:spPr>
-          <a:xfrm rot="5400000" flipV="1">
-            <a:off x="2617761" y="6199161"/>
-            <a:ext cx="52759" cy="45719"/>
-          </a:xfrm>
-          <a:prstGeom prst="triangle">
-            <a:avLst/>
-          </a:prstGeom>
-          <a:ln>
-            <a:noFill/>
-          </a:ln>
-        </p:spPr>
-        <p:style>
-          <a:lnRef idx="2">
-            <a:schemeClr val="dk1">
-              <a:shade val="50000"/>
-            </a:schemeClr>
-          </a:lnRef>
-          <a:fillRef idx="1">
-            <a:schemeClr val="dk1"/>
-          </a:fillRef>
-          <a:effectRef idx="0">
-            <a:schemeClr val="dk1"/>
-          </a:effectRef>
-          <a:fontRef idx="minor">
-            <a:schemeClr val="lt1"/>
-          </a:fontRef>
-        </p:style>
-        <p:txBody>
-          <a:bodyPr rtlCol="0" anchor="ctr"/>
-          <a:lstStyle/>
-          <a:p>
-            <a:pPr algn="ctr"/>
-            <a:endParaRPr lang="en-US"/>
-          </a:p>
-        </p:txBody>
-      </p:sp>
       <p:cxnSp>
         <p:nvCxnSpPr>
           <p:cNvPr id="1018" name="Straight Connector 1017"/>
@@ -14871,129 +14130,6 @@
               <a:t>Level Shift</a:t>
             </a:r>
             <a:endParaRPr lang="en-US" sz="1200" dirty="0"/>
-          </a:p>
-        </p:txBody>
-      </p:sp>
-      <p:cxnSp>
-        <p:nvCxnSpPr>
-          <p:cNvPr id="1040" name="Straight Connector 1039"/>
-          <p:cNvCxnSpPr/>
-          <p:nvPr/>
-        </p:nvCxnSpPr>
-        <p:spPr>
-          <a:xfrm>
-            <a:off x="7819193" y="5384570"/>
-            <a:ext cx="164531" cy="0"/>
-          </a:xfrm>
-          <a:prstGeom prst="line">
-            <a:avLst/>
-          </a:prstGeom>
-          <a:ln w="12700">
-            <a:solidFill>
-              <a:srgbClr val="FF0000"/>
-            </a:solidFill>
-            <a:headEnd type="none" w="sm" len="sm"/>
-            <a:tailEnd type="none" w="sm" len="sm"/>
-          </a:ln>
-        </p:spPr>
-        <p:style>
-          <a:lnRef idx="2">
-            <a:schemeClr val="accent4"/>
-          </a:lnRef>
-          <a:fillRef idx="0">
-            <a:schemeClr val="accent4"/>
-          </a:fillRef>
-          <a:effectRef idx="1">
-            <a:schemeClr val="accent4"/>
-          </a:effectRef>
-          <a:fontRef idx="minor">
-            <a:schemeClr val="tx1"/>
-          </a:fontRef>
-        </p:style>
-      </p:cxnSp>
-      <p:sp>
-        <p:nvSpPr>
-          <p:cNvPr id="1041" name="Isosceles Triangle 1040"/>
-          <p:cNvSpPr/>
-          <p:nvPr/>
-        </p:nvSpPr>
-        <p:spPr>
-          <a:xfrm rot="5400000" flipV="1">
-            <a:off x="7811739" y="5366098"/>
-            <a:ext cx="52759" cy="45719"/>
-          </a:xfrm>
-          <a:prstGeom prst="triangle">
-            <a:avLst/>
-          </a:prstGeom>
-          <a:ln>
-            <a:noFill/>
-          </a:ln>
-        </p:spPr>
-        <p:style>
-          <a:lnRef idx="2">
-            <a:schemeClr val="dk1">
-              <a:shade val="50000"/>
-            </a:schemeClr>
-          </a:lnRef>
-          <a:fillRef idx="1">
-            <a:schemeClr val="dk1"/>
-          </a:fillRef>
-          <a:effectRef idx="0">
-            <a:schemeClr val="dk1"/>
-          </a:effectRef>
-          <a:fontRef idx="minor">
-            <a:schemeClr val="lt1"/>
-          </a:fontRef>
-        </p:style>
-        <p:txBody>
-          <a:bodyPr rtlCol="0" anchor="ctr"/>
-          <a:lstStyle/>
-          <a:p>
-            <a:pPr algn="ctr"/>
-            <a:endParaRPr lang="en-US"/>
-          </a:p>
-        </p:txBody>
-      </p:sp>
-      <p:sp>
-        <p:nvSpPr>
-          <p:cNvPr id="1042" name="Isosceles Triangle 1041"/>
-          <p:cNvSpPr/>
-          <p:nvPr/>
-        </p:nvSpPr>
-        <p:spPr>
-          <a:xfrm rot="5400000">
-            <a:off x="7940324" y="5366098"/>
-            <a:ext cx="52759" cy="45719"/>
-          </a:xfrm>
-          <a:prstGeom prst="triangle">
-            <a:avLst/>
-          </a:prstGeom>
-          <a:ln>
-            <a:noFill/>
-          </a:ln>
-        </p:spPr>
-        <p:style>
-          <a:lnRef idx="2">
-            <a:schemeClr val="dk1">
-              <a:shade val="50000"/>
-            </a:schemeClr>
-          </a:lnRef>
-          <a:fillRef idx="1">
-            <a:schemeClr val="dk1"/>
-          </a:fillRef>
-          <a:effectRef idx="0">
-            <a:schemeClr val="dk1"/>
-          </a:effectRef>
-          <a:fontRef idx="minor">
-            <a:schemeClr val="lt1"/>
-          </a:fontRef>
-        </p:style>
-        <p:txBody>
-          <a:bodyPr rtlCol="0" anchor="ctr"/>
-          <a:lstStyle/>
-          <a:p>
-            <a:pPr algn="ctr"/>
-            <a:endParaRPr lang="en-US"/>
           </a:p>
         </p:txBody>
       </p:sp>
@@ -15746,80 +14882,6 @@
       </p:grpSp>
       <p:cxnSp>
         <p:nvCxnSpPr>
-          <p:cNvPr id="305" name="Straight Connector 304"/>
-          <p:cNvCxnSpPr/>
-          <p:nvPr/>
-        </p:nvCxnSpPr>
-        <p:spPr>
-          <a:xfrm>
-            <a:off x="5386385" y="3356336"/>
-            <a:ext cx="1378179" cy="0"/>
-          </a:xfrm>
-          <a:prstGeom prst="line">
-            <a:avLst/>
-          </a:prstGeom>
-          <a:ln w="12700">
-            <a:solidFill>
-              <a:srgbClr val="FF9900"/>
-            </a:solidFill>
-            <a:headEnd type="none" w="sm" len="sm"/>
-            <a:tailEnd type="none" w="sm" len="sm"/>
-          </a:ln>
-        </p:spPr>
-        <p:style>
-          <a:lnRef idx="2">
-            <a:schemeClr val="accent4"/>
-          </a:lnRef>
-          <a:fillRef idx="0">
-            <a:schemeClr val="accent4"/>
-          </a:fillRef>
-          <a:effectRef idx="1">
-            <a:schemeClr val="accent4"/>
-          </a:effectRef>
-          <a:fontRef idx="minor">
-            <a:schemeClr val="tx1"/>
-          </a:fontRef>
-        </p:style>
-      </p:cxnSp>
-      <p:cxnSp>
-        <p:nvCxnSpPr>
-          <p:cNvPr id="308" name="Straight Connector 307"/>
-          <p:cNvCxnSpPr/>
-          <p:nvPr/>
-        </p:nvCxnSpPr>
-        <p:spPr>
-          <a:xfrm>
-            <a:off x="5387504" y="733557"/>
-            <a:ext cx="0" cy="2622779"/>
-          </a:xfrm>
-          <a:prstGeom prst="line">
-            <a:avLst/>
-          </a:prstGeom>
-          <a:ln w="12700">
-            <a:solidFill>
-              <a:srgbClr val="FF9900"/>
-            </a:solidFill>
-            <a:headEnd type="none" w="sm" len="sm"/>
-            <a:tailEnd type="none" w="sm" len="sm"/>
-          </a:ln>
-        </p:spPr>
-        <p:style>
-          <a:lnRef idx="2">
-            <a:schemeClr val="accent4"/>
-          </a:lnRef>
-          <a:fillRef idx="0">
-            <a:schemeClr val="accent4"/>
-          </a:fillRef>
-          <a:effectRef idx="1">
-            <a:schemeClr val="accent4"/>
-          </a:effectRef>
-          <a:fontRef idx="minor">
-            <a:schemeClr val="tx1"/>
-          </a:fontRef>
-        </p:style>
-      </p:cxnSp>
-      <p:cxnSp>
-        <p:nvCxnSpPr>
           <p:cNvPr id="310" name="Straight Connector 309"/>
           <p:cNvCxnSpPr>
             <a:stCxn id="46" idx="3"/>
@@ -15829,7 +14891,7 @@
         <p:spPr>
           <a:xfrm>
             <a:off x="4570050" y="733557"/>
-            <a:ext cx="817454" cy="0"/>
+            <a:ext cx="2205069" cy="0"/>
           </a:xfrm>
           <a:prstGeom prst="line">
             <a:avLst/>
@@ -16080,130 +15142,6 @@
           </a:p>
         </p:txBody>
       </p:sp>
-      <p:sp>
-        <p:nvSpPr>
-          <p:cNvPr id="321" name="Flowchart: Process 320"/>
-          <p:cNvSpPr/>
-          <p:nvPr/>
-        </p:nvSpPr>
-        <p:spPr>
-          <a:xfrm>
-            <a:off x="4699822" y="301964"/>
-            <a:ext cx="686563" cy="326002"/>
-          </a:xfrm>
-          <a:prstGeom prst="flowChartProcess">
-            <a:avLst/>
-          </a:prstGeom>
-        </p:spPr>
-        <p:style>
-          <a:lnRef idx="1">
-            <a:schemeClr val="accent6"/>
-          </a:lnRef>
-          <a:fillRef idx="2">
-            <a:schemeClr val="accent6"/>
-          </a:fillRef>
-          <a:effectRef idx="1">
-            <a:schemeClr val="accent6"/>
-          </a:effectRef>
-          <a:fontRef idx="minor">
-            <a:schemeClr val="dk1"/>
-          </a:fontRef>
-        </p:style>
-        <p:txBody>
-          <a:bodyPr rtlCol="0" anchor="ctr"/>
-          <a:lstStyle/>
-          <a:p>
-            <a:pPr algn="ctr"/>
-            <a:r>
-              <a:rPr lang="en-US" sz="1200" dirty="0" smtClean="0"/>
-              <a:t>Boost Inverter</a:t>
-            </a:r>
-            <a:endParaRPr lang="en-US" sz="1200" dirty="0"/>
-          </a:p>
-        </p:txBody>
-      </p:sp>
-      <p:cxnSp>
-        <p:nvCxnSpPr>
-          <p:cNvPr id="322" name="Straight Connector 321"/>
-          <p:cNvCxnSpPr>
-            <a:endCxn id="321" idx="1"/>
-          </p:cNvCxnSpPr>
-          <p:nvPr/>
-        </p:nvCxnSpPr>
-        <p:spPr>
-          <a:xfrm>
-            <a:off x="4572000" y="464965"/>
-            <a:ext cx="127822" cy="0"/>
-          </a:xfrm>
-          <a:prstGeom prst="line">
-            <a:avLst/>
-          </a:prstGeom>
-          <a:ln w="12700">
-            <a:solidFill>
-              <a:srgbClr val="996633"/>
-            </a:solidFill>
-            <a:headEnd type="none" w="sm" len="sm"/>
-            <a:tailEnd type="none" w="sm" len="sm"/>
-          </a:ln>
-        </p:spPr>
-        <p:style>
-          <a:lnRef idx="2">
-            <a:schemeClr val="accent4"/>
-          </a:lnRef>
-          <a:fillRef idx="0">
-            <a:schemeClr val="accent4"/>
-          </a:fillRef>
-          <a:effectRef idx="1">
-            <a:schemeClr val="accent4"/>
-          </a:effectRef>
-          <a:fontRef idx="minor">
-            <a:schemeClr val="tx1"/>
-          </a:fontRef>
-        </p:style>
-      </p:cxnSp>
-      <p:sp>
-        <p:nvSpPr>
-          <p:cNvPr id="325" name="Isosceles Triangle 324"/>
-          <p:cNvSpPr/>
-          <p:nvPr/>
-        </p:nvSpPr>
-        <p:spPr>
-          <a:xfrm rot="5400000" flipV="1">
-            <a:off x="4582880" y="439120"/>
-            <a:ext cx="52759" cy="45719"/>
-          </a:xfrm>
-          <a:prstGeom prst="triangle">
-            <a:avLst/>
-          </a:prstGeom>
-          <a:ln>
-            <a:noFill/>
-          </a:ln>
-        </p:spPr>
-        <p:style>
-          <a:lnRef idx="2">
-            <a:schemeClr val="dk1">
-              <a:shade val="50000"/>
-            </a:schemeClr>
-          </a:lnRef>
-          <a:fillRef idx="1">
-            <a:schemeClr val="dk1"/>
-          </a:fillRef>
-          <a:effectRef idx="0">
-            <a:schemeClr val="dk1"/>
-          </a:effectRef>
-          <a:fontRef idx="minor">
-            <a:schemeClr val="lt1"/>
-          </a:fontRef>
-        </p:style>
-        <p:txBody>
-          <a:bodyPr rtlCol="0" anchor="ctr"/>
-          <a:lstStyle/>
-          <a:p>
-            <a:pPr algn="ctr"/>
-            <a:endParaRPr lang="en-US"/>
-          </a:p>
-        </p:txBody>
-      </p:sp>
       <p:cxnSp>
         <p:nvCxnSpPr>
           <p:cNvPr id="328" name="Straight Connector 327"/>
@@ -16364,6 +15302,538 @@
           </a:p>
         </p:txBody>
       </p:sp>
+      <p:cxnSp>
+        <p:nvCxnSpPr>
+          <p:cNvPr id="326" name="Straight Connector 325"/>
+          <p:cNvCxnSpPr/>
+          <p:nvPr/>
+        </p:nvCxnSpPr>
+        <p:spPr>
+          <a:xfrm flipV="1">
+            <a:off x="7055848" y="2812540"/>
+            <a:ext cx="1" cy="1451363"/>
+          </a:xfrm>
+          <a:prstGeom prst="line">
+            <a:avLst/>
+          </a:prstGeom>
+          <a:ln w="12700">
+            <a:solidFill>
+              <a:srgbClr val="996633"/>
+            </a:solidFill>
+            <a:headEnd type="none" w="sm" len="sm"/>
+            <a:tailEnd type="none" w="sm" len="sm"/>
+          </a:ln>
+        </p:spPr>
+        <p:style>
+          <a:lnRef idx="2">
+            <a:schemeClr val="accent4"/>
+          </a:lnRef>
+          <a:fillRef idx="0">
+            <a:schemeClr val="accent4"/>
+          </a:fillRef>
+          <a:effectRef idx="1">
+            <a:schemeClr val="accent4"/>
+          </a:effectRef>
+          <a:fontRef idx="minor">
+            <a:schemeClr val="tx1"/>
+          </a:fontRef>
+        </p:style>
+      </p:cxnSp>
+      <p:cxnSp>
+        <p:nvCxnSpPr>
+          <p:cNvPr id="332" name="Straight Connector 331"/>
+          <p:cNvCxnSpPr/>
+          <p:nvPr/>
+        </p:nvCxnSpPr>
+        <p:spPr>
+          <a:xfrm flipH="1" flipV="1">
+            <a:off x="7043970" y="2817680"/>
+            <a:ext cx="164548" cy="1720"/>
+          </a:xfrm>
+          <a:prstGeom prst="line">
+            <a:avLst/>
+          </a:prstGeom>
+          <a:ln w="12700">
+            <a:solidFill>
+              <a:srgbClr val="996633"/>
+            </a:solidFill>
+            <a:headEnd type="none" w="sm" len="sm"/>
+            <a:tailEnd type="none" w="sm" len="sm"/>
+          </a:ln>
+        </p:spPr>
+        <p:style>
+          <a:lnRef idx="2">
+            <a:schemeClr val="accent4"/>
+          </a:lnRef>
+          <a:fillRef idx="0">
+            <a:schemeClr val="accent4"/>
+          </a:fillRef>
+          <a:effectRef idx="1">
+            <a:schemeClr val="accent4"/>
+          </a:effectRef>
+          <a:fontRef idx="minor">
+            <a:schemeClr val="tx1"/>
+          </a:fontRef>
+        </p:style>
+      </p:cxnSp>
+      <p:cxnSp>
+        <p:nvCxnSpPr>
+          <p:cNvPr id="337" name="Straight Connector 336"/>
+          <p:cNvCxnSpPr/>
+          <p:nvPr/>
+        </p:nvCxnSpPr>
+        <p:spPr>
+          <a:xfrm flipH="1">
+            <a:off x="7051835" y="4245147"/>
+            <a:ext cx="885405" cy="0"/>
+          </a:xfrm>
+          <a:prstGeom prst="line">
+            <a:avLst/>
+          </a:prstGeom>
+          <a:ln w="12700">
+            <a:solidFill>
+              <a:srgbClr val="996633"/>
+            </a:solidFill>
+            <a:headEnd type="none" w="sm" len="sm"/>
+            <a:tailEnd type="none" w="sm" len="sm"/>
+          </a:ln>
+        </p:spPr>
+        <p:style>
+          <a:lnRef idx="2">
+            <a:schemeClr val="accent4"/>
+          </a:lnRef>
+          <a:fillRef idx="0">
+            <a:schemeClr val="accent4"/>
+          </a:fillRef>
+          <a:effectRef idx="1">
+            <a:schemeClr val="accent4"/>
+          </a:effectRef>
+          <a:fontRef idx="minor">
+            <a:schemeClr val="tx1"/>
+          </a:fontRef>
+        </p:style>
+      </p:cxnSp>
+      <p:cxnSp>
+        <p:nvCxnSpPr>
+          <p:cNvPr id="338" name="Straight Connector 337"/>
+          <p:cNvCxnSpPr/>
+          <p:nvPr/>
+        </p:nvCxnSpPr>
+        <p:spPr>
+          <a:xfrm flipV="1">
+            <a:off x="7937240" y="4236567"/>
+            <a:ext cx="0" cy="1173634"/>
+          </a:xfrm>
+          <a:prstGeom prst="line">
+            <a:avLst/>
+          </a:prstGeom>
+          <a:ln w="12700">
+            <a:solidFill>
+              <a:srgbClr val="996633"/>
+            </a:solidFill>
+            <a:headEnd type="none" w="sm" len="sm"/>
+            <a:tailEnd type="none" w="sm" len="sm"/>
+          </a:ln>
+        </p:spPr>
+        <p:style>
+          <a:lnRef idx="2">
+            <a:schemeClr val="accent4"/>
+          </a:lnRef>
+          <a:fillRef idx="0">
+            <a:schemeClr val="accent4"/>
+          </a:fillRef>
+          <a:effectRef idx="1">
+            <a:schemeClr val="accent4"/>
+          </a:effectRef>
+          <a:fontRef idx="minor">
+            <a:schemeClr val="tx1"/>
+          </a:fontRef>
+        </p:style>
+      </p:cxnSp>
+      <p:cxnSp>
+        <p:nvCxnSpPr>
+          <p:cNvPr id="339" name="Straight Connector 338"/>
+          <p:cNvCxnSpPr/>
+          <p:nvPr/>
+        </p:nvCxnSpPr>
+        <p:spPr>
+          <a:xfrm flipH="1" flipV="1">
+            <a:off x="7824680" y="5397613"/>
+            <a:ext cx="164548" cy="1720"/>
+          </a:xfrm>
+          <a:prstGeom prst="line">
+            <a:avLst/>
+          </a:prstGeom>
+          <a:ln w="12700">
+            <a:solidFill>
+              <a:srgbClr val="996633"/>
+            </a:solidFill>
+            <a:headEnd type="none" w="sm" len="sm"/>
+            <a:tailEnd type="none" w="sm" len="sm"/>
+          </a:ln>
+        </p:spPr>
+        <p:style>
+          <a:lnRef idx="2">
+            <a:schemeClr val="accent4"/>
+          </a:lnRef>
+          <a:fillRef idx="0">
+            <a:schemeClr val="accent4"/>
+          </a:fillRef>
+          <a:effectRef idx="1">
+            <a:schemeClr val="accent4"/>
+          </a:effectRef>
+          <a:fontRef idx="minor">
+            <a:schemeClr val="tx1"/>
+          </a:fontRef>
+        </p:style>
+      </p:cxnSp>
+      <p:sp>
+        <p:nvSpPr>
+          <p:cNvPr id="343" name="Isosceles Triangle 342"/>
+          <p:cNvSpPr/>
+          <p:nvPr/>
+        </p:nvSpPr>
+        <p:spPr>
+          <a:xfrm rot="5400000" flipV="1">
+            <a:off x="7812764" y="5374009"/>
+            <a:ext cx="52759" cy="45719"/>
+          </a:xfrm>
+          <a:prstGeom prst="triangle">
+            <a:avLst/>
+          </a:prstGeom>
+          <a:ln>
+            <a:noFill/>
+          </a:ln>
+        </p:spPr>
+        <p:style>
+          <a:lnRef idx="2">
+            <a:schemeClr val="dk1">
+              <a:shade val="50000"/>
+            </a:schemeClr>
+          </a:lnRef>
+          <a:fillRef idx="1">
+            <a:schemeClr val="dk1"/>
+          </a:fillRef>
+          <a:effectRef idx="0">
+            <a:schemeClr val="dk1"/>
+          </a:effectRef>
+          <a:fontRef idx="minor">
+            <a:schemeClr val="lt1"/>
+          </a:fontRef>
+        </p:style>
+        <p:txBody>
+          <a:bodyPr rtlCol="0" anchor="ctr"/>
+          <a:lstStyle/>
+          <a:p>
+            <a:pPr algn="ctr"/>
+            <a:endParaRPr lang="en-US"/>
+          </a:p>
+        </p:txBody>
+      </p:sp>
+      <p:sp>
+        <p:nvSpPr>
+          <p:cNvPr id="346" name="Isosceles Triangle 345"/>
+          <p:cNvSpPr/>
+          <p:nvPr/>
+        </p:nvSpPr>
+        <p:spPr>
+          <a:xfrm rot="5400000">
+            <a:off x="7941349" y="5374009"/>
+            <a:ext cx="52759" cy="45719"/>
+          </a:xfrm>
+          <a:prstGeom prst="triangle">
+            <a:avLst/>
+          </a:prstGeom>
+          <a:ln>
+            <a:noFill/>
+          </a:ln>
+        </p:spPr>
+        <p:style>
+          <a:lnRef idx="2">
+            <a:schemeClr val="dk1">
+              <a:shade val="50000"/>
+            </a:schemeClr>
+          </a:lnRef>
+          <a:fillRef idx="1">
+            <a:schemeClr val="dk1"/>
+          </a:fillRef>
+          <a:effectRef idx="0">
+            <a:schemeClr val="dk1"/>
+          </a:effectRef>
+          <a:fontRef idx="minor">
+            <a:schemeClr val="lt1"/>
+          </a:fontRef>
+        </p:style>
+        <p:txBody>
+          <a:bodyPr rtlCol="0" anchor="ctr"/>
+          <a:lstStyle/>
+          <a:p>
+            <a:pPr algn="ctr"/>
+            <a:endParaRPr lang="en-US"/>
+          </a:p>
+        </p:txBody>
+      </p:sp>
+      <p:sp>
+        <p:nvSpPr>
+          <p:cNvPr id="64" name="Flowchart: Process 63"/>
+          <p:cNvSpPr/>
+          <p:nvPr/>
+        </p:nvSpPr>
+        <p:spPr>
+          <a:xfrm>
+            <a:off x="6881700" y="4343400"/>
+            <a:ext cx="2030537" cy="169963"/>
+          </a:xfrm>
+          <a:prstGeom prst="flowChartProcess">
+            <a:avLst/>
+          </a:prstGeom>
+        </p:spPr>
+        <p:style>
+          <a:lnRef idx="1">
+            <a:schemeClr val="accent6"/>
+          </a:lnRef>
+          <a:fillRef idx="2">
+            <a:schemeClr val="accent6"/>
+          </a:fillRef>
+          <a:effectRef idx="1">
+            <a:schemeClr val="accent6"/>
+          </a:effectRef>
+          <a:fontRef idx="minor">
+            <a:schemeClr val="dk1"/>
+          </a:fontRef>
+        </p:style>
+        <p:txBody>
+          <a:bodyPr rtlCol="0" anchor="ctr"/>
+          <a:lstStyle/>
+          <a:p>
+            <a:pPr algn="ctr"/>
+            <a:r>
+              <a:rPr lang="en-US" sz="1200" dirty="0" smtClean="0"/>
+              <a:t>Voltage Reference</a:t>
+            </a:r>
+            <a:endParaRPr lang="en-US" sz="1200" dirty="0"/>
+          </a:p>
+        </p:txBody>
+      </p:sp>
+      <p:cxnSp>
+        <p:nvCxnSpPr>
+          <p:cNvPr id="347" name="Straight Connector 346"/>
+          <p:cNvCxnSpPr/>
+          <p:nvPr/>
+        </p:nvCxnSpPr>
+        <p:spPr>
+          <a:xfrm flipH="1" flipV="1">
+            <a:off x="7062012" y="3248440"/>
+            <a:ext cx="164548" cy="1720"/>
+          </a:xfrm>
+          <a:prstGeom prst="line">
+            <a:avLst/>
+          </a:prstGeom>
+          <a:ln w="12700">
+            <a:solidFill>
+              <a:srgbClr val="996633"/>
+            </a:solidFill>
+            <a:headEnd type="none" w="sm" len="sm"/>
+            <a:tailEnd type="none" w="sm" len="sm"/>
+          </a:ln>
+        </p:spPr>
+        <p:style>
+          <a:lnRef idx="2">
+            <a:schemeClr val="accent4"/>
+          </a:lnRef>
+          <a:fillRef idx="0">
+            <a:schemeClr val="accent4"/>
+          </a:fillRef>
+          <a:effectRef idx="1">
+            <a:schemeClr val="accent4"/>
+          </a:effectRef>
+          <a:fontRef idx="minor">
+            <a:schemeClr val="tx1"/>
+          </a:fontRef>
+        </p:style>
+      </p:cxnSp>
+      <p:sp>
+        <p:nvSpPr>
+          <p:cNvPr id="304" name="Flowchart: Process 303"/>
+          <p:cNvSpPr/>
+          <p:nvPr/>
+        </p:nvSpPr>
+        <p:spPr>
+          <a:xfrm>
+            <a:off x="341687" y="6019800"/>
+            <a:ext cx="553233" cy="381488"/>
+          </a:xfrm>
+          <a:prstGeom prst="flowChartProcess">
+            <a:avLst/>
+          </a:prstGeom>
+        </p:spPr>
+        <p:style>
+          <a:lnRef idx="1">
+            <a:schemeClr val="accent3"/>
+          </a:lnRef>
+          <a:fillRef idx="2">
+            <a:schemeClr val="accent3"/>
+          </a:fillRef>
+          <a:effectRef idx="1">
+            <a:schemeClr val="accent3"/>
+          </a:effectRef>
+          <a:fontRef idx="minor">
+            <a:schemeClr val="dk1"/>
+          </a:fontRef>
+        </p:style>
+        <p:txBody>
+          <a:bodyPr rtlCol="0" anchor="ctr"/>
+          <a:lstStyle/>
+          <a:p>
+            <a:pPr algn="ctr"/>
+            <a:r>
+              <a:rPr lang="en-US" sz="1200" dirty="0" smtClean="0"/>
+              <a:t>EPCS</a:t>
+            </a:r>
+            <a:endParaRPr lang="en-US" sz="1200" dirty="0"/>
+          </a:p>
+        </p:txBody>
+      </p:sp>
+      <p:cxnSp>
+        <p:nvCxnSpPr>
+          <p:cNvPr id="305" name="Straight Connector 304"/>
+          <p:cNvCxnSpPr>
+            <a:endCxn id="304" idx="3"/>
+          </p:cNvCxnSpPr>
+          <p:nvPr/>
+        </p:nvCxnSpPr>
+        <p:spPr>
+          <a:xfrm flipH="1">
+            <a:off x="894920" y="6210544"/>
+            <a:ext cx="127228" cy="0"/>
+          </a:xfrm>
+          <a:prstGeom prst="line">
+            <a:avLst/>
+          </a:prstGeom>
+          <a:ln w="12700">
+            <a:solidFill>
+              <a:srgbClr val="FF00FF"/>
+            </a:solidFill>
+            <a:headEnd type="none" w="sm" len="sm"/>
+            <a:tailEnd type="none" w="sm" len="sm"/>
+          </a:ln>
+        </p:spPr>
+        <p:style>
+          <a:lnRef idx="2">
+            <a:schemeClr val="accent4"/>
+          </a:lnRef>
+          <a:fillRef idx="0">
+            <a:schemeClr val="accent4"/>
+          </a:fillRef>
+          <a:effectRef idx="1">
+            <a:schemeClr val="accent4"/>
+          </a:effectRef>
+          <a:fontRef idx="minor">
+            <a:schemeClr val="tx1"/>
+          </a:fontRef>
+        </p:style>
+      </p:cxnSp>
+      <p:grpSp>
+        <p:nvGrpSpPr>
+          <p:cNvPr id="312" name="Group 311"/>
+          <p:cNvGrpSpPr/>
+          <p:nvPr/>
+        </p:nvGrpSpPr>
+        <p:grpSpPr>
+          <a:xfrm rot="5400000">
+            <a:off x="923847" y="6158895"/>
+            <a:ext cx="52759" cy="101370"/>
+            <a:chOff x="985428" y="2723692"/>
+            <a:chExt cx="52759" cy="101370"/>
+          </a:xfrm>
+        </p:grpSpPr>
+        <p:sp>
+          <p:nvSpPr>
+            <p:cNvPr id="317" name="Isosceles Triangle 316"/>
+            <p:cNvSpPr/>
+            <p:nvPr/>
+          </p:nvSpPr>
+          <p:spPr>
+            <a:xfrm>
+              <a:off x="985428" y="2723692"/>
+              <a:ext cx="52759" cy="45719"/>
+            </a:xfrm>
+            <a:prstGeom prst="triangle">
+              <a:avLst/>
+            </a:prstGeom>
+            <a:ln>
+              <a:noFill/>
+            </a:ln>
+          </p:spPr>
+          <p:style>
+            <a:lnRef idx="2">
+              <a:schemeClr val="dk1">
+                <a:shade val="50000"/>
+              </a:schemeClr>
+            </a:lnRef>
+            <a:fillRef idx="1">
+              <a:schemeClr val="dk1"/>
+            </a:fillRef>
+            <a:effectRef idx="0">
+              <a:schemeClr val="dk1"/>
+            </a:effectRef>
+            <a:fontRef idx="minor">
+              <a:schemeClr val="lt1"/>
+            </a:fontRef>
+          </p:style>
+          <p:txBody>
+            <a:bodyPr rtlCol="0" anchor="ctr"/>
+            <a:lstStyle/>
+            <a:p>
+              <a:pPr algn="ctr"/>
+              <a:endParaRPr lang="en-US"/>
+            </a:p>
+          </p:txBody>
+        </p:sp>
+        <p:sp>
+          <p:nvSpPr>
+            <p:cNvPr id="318" name="Isosceles Triangle 317"/>
+            <p:cNvSpPr/>
+            <p:nvPr/>
+          </p:nvSpPr>
+          <p:spPr>
+            <a:xfrm flipV="1">
+              <a:off x="985428" y="2779343"/>
+              <a:ext cx="52759" cy="45719"/>
+            </a:xfrm>
+            <a:prstGeom prst="triangle">
+              <a:avLst/>
+            </a:prstGeom>
+            <a:ln>
+              <a:noFill/>
+            </a:ln>
+          </p:spPr>
+          <p:style>
+            <a:lnRef idx="2">
+              <a:schemeClr val="dk1">
+                <a:shade val="50000"/>
+              </a:schemeClr>
+            </a:lnRef>
+            <a:fillRef idx="1">
+              <a:schemeClr val="dk1"/>
+            </a:fillRef>
+            <a:effectRef idx="0">
+              <a:schemeClr val="dk1"/>
+            </a:effectRef>
+            <a:fontRef idx="minor">
+              <a:schemeClr val="lt1"/>
+            </a:fontRef>
+          </p:style>
+          <p:txBody>
+            <a:bodyPr rtlCol="0" anchor="ctr"/>
+            <a:lstStyle/>
+            <a:p>
+              <a:pPr algn="ctr"/>
+              <a:endParaRPr lang="en-US"/>
+            </a:p>
+          </p:txBody>
+        </p:sp>
+      </p:grpSp>
     </p:spTree>
     <p:extLst>
       <p:ext uri="{BB962C8B-B14F-4D97-AF65-F5344CB8AC3E}">
@@ -16374,6 +15844,13 @@
   <p:clrMapOvr>
     <a:masterClrMapping/>
   </p:clrMapOvr>
+  <p:timing>
+    <p:tnLst>
+      <p:par>
+        <p:cTn id="1" dur="indefinite" restart="never" nodeType="tmRoot"/>
+      </p:par>
+    </p:tnLst>
+  </p:timing>
 </p:sld>
 </file>
 
@@ -17208,130 +16685,6 @@
       </p:grpSp>
       <p:sp>
         <p:nvSpPr>
-          <p:cNvPr id="36" name="Flowchart: Process 35"/>
-          <p:cNvSpPr/>
-          <p:nvPr/>
-        </p:nvSpPr>
-        <p:spPr>
-          <a:xfrm>
-            <a:off x="4159635" y="1648520"/>
-            <a:ext cx="686563" cy="326002"/>
-          </a:xfrm>
-          <a:prstGeom prst="flowChartProcess">
-            <a:avLst/>
-          </a:prstGeom>
-        </p:spPr>
-        <p:style>
-          <a:lnRef idx="1">
-            <a:schemeClr val="accent6"/>
-          </a:lnRef>
-          <a:fillRef idx="2">
-            <a:schemeClr val="accent6"/>
-          </a:fillRef>
-          <a:effectRef idx="1">
-            <a:schemeClr val="accent6"/>
-          </a:effectRef>
-          <a:fontRef idx="minor">
-            <a:schemeClr val="dk1"/>
-          </a:fontRef>
-        </p:style>
-        <p:txBody>
-          <a:bodyPr rtlCol="0" anchor="ctr"/>
-          <a:lstStyle/>
-          <a:p>
-            <a:pPr algn="ctr"/>
-            <a:r>
-              <a:rPr lang="en-US" sz="1200" dirty="0" smtClean="0"/>
-              <a:t>Boost Inverter</a:t>
-            </a:r>
-            <a:endParaRPr lang="en-US" sz="1200" dirty="0"/>
-          </a:p>
-        </p:txBody>
-      </p:sp>
-      <p:cxnSp>
-        <p:nvCxnSpPr>
-          <p:cNvPr id="37" name="Straight Connector 36"/>
-          <p:cNvCxnSpPr>
-            <a:endCxn id="36" idx="1"/>
-          </p:cNvCxnSpPr>
-          <p:nvPr/>
-        </p:nvCxnSpPr>
-        <p:spPr>
-          <a:xfrm>
-            <a:off x="4031813" y="1811521"/>
-            <a:ext cx="127822" cy="0"/>
-          </a:xfrm>
-          <a:prstGeom prst="line">
-            <a:avLst/>
-          </a:prstGeom>
-          <a:ln w="12700">
-            <a:solidFill>
-              <a:srgbClr val="996633"/>
-            </a:solidFill>
-            <a:headEnd type="none" w="sm" len="sm"/>
-            <a:tailEnd type="none" w="sm" len="sm"/>
-          </a:ln>
-        </p:spPr>
-        <p:style>
-          <a:lnRef idx="2">
-            <a:schemeClr val="accent4"/>
-          </a:lnRef>
-          <a:fillRef idx="0">
-            <a:schemeClr val="accent4"/>
-          </a:fillRef>
-          <a:effectRef idx="1">
-            <a:schemeClr val="accent4"/>
-          </a:effectRef>
-          <a:fontRef idx="minor">
-            <a:schemeClr val="tx1"/>
-          </a:fontRef>
-        </p:style>
-      </p:cxnSp>
-      <p:sp>
-        <p:nvSpPr>
-          <p:cNvPr id="38" name="Isosceles Triangle 37"/>
-          <p:cNvSpPr/>
-          <p:nvPr/>
-        </p:nvSpPr>
-        <p:spPr>
-          <a:xfrm rot="5400000" flipV="1">
-            <a:off x="4042693" y="1785676"/>
-            <a:ext cx="52759" cy="45719"/>
-          </a:xfrm>
-          <a:prstGeom prst="triangle">
-            <a:avLst/>
-          </a:prstGeom>
-          <a:ln>
-            <a:noFill/>
-          </a:ln>
-        </p:spPr>
-        <p:style>
-          <a:lnRef idx="2">
-            <a:schemeClr val="dk1">
-              <a:shade val="50000"/>
-            </a:schemeClr>
-          </a:lnRef>
-          <a:fillRef idx="1">
-            <a:schemeClr val="dk1"/>
-          </a:fillRef>
-          <a:effectRef idx="0">
-            <a:schemeClr val="dk1"/>
-          </a:effectRef>
-          <a:fontRef idx="minor">
-            <a:schemeClr val="lt1"/>
-          </a:fontRef>
-        </p:style>
-        <p:txBody>
-          <a:bodyPr rtlCol="0" anchor="ctr"/>
-          <a:lstStyle/>
-          <a:p>
-            <a:pPr algn="ctr"/>
-            <a:endParaRPr lang="en-US"/>
-          </a:p>
-        </p:txBody>
-      </p:sp>
-      <p:sp>
-        <p:nvSpPr>
           <p:cNvPr id="39" name="Flowchart: Process 38"/>
           <p:cNvSpPr/>
           <p:nvPr/>
@@ -20608,6 +19961,1273 @@
     <p:extLst>
       <p:ext uri="{BB962C8B-B14F-4D97-AF65-F5344CB8AC3E}">
         <p14:creationId xmlns:p14="http://schemas.microsoft.com/office/powerpoint/2010/main" val="3329408700"/>
+      </p:ext>
+    </p:extLst>
+  </p:cSld>
+  <p:clrMapOvr>
+    <a:masterClrMapping/>
+  </p:clrMapOvr>
+  <p:timing>
+    <p:tnLst>
+      <p:par>
+        <p:cTn id="1" dur="indefinite" restart="never" nodeType="tmRoot"/>
+      </p:par>
+    </p:tnLst>
+  </p:timing>
+</p:sld>
+</file>
+
+<file path=ppt/slides/slide3.xml><?xml version="1.0" encoding="utf-8"?>
+<p:sld xmlns:a="http://schemas.openxmlformats.org/drawingml/2006/main" xmlns:r="http://schemas.openxmlformats.org/officeDocument/2006/relationships" xmlns:p="http://schemas.openxmlformats.org/presentationml/2006/main">
+  <p:cSld>
+    <p:spTree>
+      <p:nvGrpSpPr>
+        <p:cNvPr id="1" name=""/>
+        <p:cNvGrpSpPr/>
+        <p:nvPr/>
+      </p:nvGrpSpPr>
+      <p:grpSpPr>
+        <a:xfrm>
+          <a:off x="0" y="0"/>
+          <a:ext cx="0" cy="0"/>
+          <a:chOff x="0" y="0"/>
+          <a:chExt cx="0" cy="0"/>
+        </a:xfrm>
+      </p:grpSpPr>
+      <p:sp>
+        <p:nvSpPr>
+          <p:cNvPr id="2" name="Flowchart: Process 1"/>
+          <p:cNvSpPr/>
+          <p:nvPr/>
+        </p:nvSpPr>
+        <p:spPr>
+          <a:xfrm>
+            <a:off x="1011807" y="762000"/>
+            <a:ext cx="7046545" cy="5742109"/>
+          </a:xfrm>
+          <a:prstGeom prst="flowChartProcess">
+            <a:avLst/>
+          </a:prstGeom>
+        </p:spPr>
+        <p:style>
+          <a:lnRef idx="1">
+            <a:schemeClr val="accent5"/>
+          </a:lnRef>
+          <a:fillRef idx="2">
+            <a:schemeClr val="accent5"/>
+          </a:fillRef>
+          <a:effectRef idx="1">
+            <a:schemeClr val="accent5"/>
+          </a:effectRef>
+          <a:fontRef idx="minor">
+            <a:schemeClr val="dk1"/>
+          </a:fontRef>
+        </p:style>
+        <p:txBody>
+          <a:bodyPr rtlCol="0" anchor="ctr"/>
+          <a:lstStyle/>
+          <a:p>
+            <a:pPr algn="ctr"/>
+            <a:r>
+              <a:rPr lang="en-US" sz="2800" dirty="0" smtClean="0"/>
+              <a:t>Altera Cyclone III EP3C25 FPGA</a:t>
+            </a:r>
+          </a:p>
+          <a:p>
+            <a:pPr algn="ctr"/>
+            <a:endParaRPr lang="en-US" sz="1200" dirty="0"/>
+          </a:p>
+          <a:p>
+            <a:pPr algn="ctr"/>
+            <a:endParaRPr lang="en-US" sz="1200" dirty="0" smtClean="0"/>
+          </a:p>
+          <a:p>
+            <a:pPr algn="ctr"/>
+            <a:endParaRPr lang="en-US" sz="1200" dirty="0"/>
+          </a:p>
+          <a:p>
+            <a:pPr algn="ctr"/>
+            <a:endParaRPr lang="en-US" sz="1200" dirty="0" smtClean="0"/>
+          </a:p>
+          <a:p>
+            <a:pPr algn="ctr"/>
+            <a:endParaRPr lang="en-US" sz="1200" dirty="0"/>
+          </a:p>
+          <a:p>
+            <a:pPr algn="ctr"/>
+            <a:endParaRPr lang="en-US" sz="1200" dirty="0" smtClean="0"/>
+          </a:p>
+          <a:p>
+            <a:pPr algn="ctr"/>
+            <a:endParaRPr lang="en-US" sz="1200" dirty="0"/>
+          </a:p>
+          <a:p>
+            <a:pPr algn="ctr"/>
+            <a:endParaRPr lang="en-US" sz="1200" dirty="0" smtClean="0"/>
+          </a:p>
+          <a:p>
+            <a:pPr algn="ctr"/>
+            <a:endParaRPr lang="en-US" sz="1200" dirty="0"/>
+          </a:p>
+          <a:p>
+            <a:pPr algn="ctr"/>
+            <a:endParaRPr lang="en-US" sz="1200" dirty="0" smtClean="0"/>
+          </a:p>
+          <a:p>
+            <a:pPr algn="ctr"/>
+            <a:endParaRPr lang="en-US" sz="1200" dirty="0"/>
+          </a:p>
+          <a:p>
+            <a:pPr algn="ctr"/>
+            <a:endParaRPr lang="en-US" sz="1200" dirty="0" smtClean="0"/>
+          </a:p>
+          <a:p>
+            <a:pPr algn="ctr"/>
+            <a:endParaRPr lang="en-US" sz="1200" dirty="0"/>
+          </a:p>
+          <a:p>
+            <a:pPr algn="ctr"/>
+            <a:endParaRPr lang="en-US" sz="1200" dirty="0" smtClean="0"/>
+          </a:p>
+          <a:p>
+            <a:pPr algn="ctr"/>
+            <a:endParaRPr lang="en-US" sz="1200" dirty="0"/>
+          </a:p>
+          <a:p>
+            <a:pPr algn="ctr"/>
+            <a:endParaRPr lang="en-US" sz="1200" dirty="0" smtClean="0"/>
+          </a:p>
+          <a:p>
+            <a:pPr algn="ctr"/>
+            <a:endParaRPr lang="en-US" sz="1200" dirty="0"/>
+          </a:p>
+          <a:p>
+            <a:pPr algn="ctr"/>
+            <a:endParaRPr lang="en-US" sz="1200" dirty="0" smtClean="0"/>
+          </a:p>
+          <a:p>
+            <a:pPr algn="ctr"/>
+            <a:endParaRPr lang="en-US" sz="1200" dirty="0"/>
+          </a:p>
+          <a:p>
+            <a:pPr algn="ctr"/>
+            <a:endParaRPr lang="en-US" sz="1200" dirty="0" smtClean="0"/>
+          </a:p>
+          <a:p>
+            <a:pPr algn="ctr"/>
+            <a:endParaRPr lang="en-US" sz="1200" dirty="0"/>
+          </a:p>
+          <a:p>
+            <a:pPr algn="ctr"/>
+            <a:endParaRPr lang="en-US" sz="1200" dirty="0" smtClean="0"/>
+          </a:p>
+          <a:p>
+            <a:pPr algn="ctr"/>
+            <a:endParaRPr lang="en-US" sz="1200" dirty="0"/>
+          </a:p>
+          <a:p>
+            <a:pPr algn="ctr"/>
+            <a:endParaRPr lang="en-US" sz="1200" dirty="0" smtClean="0"/>
+          </a:p>
+          <a:p>
+            <a:pPr algn="ctr"/>
+            <a:endParaRPr lang="en-US" sz="1200" dirty="0"/>
+          </a:p>
+          <a:p>
+            <a:pPr algn="ctr"/>
+            <a:endParaRPr lang="en-US" sz="1200" dirty="0" smtClean="0"/>
+          </a:p>
+          <a:p>
+            <a:pPr algn="ctr"/>
+            <a:endParaRPr lang="en-US" sz="1200" dirty="0"/>
+          </a:p>
+          <a:p>
+            <a:pPr algn="ctr"/>
+            <a:endParaRPr lang="en-US" sz="1200" dirty="0"/>
+          </a:p>
+        </p:txBody>
+      </p:sp>
+      <p:sp>
+        <p:nvSpPr>
+          <p:cNvPr id="3" name="Flowchart: Process 2"/>
+          <p:cNvSpPr/>
+          <p:nvPr/>
+        </p:nvSpPr>
+        <p:spPr>
+          <a:xfrm>
+            <a:off x="1241680" y="1473221"/>
+            <a:ext cx="2051314" cy="4817582"/>
+          </a:xfrm>
+          <a:prstGeom prst="flowChartProcess">
+            <a:avLst/>
+          </a:prstGeom>
+        </p:spPr>
+        <p:style>
+          <a:lnRef idx="1">
+            <a:schemeClr val="accent1"/>
+          </a:lnRef>
+          <a:fillRef idx="2">
+            <a:schemeClr val="accent1"/>
+          </a:fillRef>
+          <a:effectRef idx="1">
+            <a:schemeClr val="accent1"/>
+          </a:effectRef>
+          <a:fontRef idx="minor">
+            <a:schemeClr val="dk1"/>
+          </a:fontRef>
+        </p:style>
+        <p:txBody>
+          <a:bodyPr rtlCol="0" anchor="ctr"/>
+          <a:lstStyle/>
+          <a:p>
+            <a:pPr algn="ctr"/>
+            <a:r>
+              <a:rPr lang="en-US" dirty="0" smtClean="0"/>
+              <a:t>QSYS Processor</a:t>
+            </a:r>
+            <a:endParaRPr lang="en-US" dirty="0" smtClean="0"/>
+          </a:p>
+          <a:p>
+            <a:pPr algn="ctr"/>
+            <a:endParaRPr lang="en-US" sz="1200" dirty="0"/>
+          </a:p>
+          <a:p>
+            <a:pPr algn="ctr"/>
+            <a:endParaRPr lang="en-US" sz="1200" dirty="0" smtClean="0"/>
+          </a:p>
+          <a:p>
+            <a:pPr algn="ctr"/>
+            <a:endParaRPr lang="en-US" sz="1200" dirty="0"/>
+          </a:p>
+          <a:p>
+            <a:pPr algn="ctr"/>
+            <a:endParaRPr lang="en-US" sz="1200" dirty="0" smtClean="0"/>
+          </a:p>
+          <a:p>
+            <a:pPr algn="ctr"/>
+            <a:endParaRPr lang="en-US" sz="1200" dirty="0"/>
+          </a:p>
+          <a:p>
+            <a:pPr algn="ctr"/>
+            <a:endParaRPr lang="en-US" sz="1200" dirty="0" smtClean="0"/>
+          </a:p>
+          <a:p>
+            <a:pPr algn="ctr"/>
+            <a:endParaRPr lang="en-US" sz="1200" dirty="0"/>
+          </a:p>
+          <a:p>
+            <a:pPr algn="ctr"/>
+            <a:endParaRPr lang="en-US" sz="1200" dirty="0" smtClean="0"/>
+          </a:p>
+          <a:p>
+            <a:pPr algn="ctr"/>
+            <a:endParaRPr lang="en-US" sz="1200" dirty="0"/>
+          </a:p>
+          <a:p>
+            <a:pPr algn="ctr"/>
+            <a:endParaRPr lang="en-US" sz="1200" dirty="0" smtClean="0"/>
+          </a:p>
+          <a:p>
+            <a:pPr algn="ctr"/>
+            <a:endParaRPr lang="en-US" sz="1200" dirty="0"/>
+          </a:p>
+          <a:p>
+            <a:pPr algn="ctr"/>
+            <a:endParaRPr lang="en-US" sz="1200" dirty="0" smtClean="0"/>
+          </a:p>
+          <a:p>
+            <a:pPr algn="ctr"/>
+            <a:endParaRPr lang="en-US" sz="1200" dirty="0"/>
+          </a:p>
+          <a:p>
+            <a:pPr algn="ctr"/>
+            <a:endParaRPr lang="en-US" sz="1200" dirty="0" smtClean="0"/>
+          </a:p>
+          <a:p>
+            <a:pPr algn="ctr"/>
+            <a:endParaRPr lang="en-US" sz="1200" dirty="0"/>
+          </a:p>
+          <a:p>
+            <a:pPr algn="ctr"/>
+            <a:endParaRPr lang="en-US" sz="1200" dirty="0" smtClean="0"/>
+          </a:p>
+          <a:p>
+            <a:pPr algn="ctr"/>
+            <a:endParaRPr lang="en-US" sz="1200" dirty="0"/>
+          </a:p>
+          <a:p>
+            <a:pPr algn="ctr"/>
+            <a:endParaRPr lang="en-US" sz="1200" dirty="0" smtClean="0"/>
+          </a:p>
+          <a:p>
+            <a:pPr algn="ctr"/>
+            <a:endParaRPr lang="en-US" sz="1200" dirty="0"/>
+          </a:p>
+          <a:p>
+            <a:pPr algn="ctr"/>
+            <a:endParaRPr lang="en-US" sz="1200" dirty="0" smtClean="0"/>
+          </a:p>
+          <a:p>
+            <a:pPr algn="ctr"/>
+            <a:endParaRPr lang="en-US" sz="1200" dirty="0"/>
+          </a:p>
+          <a:p>
+            <a:pPr algn="ctr"/>
+            <a:endParaRPr lang="en-US" sz="1200" dirty="0" smtClean="0"/>
+          </a:p>
+          <a:p>
+            <a:pPr algn="ctr"/>
+            <a:endParaRPr lang="en-US" sz="1200" dirty="0"/>
+          </a:p>
+          <a:p>
+            <a:pPr algn="ctr"/>
+            <a:endParaRPr lang="en-US" sz="1200" dirty="0"/>
+          </a:p>
+        </p:txBody>
+      </p:sp>
+      <p:sp>
+        <p:nvSpPr>
+          <p:cNvPr id="4" name="Flowchart: Process 3"/>
+          <p:cNvSpPr/>
+          <p:nvPr/>
+        </p:nvSpPr>
+        <p:spPr>
+          <a:xfrm>
+            <a:off x="3472180" y="3048000"/>
+            <a:ext cx="4406986" cy="479624"/>
+          </a:xfrm>
+          <a:prstGeom prst="flowChartProcess">
+            <a:avLst/>
+          </a:prstGeom>
+        </p:spPr>
+        <p:style>
+          <a:lnRef idx="1">
+            <a:schemeClr val="accent1"/>
+          </a:lnRef>
+          <a:fillRef idx="2">
+            <a:schemeClr val="accent1"/>
+          </a:fillRef>
+          <a:effectRef idx="1">
+            <a:schemeClr val="accent1"/>
+          </a:effectRef>
+          <a:fontRef idx="minor">
+            <a:schemeClr val="dk1"/>
+          </a:fontRef>
+        </p:style>
+        <p:txBody>
+          <a:bodyPr rtlCol="0" anchor="ctr"/>
+          <a:lstStyle/>
+          <a:p>
+            <a:pPr algn="ctr"/>
+            <a:r>
+              <a:rPr lang="en-US" sz="1200" dirty="0" smtClean="0"/>
+              <a:t>Momentary / Latching Switch </a:t>
+            </a:r>
+            <a:r>
+              <a:rPr lang="en-US" sz="1200" dirty="0" err="1" smtClean="0"/>
+              <a:t>Debouncer</a:t>
+            </a:r>
+            <a:endParaRPr lang="en-US" sz="1200" dirty="0"/>
+          </a:p>
+        </p:txBody>
+      </p:sp>
+      <p:sp>
+        <p:nvSpPr>
+          <p:cNvPr id="5" name="Flowchart: Process 4"/>
+          <p:cNvSpPr/>
+          <p:nvPr/>
+        </p:nvSpPr>
+        <p:spPr>
+          <a:xfrm>
+            <a:off x="5079424" y="1473221"/>
+            <a:ext cx="1313734" cy="1037945"/>
+          </a:xfrm>
+          <a:prstGeom prst="flowChartProcess">
+            <a:avLst/>
+          </a:prstGeom>
+        </p:spPr>
+        <p:style>
+          <a:lnRef idx="1">
+            <a:schemeClr val="accent1"/>
+          </a:lnRef>
+          <a:fillRef idx="2">
+            <a:schemeClr val="accent1"/>
+          </a:fillRef>
+          <a:effectRef idx="1">
+            <a:schemeClr val="accent1"/>
+          </a:effectRef>
+          <a:fontRef idx="minor">
+            <a:schemeClr val="dk1"/>
+          </a:fontRef>
+        </p:style>
+        <p:txBody>
+          <a:bodyPr rtlCol="0" anchor="ctr"/>
+          <a:lstStyle/>
+          <a:p>
+            <a:pPr algn="ctr"/>
+            <a:r>
+              <a:rPr lang="en-US" sz="1200" dirty="0" smtClean="0"/>
+              <a:t>VRAM Controller</a:t>
+            </a:r>
+            <a:endParaRPr lang="en-US" sz="1200" dirty="0"/>
+          </a:p>
+        </p:txBody>
+      </p:sp>
+      <p:sp>
+        <p:nvSpPr>
+          <p:cNvPr id="6" name="Flowchart: Process 5"/>
+          <p:cNvSpPr/>
+          <p:nvPr/>
+        </p:nvSpPr>
+        <p:spPr>
+          <a:xfrm>
+            <a:off x="3472180" y="3635213"/>
+            <a:ext cx="4406986" cy="479624"/>
+          </a:xfrm>
+          <a:prstGeom prst="flowChartProcess">
+            <a:avLst/>
+          </a:prstGeom>
+        </p:spPr>
+        <p:style>
+          <a:lnRef idx="1">
+            <a:schemeClr val="accent1"/>
+          </a:lnRef>
+          <a:fillRef idx="2">
+            <a:schemeClr val="accent1"/>
+          </a:fillRef>
+          <a:effectRef idx="1">
+            <a:schemeClr val="accent1"/>
+          </a:effectRef>
+          <a:fontRef idx="minor">
+            <a:schemeClr val="dk1"/>
+          </a:fontRef>
+        </p:style>
+        <p:txBody>
+          <a:bodyPr rtlCol="0" anchor="ctr"/>
+          <a:lstStyle/>
+          <a:p>
+            <a:pPr algn="ctr"/>
+            <a:r>
+              <a:rPr lang="en-US" sz="1200" dirty="0" smtClean="0"/>
+              <a:t>Rotary Switch Decoder</a:t>
+            </a:r>
+            <a:endParaRPr lang="en-US" sz="1200" dirty="0"/>
+          </a:p>
+        </p:txBody>
+      </p:sp>
+      <p:sp>
+        <p:nvSpPr>
+          <p:cNvPr id="8" name="Flowchart: Process 7"/>
+          <p:cNvSpPr/>
+          <p:nvPr/>
+        </p:nvSpPr>
+        <p:spPr>
+          <a:xfrm>
+            <a:off x="3472181" y="1473221"/>
+            <a:ext cx="1447202" cy="447107"/>
+          </a:xfrm>
+          <a:prstGeom prst="flowChartProcess">
+            <a:avLst/>
+          </a:prstGeom>
+        </p:spPr>
+        <p:style>
+          <a:lnRef idx="1">
+            <a:schemeClr val="accent1"/>
+          </a:lnRef>
+          <a:fillRef idx="2">
+            <a:schemeClr val="accent1"/>
+          </a:fillRef>
+          <a:effectRef idx="1">
+            <a:schemeClr val="accent1"/>
+          </a:effectRef>
+          <a:fontRef idx="minor">
+            <a:schemeClr val="dk1"/>
+          </a:fontRef>
+        </p:style>
+        <p:txBody>
+          <a:bodyPr rtlCol="0" anchor="ctr"/>
+          <a:lstStyle/>
+          <a:p>
+            <a:pPr algn="ctr"/>
+            <a:r>
+              <a:rPr lang="en-US" sz="1200" dirty="0" smtClean="0"/>
+              <a:t>JTAG</a:t>
+            </a:r>
+            <a:endParaRPr lang="en-US" sz="1200" dirty="0"/>
+          </a:p>
+        </p:txBody>
+      </p:sp>
+      <p:sp>
+        <p:nvSpPr>
+          <p:cNvPr id="11" name="Flowchart: Process 10"/>
+          <p:cNvSpPr/>
+          <p:nvPr/>
+        </p:nvSpPr>
+        <p:spPr>
+          <a:xfrm>
+            <a:off x="3472180" y="5221333"/>
+            <a:ext cx="2429261" cy="1069472"/>
+          </a:xfrm>
+          <a:prstGeom prst="flowChartProcess">
+            <a:avLst/>
+          </a:prstGeom>
+        </p:spPr>
+        <p:style>
+          <a:lnRef idx="1">
+            <a:schemeClr val="accent1"/>
+          </a:lnRef>
+          <a:fillRef idx="2">
+            <a:schemeClr val="accent1"/>
+          </a:fillRef>
+          <a:effectRef idx="1">
+            <a:schemeClr val="accent1"/>
+          </a:effectRef>
+          <a:fontRef idx="minor">
+            <a:schemeClr val="dk1"/>
+          </a:fontRef>
+        </p:style>
+        <p:txBody>
+          <a:bodyPr rtlCol="0" anchor="ctr"/>
+          <a:lstStyle/>
+          <a:p>
+            <a:pPr algn="ctr"/>
+            <a:r>
+              <a:rPr lang="en-US" sz="1200" dirty="0" smtClean="0"/>
+              <a:t>Channel Input Queues (FIFO)</a:t>
+            </a:r>
+          </a:p>
+          <a:p>
+            <a:pPr algn="ctr"/>
+            <a:r>
+              <a:rPr lang="en-US" sz="1200" dirty="0" smtClean="0"/>
+              <a:t>A / B / Logic Analyzer</a:t>
+            </a:r>
+            <a:endParaRPr lang="en-US" sz="1200" dirty="0"/>
+          </a:p>
+        </p:txBody>
+      </p:sp>
+      <p:sp>
+        <p:nvSpPr>
+          <p:cNvPr id="39" name="Flowchart: Process 38"/>
+          <p:cNvSpPr/>
+          <p:nvPr/>
+        </p:nvSpPr>
+        <p:spPr>
+          <a:xfrm>
+            <a:off x="6012030" y="4588060"/>
+            <a:ext cx="1854904" cy="467776"/>
+          </a:xfrm>
+          <a:prstGeom prst="flowChartProcess">
+            <a:avLst/>
+          </a:prstGeom>
+        </p:spPr>
+        <p:style>
+          <a:lnRef idx="1">
+            <a:schemeClr val="accent1"/>
+          </a:lnRef>
+          <a:fillRef idx="2">
+            <a:schemeClr val="accent1"/>
+          </a:fillRef>
+          <a:effectRef idx="1">
+            <a:schemeClr val="accent1"/>
+          </a:effectRef>
+          <a:fontRef idx="minor">
+            <a:schemeClr val="dk1"/>
+          </a:fontRef>
+        </p:style>
+        <p:txBody>
+          <a:bodyPr rtlCol="0" anchor="ctr"/>
+          <a:lstStyle/>
+          <a:p>
+            <a:pPr algn="ctr"/>
+            <a:r>
+              <a:rPr lang="en-US" sz="1200" dirty="0" smtClean="0"/>
+              <a:t>ADC Clock</a:t>
+            </a:r>
+            <a:endParaRPr lang="en-US" sz="1200" dirty="0"/>
+          </a:p>
+        </p:txBody>
+      </p:sp>
+      <p:sp>
+        <p:nvSpPr>
+          <p:cNvPr id="45" name="Flowchart: Process 44"/>
+          <p:cNvSpPr/>
+          <p:nvPr/>
+        </p:nvSpPr>
+        <p:spPr>
+          <a:xfrm>
+            <a:off x="6012030" y="5221333"/>
+            <a:ext cx="1872833" cy="286279"/>
+          </a:xfrm>
+          <a:prstGeom prst="flowChartProcess">
+            <a:avLst/>
+          </a:prstGeom>
+        </p:spPr>
+        <p:style>
+          <a:lnRef idx="1">
+            <a:schemeClr val="accent1"/>
+          </a:lnRef>
+          <a:fillRef idx="2">
+            <a:schemeClr val="accent1"/>
+          </a:fillRef>
+          <a:effectRef idx="1">
+            <a:schemeClr val="accent1"/>
+          </a:effectRef>
+          <a:fontRef idx="minor">
+            <a:schemeClr val="dk1"/>
+          </a:fontRef>
+        </p:style>
+        <p:txBody>
+          <a:bodyPr rtlCol="0" anchor="ctr"/>
+          <a:lstStyle/>
+          <a:p>
+            <a:pPr algn="ctr"/>
+            <a:r>
+              <a:rPr lang="en-US" sz="1200" dirty="0" smtClean="0"/>
+              <a:t>Trigger Logic</a:t>
+            </a:r>
+            <a:endParaRPr lang="en-US" sz="1200" dirty="0"/>
+          </a:p>
+        </p:txBody>
+      </p:sp>
+      <p:sp>
+        <p:nvSpPr>
+          <p:cNvPr id="48" name="Flowchart: Process 47"/>
+          <p:cNvSpPr/>
+          <p:nvPr/>
+        </p:nvSpPr>
+        <p:spPr>
+          <a:xfrm>
+            <a:off x="6008273" y="5612929"/>
+            <a:ext cx="1872833" cy="286279"/>
+          </a:xfrm>
+          <a:prstGeom prst="flowChartProcess">
+            <a:avLst/>
+          </a:prstGeom>
+        </p:spPr>
+        <p:style>
+          <a:lnRef idx="1">
+            <a:schemeClr val="accent1"/>
+          </a:lnRef>
+          <a:fillRef idx="2">
+            <a:schemeClr val="accent1"/>
+          </a:fillRef>
+          <a:effectRef idx="1">
+            <a:schemeClr val="accent1"/>
+          </a:effectRef>
+          <a:fontRef idx="minor">
+            <a:schemeClr val="dk1"/>
+          </a:fontRef>
+        </p:style>
+        <p:txBody>
+          <a:bodyPr rtlCol="0" anchor="ctr"/>
+          <a:lstStyle/>
+          <a:p>
+            <a:pPr algn="ctr"/>
+            <a:r>
+              <a:rPr lang="en-US" sz="1200" dirty="0" smtClean="0"/>
+              <a:t>Trigger Logic (B)</a:t>
+            </a:r>
+            <a:endParaRPr lang="en-US" sz="1200" dirty="0"/>
+          </a:p>
+        </p:txBody>
+      </p:sp>
+      <p:sp>
+        <p:nvSpPr>
+          <p:cNvPr id="49" name="Flowchart: Process 48"/>
+          <p:cNvSpPr/>
+          <p:nvPr/>
+        </p:nvSpPr>
+        <p:spPr>
+          <a:xfrm>
+            <a:off x="6004520" y="6004524"/>
+            <a:ext cx="1876445" cy="286279"/>
+          </a:xfrm>
+          <a:prstGeom prst="flowChartProcess">
+            <a:avLst/>
+          </a:prstGeom>
+        </p:spPr>
+        <p:style>
+          <a:lnRef idx="1">
+            <a:schemeClr val="accent1"/>
+          </a:lnRef>
+          <a:fillRef idx="2">
+            <a:schemeClr val="accent1"/>
+          </a:fillRef>
+          <a:effectRef idx="1">
+            <a:schemeClr val="accent1"/>
+          </a:effectRef>
+          <a:fontRef idx="minor">
+            <a:schemeClr val="dk1"/>
+          </a:fontRef>
+        </p:style>
+        <p:txBody>
+          <a:bodyPr rtlCol="0" anchor="ctr"/>
+          <a:lstStyle/>
+          <a:p>
+            <a:pPr algn="ctr"/>
+            <a:r>
+              <a:rPr lang="en-US" sz="1200" dirty="0" smtClean="0"/>
+              <a:t>Trigger Logic (A)</a:t>
+            </a:r>
+            <a:endParaRPr lang="en-US" sz="1200" dirty="0"/>
+          </a:p>
+        </p:txBody>
+      </p:sp>
+      <p:sp>
+        <p:nvSpPr>
+          <p:cNvPr id="99" name="Flowchart: Process 98"/>
+          <p:cNvSpPr/>
+          <p:nvPr/>
+        </p:nvSpPr>
+        <p:spPr>
+          <a:xfrm>
+            <a:off x="6553200" y="1473221"/>
+            <a:ext cx="1313734" cy="1037945"/>
+          </a:xfrm>
+          <a:prstGeom prst="flowChartProcess">
+            <a:avLst/>
+          </a:prstGeom>
+        </p:spPr>
+        <p:style>
+          <a:lnRef idx="1">
+            <a:schemeClr val="accent1"/>
+          </a:lnRef>
+          <a:fillRef idx="2">
+            <a:schemeClr val="accent1"/>
+          </a:fillRef>
+          <a:effectRef idx="1">
+            <a:schemeClr val="accent1"/>
+          </a:effectRef>
+          <a:fontRef idx="minor">
+            <a:schemeClr val="dk1"/>
+          </a:fontRef>
+        </p:style>
+        <p:txBody>
+          <a:bodyPr rtlCol="0" anchor="ctr"/>
+          <a:lstStyle/>
+          <a:p>
+            <a:pPr algn="ctr"/>
+            <a:r>
+              <a:rPr lang="en-US" sz="1200" dirty="0" smtClean="0"/>
+              <a:t>Display Controller</a:t>
+            </a:r>
+            <a:endParaRPr lang="en-US" sz="1200" dirty="0"/>
+          </a:p>
+        </p:txBody>
+      </p:sp>
+      <p:sp>
+        <p:nvSpPr>
+          <p:cNvPr id="100" name="Flowchart: Process 99"/>
+          <p:cNvSpPr/>
+          <p:nvPr/>
+        </p:nvSpPr>
+        <p:spPr>
+          <a:xfrm>
+            <a:off x="3472180" y="4588060"/>
+            <a:ext cx="2429261" cy="467776"/>
+          </a:xfrm>
+          <a:prstGeom prst="flowChartProcess">
+            <a:avLst/>
+          </a:prstGeom>
+        </p:spPr>
+        <p:style>
+          <a:lnRef idx="1">
+            <a:schemeClr val="accent1"/>
+          </a:lnRef>
+          <a:fillRef idx="2">
+            <a:schemeClr val="accent1"/>
+          </a:fillRef>
+          <a:effectRef idx="1">
+            <a:schemeClr val="accent1"/>
+          </a:effectRef>
+          <a:fontRef idx="minor">
+            <a:schemeClr val="dk1"/>
+          </a:fontRef>
+        </p:style>
+        <p:txBody>
+          <a:bodyPr rtlCol="0" anchor="ctr"/>
+          <a:lstStyle/>
+          <a:p>
+            <a:pPr algn="ctr"/>
+            <a:r>
+              <a:rPr lang="en-US" sz="1200" dirty="0" smtClean="0"/>
+              <a:t>Fast Sample Clock</a:t>
+            </a:r>
+            <a:endParaRPr lang="en-US" sz="1200" dirty="0"/>
+          </a:p>
+        </p:txBody>
+      </p:sp>
+      <p:sp>
+        <p:nvSpPr>
+          <p:cNvPr id="101" name="Flowchart: Process 100"/>
+          <p:cNvSpPr/>
+          <p:nvPr/>
+        </p:nvSpPr>
+        <p:spPr>
+          <a:xfrm>
+            <a:off x="3472181" y="2088788"/>
+            <a:ext cx="1447202" cy="431081"/>
+          </a:xfrm>
+          <a:prstGeom prst="flowChartProcess">
+            <a:avLst/>
+          </a:prstGeom>
+        </p:spPr>
+        <p:style>
+          <a:lnRef idx="1">
+            <a:schemeClr val="accent1"/>
+          </a:lnRef>
+          <a:fillRef idx="2">
+            <a:schemeClr val="accent1"/>
+          </a:fillRef>
+          <a:effectRef idx="1">
+            <a:schemeClr val="accent1"/>
+          </a:effectRef>
+          <a:fontRef idx="minor">
+            <a:schemeClr val="dk1"/>
+          </a:fontRef>
+        </p:style>
+        <p:txBody>
+          <a:bodyPr rtlCol="0" anchor="ctr"/>
+          <a:lstStyle/>
+          <a:p>
+            <a:pPr algn="ctr"/>
+            <a:r>
+              <a:rPr lang="en-US" sz="1200" dirty="0" smtClean="0"/>
+              <a:t>PLL to 400MHz</a:t>
+            </a:r>
+            <a:endParaRPr lang="en-US" sz="1200" dirty="0"/>
+          </a:p>
+        </p:txBody>
+      </p:sp>
+      <p:sp>
+        <p:nvSpPr>
+          <p:cNvPr id="102" name="Flowchart: Process 101"/>
+          <p:cNvSpPr/>
+          <p:nvPr/>
+        </p:nvSpPr>
+        <p:spPr>
+          <a:xfrm>
+            <a:off x="1884780" y="4583295"/>
+            <a:ext cx="760736" cy="367082"/>
+          </a:xfrm>
+          <a:prstGeom prst="flowChartProcess">
+            <a:avLst/>
+          </a:prstGeom>
+        </p:spPr>
+        <p:style>
+          <a:lnRef idx="1">
+            <a:schemeClr val="accent4"/>
+          </a:lnRef>
+          <a:fillRef idx="2">
+            <a:schemeClr val="accent4"/>
+          </a:fillRef>
+          <a:effectRef idx="1">
+            <a:schemeClr val="accent4"/>
+          </a:effectRef>
+          <a:fontRef idx="minor">
+            <a:schemeClr val="dk1"/>
+          </a:fontRef>
+        </p:style>
+        <p:txBody>
+          <a:bodyPr rtlCol="0" anchor="ctr"/>
+          <a:lstStyle/>
+          <a:p>
+            <a:pPr algn="ctr"/>
+            <a:r>
+              <a:rPr lang="en-US" sz="1200" dirty="0" smtClean="0"/>
+              <a:t>ADC/Trig Control</a:t>
+            </a:r>
+            <a:endParaRPr lang="en-US" sz="1200" dirty="0"/>
+          </a:p>
+        </p:txBody>
+      </p:sp>
+      <p:sp>
+        <p:nvSpPr>
+          <p:cNvPr id="103" name="Flowchart: Process 102"/>
+          <p:cNvSpPr/>
+          <p:nvPr/>
+        </p:nvSpPr>
+        <p:spPr>
+          <a:xfrm>
+            <a:off x="1884781" y="4008326"/>
+            <a:ext cx="768780" cy="402212"/>
+          </a:xfrm>
+          <a:prstGeom prst="flowChartProcess">
+            <a:avLst/>
+          </a:prstGeom>
+        </p:spPr>
+        <p:style>
+          <a:lnRef idx="1">
+            <a:schemeClr val="accent4"/>
+          </a:lnRef>
+          <a:fillRef idx="2">
+            <a:schemeClr val="accent4"/>
+          </a:fillRef>
+          <a:effectRef idx="1">
+            <a:schemeClr val="accent4"/>
+          </a:effectRef>
+          <a:fontRef idx="minor">
+            <a:schemeClr val="dk1"/>
+          </a:fontRef>
+        </p:style>
+        <p:txBody>
+          <a:bodyPr rtlCol="0" anchor="ctr"/>
+          <a:lstStyle/>
+          <a:p>
+            <a:pPr algn="ctr"/>
+            <a:r>
+              <a:rPr lang="en-US" sz="1200" dirty="0" smtClean="0"/>
+              <a:t>VRAM Control</a:t>
+            </a:r>
+            <a:endParaRPr lang="en-US" sz="1200" dirty="0"/>
+          </a:p>
+        </p:txBody>
+      </p:sp>
+      <p:sp>
+        <p:nvSpPr>
+          <p:cNvPr id="104" name="Flowchart: Process 103"/>
+          <p:cNvSpPr/>
+          <p:nvPr/>
+        </p:nvSpPr>
+        <p:spPr>
+          <a:xfrm>
+            <a:off x="1884781" y="3433357"/>
+            <a:ext cx="768780" cy="402212"/>
+          </a:xfrm>
+          <a:prstGeom prst="flowChartProcess">
+            <a:avLst/>
+          </a:prstGeom>
+        </p:spPr>
+        <p:style>
+          <a:lnRef idx="1">
+            <a:schemeClr val="accent4"/>
+          </a:lnRef>
+          <a:fillRef idx="2">
+            <a:schemeClr val="accent4"/>
+          </a:fillRef>
+          <a:effectRef idx="1">
+            <a:schemeClr val="accent4"/>
+          </a:effectRef>
+          <a:fontRef idx="minor">
+            <a:schemeClr val="dk1"/>
+          </a:fontRef>
+        </p:style>
+        <p:txBody>
+          <a:bodyPr rtlCol="0" anchor="ctr"/>
+          <a:lstStyle/>
+          <a:p>
+            <a:pPr algn="ctr"/>
+            <a:r>
+              <a:rPr lang="en-US" sz="1200" dirty="0"/>
+              <a:t>S</a:t>
+            </a:r>
+            <a:r>
+              <a:rPr lang="en-US" sz="1200" dirty="0" smtClean="0"/>
+              <a:t>RAM Control</a:t>
+            </a:r>
+            <a:endParaRPr lang="en-US" sz="1200" dirty="0"/>
+          </a:p>
+        </p:txBody>
+      </p:sp>
+      <p:sp>
+        <p:nvSpPr>
+          <p:cNvPr id="105" name="Flowchart: Process 104"/>
+          <p:cNvSpPr/>
+          <p:nvPr/>
+        </p:nvSpPr>
+        <p:spPr>
+          <a:xfrm>
+            <a:off x="1894385" y="2858388"/>
+            <a:ext cx="768780" cy="402212"/>
+          </a:xfrm>
+          <a:prstGeom prst="flowChartProcess">
+            <a:avLst/>
+          </a:prstGeom>
+        </p:spPr>
+        <p:style>
+          <a:lnRef idx="1">
+            <a:schemeClr val="accent4"/>
+          </a:lnRef>
+          <a:fillRef idx="2">
+            <a:schemeClr val="accent4"/>
+          </a:fillRef>
+          <a:effectRef idx="1">
+            <a:schemeClr val="accent4"/>
+          </a:effectRef>
+          <a:fontRef idx="minor">
+            <a:schemeClr val="dk1"/>
+          </a:fontRef>
+        </p:style>
+        <p:txBody>
+          <a:bodyPr rtlCol="0" anchor="ctr"/>
+          <a:lstStyle/>
+          <a:p>
+            <a:pPr algn="ctr"/>
+            <a:r>
+              <a:rPr lang="en-US" sz="1200" dirty="0" smtClean="0"/>
+              <a:t>Flash Control</a:t>
+            </a:r>
+            <a:endParaRPr lang="en-US" sz="1200" dirty="0"/>
+          </a:p>
+        </p:txBody>
+      </p:sp>
+      <p:sp>
+        <p:nvSpPr>
+          <p:cNvPr id="106" name="Flowchart: Process 105"/>
+          <p:cNvSpPr/>
+          <p:nvPr/>
+        </p:nvSpPr>
+        <p:spPr>
+          <a:xfrm>
+            <a:off x="1884781" y="5123134"/>
+            <a:ext cx="1178706" cy="402212"/>
+          </a:xfrm>
+          <a:prstGeom prst="flowChartProcess">
+            <a:avLst/>
+          </a:prstGeom>
+        </p:spPr>
+        <p:style>
+          <a:lnRef idx="1">
+            <a:schemeClr val="accent4"/>
+          </a:lnRef>
+          <a:fillRef idx="2">
+            <a:schemeClr val="accent4"/>
+          </a:fillRef>
+          <a:effectRef idx="1">
+            <a:schemeClr val="accent4"/>
+          </a:effectRef>
+          <a:fontRef idx="minor">
+            <a:schemeClr val="dk1"/>
+          </a:fontRef>
+        </p:style>
+        <p:txBody>
+          <a:bodyPr rtlCol="0" anchor="ctr"/>
+          <a:lstStyle/>
+          <a:p>
+            <a:pPr algn="ctr"/>
+            <a:r>
+              <a:rPr lang="en-US" sz="1200" dirty="0" smtClean="0"/>
+              <a:t>Keypad PIO</a:t>
+            </a:r>
+            <a:endParaRPr lang="en-US" sz="1200" dirty="0"/>
+          </a:p>
+        </p:txBody>
+      </p:sp>
+      <p:sp>
+        <p:nvSpPr>
+          <p:cNvPr id="107" name="Flowchart: Process 106"/>
+          <p:cNvSpPr/>
+          <p:nvPr/>
+        </p:nvSpPr>
+        <p:spPr>
+          <a:xfrm>
+            <a:off x="1884781" y="5698102"/>
+            <a:ext cx="1178706" cy="402212"/>
+          </a:xfrm>
+          <a:prstGeom prst="flowChartProcess">
+            <a:avLst/>
+          </a:prstGeom>
+        </p:spPr>
+        <p:style>
+          <a:lnRef idx="1">
+            <a:schemeClr val="accent4"/>
+          </a:lnRef>
+          <a:fillRef idx="2">
+            <a:schemeClr val="accent4"/>
+          </a:fillRef>
+          <a:effectRef idx="1">
+            <a:schemeClr val="accent4"/>
+          </a:effectRef>
+          <a:fontRef idx="minor">
+            <a:schemeClr val="dk1"/>
+          </a:fontRef>
+        </p:style>
+        <p:txBody>
+          <a:bodyPr rtlCol="0" anchor="ctr"/>
+          <a:lstStyle/>
+          <a:p>
+            <a:pPr algn="ctr"/>
+            <a:r>
+              <a:rPr lang="en-US" sz="1200" dirty="0" smtClean="0"/>
+              <a:t>Sample FIFO PIO</a:t>
+            </a:r>
+            <a:endParaRPr lang="en-US" sz="1200" dirty="0"/>
+          </a:p>
+        </p:txBody>
+      </p:sp>
+      <p:sp>
+        <p:nvSpPr>
+          <p:cNvPr id="108" name="Flowchart: Process 107"/>
+          <p:cNvSpPr/>
+          <p:nvPr/>
+        </p:nvSpPr>
+        <p:spPr>
+          <a:xfrm rot="16200000">
+            <a:off x="-4763" y="4338637"/>
+            <a:ext cx="3237612" cy="277114"/>
+          </a:xfrm>
+          <a:prstGeom prst="flowChartProcess">
+            <a:avLst/>
+          </a:prstGeom>
+        </p:spPr>
+        <p:style>
+          <a:lnRef idx="1">
+            <a:schemeClr val="accent4"/>
+          </a:lnRef>
+          <a:fillRef idx="2">
+            <a:schemeClr val="accent4"/>
+          </a:fillRef>
+          <a:effectRef idx="1">
+            <a:schemeClr val="accent4"/>
+          </a:effectRef>
+          <a:fontRef idx="minor">
+            <a:schemeClr val="dk1"/>
+          </a:fontRef>
+        </p:style>
+        <p:txBody>
+          <a:bodyPr rtlCol="0" anchor="ctr"/>
+          <a:lstStyle/>
+          <a:p>
+            <a:pPr algn="ctr"/>
+            <a:r>
+              <a:rPr lang="en-US" sz="1200" dirty="0" smtClean="0"/>
+              <a:t>Avalon</a:t>
+            </a:r>
+            <a:endParaRPr lang="en-US" sz="1200" dirty="0"/>
+          </a:p>
+        </p:txBody>
+      </p:sp>
+      <p:sp>
+        <p:nvSpPr>
+          <p:cNvPr id="109" name="Flowchart: Process 108"/>
+          <p:cNvSpPr/>
+          <p:nvPr/>
+        </p:nvSpPr>
+        <p:spPr>
+          <a:xfrm>
+            <a:off x="1884780" y="1905000"/>
+            <a:ext cx="1181788" cy="748502"/>
+          </a:xfrm>
+          <a:prstGeom prst="flowChartProcess">
+            <a:avLst/>
+          </a:prstGeom>
+        </p:spPr>
+        <p:style>
+          <a:lnRef idx="1">
+            <a:schemeClr val="accent3"/>
+          </a:lnRef>
+          <a:fillRef idx="2">
+            <a:schemeClr val="accent3"/>
+          </a:fillRef>
+          <a:effectRef idx="1">
+            <a:schemeClr val="accent3"/>
+          </a:effectRef>
+          <a:fontRef idx="minor">
+            <a:schemeClr val="dk1"/>
+          </a:fontRef>
+        </p:style>
+        <p:txBody>
+          <a:bodyPr rtlCol="0" anchor="ctr"/>
+          <a:lstStyle/>
+          <a:p>
+            <a:pPr algn="ctr"/>
+            <a:r>
+              <a:rPr lang="en-US" sz="1200" dirty="0" smtClean="0"/>
+              <a:t>NIOS II Core</a:t>
+            </a:r>
+            <a:endParaRPr lang="en-US" sz="1200" dirty="0"/>
+          </a:p>
+        </p:txBody>
+      </p:sp>
+      <p:sp>
+        <p:nvSpPr>
+          <p:cNvPr id="110" name="Flowchart: Process 109"/>
+          <p:cNvSpPr/>
+          <p:nvPr/>
+        </p:nvSpPr>
+        <p:spPr>
+          <a:xfrm rot="16200000">
+            <a:off x="1876414" y="3763304"/>
+            <a:ext cx="2097031" cy="277114"/>
+          </a:xfrm>
+          <a:prstGeom prst="flowChartProcess">
+            <a:avLst/>
+          </a:prstGeom>
+        </p:spPr>
+        <p:style>
+          <a:lnRef idx="1">
+            <a:schemeClr val="accent4"/>
+          </a:lnRef>
+          <a:fillRef idx="2">
+            <a:schemeClr val="accent4"/>
+          </a:fillRef>
+          <a:effectRef idx="1">
+            <a:schemeClr val="accent4"/>
+          </a:effectRef>
+          <a:fontRef idx="minor">
+            <a:schemeClr val="dk1"/>
+          </a:fontRef>
+        </p:style>
+        <p:txBody>
+          <a:bodyPr rtlCol="0" anchor="ctr"/>
+          <a:lstStyle/>
+          <a:p>
+            <a:pPr algn="ctr"/>
+            <a:r>
+              <a:rPr lang="en-US" sz="1200" dirty="0" smtClean="0"/>
+              <a:t>Pin Sharer / Bridge</a:t>
+            </a:r>
+            <a:endParaRPr lang="en-US" sz="1200" dirty="0"/>
+          </a:p>
+        </p:txBody>
+      </p:sp>
+      <p:sp>
+        <p:nvSpPr>
+          <p:cNvPr id="111" name="Flowchart: Process 110"/>
+          <p:cNvSpPr/>
+          <p:nvPr/>
+        </p:nvSpPr>
+        <p:spPr>
+          <a:xfrm rot="16200000">
+            <a:off x="1304788" y="2073508"/>
+            <a:ext cx="748503" cy="411483"/>
+          </a:xfrm>
+          <a:prstGeom prst="flowChartProcess">
+            <a:avLst/>
+          </a:prstGeom>
+        </p:spPr>
+        <p:style>
+          <a:lnRef idx="1">
+            <a:schemeClr val="accent3"/>
+          </a:lnRef>
+          <a:fillRef idx="2">
+            <a:schemeClr val="accent3"/>
+          </a:fillRef>
+          <a:effectRef idx="1">
+            <a:schemeClr val="accent3"/>
+          </a:effectRef>
+          <a:fontRef idx="minor">
+            <a:schemeClr val="dk1"/>
+          </a:fontRef>
+        </p:style>
+        <p:txBody>
+          <a:bodyPr rtlCol="0" anchor="ctr"/>
+          <a:lstStyle/>
+          <a:p>
+            <a:pPr algn="ctr"/>
+            <a:r>
+              <a:rPr lang="en-US" sz="1200" dirty="0" smtClean="0"/>
+              <a:t>Clock (36MHz)</a:t>
+            </a:r>
+            <a:endParaRPr lang="en-US" sz="1200" dirty="0"/>
+          </a:p>
+        </p:txBody>
+      </p:sp>
+    </p:spTree>
+    <p:extLst>
+      <p:ext uri="{BB962C8B-B14F-4D97-AF65-F5344CB8AC3E}">
+        <p14:creationId xmlns:p14="http://schemas.microsoft.com/office/powerpoint/2010/main" val="2669046511"/>
       </p:ext>
     </p:extLst>
   </p:cSld>

</xml_diff>